<commit_message>
Auto stash before rebase of "origin/Rollback"
</commit_message>
<xml_diff>
--- a/PVB opdracht.pptx
+++ b/PVB opdracht.pptx
@@ -4,13 +4,25 @@
   <p:sldMasterIdLst>
     <p:sldMasterId id="2147483648" r:id="rId1"/>
   </p:sldMasterIdLst>
+  <p:notesMasterIdLst>
+    <p:notesMasterId r:id="rId17"/>
+  </p:notesMasterIdLst>
   <p:sldIdLst>
     <p:sldId id="256" r:id="rId2"/>
     <p:sldId id="257" r:id="rId3"/>
     <p:sldId id="258" r:id="rId4"/>
     <p:sldId id="259" r:id="rId5"/>
     <p:sldId id="260" r:id="rId6"/>
-    <p:sldId id="261" r:id="rId7"/>
+    <p:sldId id="263" r:id="rId7"/>
+    <p:sldId id="264" r:id="rId8"/>
+    <p:sldId id="265" r:id="rId9"/>
+    <p:sldId id="266" r:id="rId10"/>
+    <p:sldId id="267" r:id="rId11"/>
+    <p:sldId id="268" r:id="rId12"/>
+    <p:sldId id="269" r:id="rId13"/>
+    <p:sldId id="270" r:id="rId14"/>
+    <p:sldId id="271" r:id="rId15"/>
+    <p:sldId id="261" r:id="rId16"/>
   </p:sldIdLst>
   <p:sldSz cx="12192000" cy="6858000"/>
   <p:notesSz cx="6858000" cy="9144000"/>
@@ -109,7 +121,838 @@
       </a:defRPr>
     </a:lvl9pPr>
   </p:defaultTextStyle>
+  <p:extLst>
+    <p:ext uri="{EFAFB233-063F-42B5-8137-9DF3F51BA10A}">
+      <p15:sldGuideLst xmlns:p15="http://schemas.microsoft.com/office/powerpoint/2012/main"/>
+    </p:ext>
+  </p:extLst>
 </p:presentation>
+</file>
+
+<file path=ppt/notesMasters/notesMaster1.xml><?xml version="1.0" encoding="utf-8"?>
+<p:notesMaster xmlns:a="http://schemas.openxmlformats.org/drawingml/2006/main" xmlns:r="http://schemas.openxmlformats.org/officeDocument/2006/relationships" xmlns:p="http://schemas.openxmlformats.org/presentationml/2006/main">
+  <p:cSld>
+    <p:bg>
+      <p:bgRef idx="1001">
+        <a:schemeClr val="bg1"/>
+      </p:bgRef>
+    </p:bg>
+    <p:spTree>
+      <p:nvGrpSpPr>
+        <p:cNvPr id="1" name=""/>
+        <p:cNvGrpSpPr/>
+        <p:nvPr/>
+      </p:nvGrpSpPr>
+      <p:grpSpPr>
+        <a:xfrm>
+          <a:off x="0" y="0"/>
+          <a:ext cx="0" cy="0"/>
+          <a:chOff x="0" y="0"/>
+          <a:chExt cx="0" cy="0"/>
+        </a:xfrm>
+      </p:grpSpPr>
+      <p:sp>
+        <p:nvSpPr>
+          <p:cNvPr id="2" name="Header Placeholder 1"/>
+          <p:cNvSpPr>
+            <a:spLocks noGrp="1"/>
+          </p:cNvSpPr>
+          <p:nvPr>
+            <p:ph type="hdr" sz="quarter"/>
+          </p:nvPr>
+        </p:nvSpPr>
+        <p:spPr>
+          <a:xfrm>
+            <a:off x="0" y="0"/>
+            <a:ext cx="2971800" cy="458788"/>
+          </a:xfrm>
+          <a:prstGeom prst="rect">
+            <a:avLst/>
+          </a:prstGeom>
+        </p:spPr>
+        <p:txBody>
+          <a:bodyPr vert="horz" lIns="91440" tIns="45720" rIns="91440" bIns="45720" rtlCol="0"/>
+          <a:lstStyle>
+            <a:lvl1pPr algn="l">
+              <a:defRPr sz="1200"/>
+            </a:lvl1pPr>
+          </a:lstStyle>
+          <a:p>
+            <a:endParaRPr lang="en-GB"/>
+          </a:p>
+        </p:txBody>
+      </p:sp>
+      <p:sp>
+        <p:nvSpPr>
+          <p:cNvPr id="3" name="Date Placeholder 2"/>
+          <p:cNvSpPr>
+            <a:spLocks noGrp="1"/>
+          </p:cNvSpPr>
+          <p:nvPr>
+            <p:ph type="dt" idx="1"/>
+          </p:nvPr>
+        </p:nvSpPr>
+        <p:spPr>
+          <a:xfrm>
+            <a:off x="3884613" y="0"/>
+            <a:ext cx="2971800" cy="458788"/>
+          </a:xfrm>
+          <a:prstGeom prst="rect">
+            <a:avLst/>
+          </a:prstGeom>
+        </p:spPr>
+        <p:txBody>
+          <a:bodyPr vert="horz" lIns="91440" tIns="45720" rIns="91440" bIns="45720" rtlCol="0"/>
+          <a:lstStyle>
+            <a:lvl1pPr algn="r">
+              <a:defRPr sz="1200"/>
+            </a:lvl1pPr>
+          </a:lstStyle>
+          <a:p>
+            <a:fld id="{7F811C59-D0AD-4F9B-AC09-AE1956CC899C}" type="datetimeFigureOut">
+              <a:rPr lang="en-GB" smtClean="0"/>
+              <a:t>07/06/2021</a:t>
+            </a:fld>
+            <a:endParaRPr lang="en-GB"/>
+          </a:p>
+        </p:txBody>
+      </p:sp>
+      <p:sp>
+        <p:nvSpPr>
+          <p:cNvPr id="4" name="Slide Image Placeholder 3"/>
+          <p:cNvSpPr>
+            <a:spLocks noGrp="1" noRot="1" noChangeAspect="1"/>
+          </p:cNvSpPr>
+          <p:nvPr>
+            <p:ph type="sldImg" idx="2"/>
+          </p:nvPr>
+        </p:nvSpPr>
+        <p:spPr>
+          <a:xfrm>
+            <a:off x="685800" y="1143000"/>
+            <a:ext cx="5486400" cy="3086100"/>
+          </a:xfrm>
+          <a:prstGeom prst="rect">
+            <a:avLst/>
+          </a:prstGeom>
+          <a:noFill/>
+          <a:ln w="12700">
+            <a:solidFill>
+              <a:prstClr val="black"/>
+            </a:solidFill>
+          </a:ln>
+        </p:spPr>
+        <p:txBody>
+          <a:bodyPr vert="horz" lIns="91440" tIns="45720" rIns="91440" bIns="45720" rtlCol="0" anchor="ctr"/>
+          <a:lstStyle/>
+          <a:p>
+            <a:endParaRPr lang="en-GB"/>
+          </a:p>
+        </p:txBody>
+      </p:sp>
+      <p:sp>
+        <p:nvSpPr>
+          <p:cNvPr id="5" name="Notes Placeholder 4"/>
+          <p:cNvSpPr>
+            <a:spLocks noGrp="1"/>
+          </p:cNvSpPr>
+          <p:nvPr>
+            <p:ph type="body" sz="quarter" idx="3"/>
+          </p:nvPr>
+        </p:nvSpPr>
+        <p:spPr>
+          <a:xfrm>
+            <a:off x="685800" y="4400550"/>
+            <a:ext cx="5486400" cy="3600450"/>
+          </a:xfrm>
+          <a:prstGeom prst="rect">
+            <a:avLst/>
+          </a:prstGeom>
+        </p:spPr>
+        <p:txBody>
+          <a:bodyPr vert="horz" lIns="91440" tIns="45720" rIns="91440" bIns="45720" rtlCol="0"/>
+          <a:lstStyle/>
+          <a:p>
+            <a:pPr lvl="0"/>
+            <a:r>
+              <a:rPr lang="en-US"/>
+              <a:t>Click to edit Master text styles</a:t>
+            </a:r>
+          </a:p>
+          <a:p>
+            <a:pPr lvl="1"/>
+            <a:r>
+              <a:rPr lang="en-US"/>
+              <a:t>Second level</a:t>
+            </a:r>
+          </a:p>
+          <a:p>
+            <a:pPr lvl="2"/>
+            <a:r>
+              <a:rPr lang="en-US"/>
+              <a:t>Third level</a:t>
+            </a:r>
+          </a:p>
+          <a:p>
+            <a:pPr lvl="3"/>
+            <a:r>
+              <a:rPr lang="en-US"/>
+              <a:t>Fourth level</a:t>
+            </a:r>
+          </a:p>
+          <a:p>
+            <a:pPr lvl="4"/>
+            <a:r>
+              <a:rPr lang="en-US"/>
+              <a:t>Fifth level</a:t>
+            </a:r>
+            <a:endParaRPr lang="en-GB"/>
+          </a:p>
+        </p:txBody>
+      </p:sp>
+      <p:sp>
+        <p:nvSpPr>
+          <p:cNvPr id="6" name="Footer Placeholder 5"/>
+          <p:cNvSpPr>
+            <a:spLocks noGrp="1"/>
+          </p:cNvSpPr>
+          <p:nvPr>
+            <p:ph type="ftr" sz="quarter" idx="4"/>
+          </p:nvPr>
+        </p:nvSpPr>
+        <p:spPr>
+          <a:xfrm>
+            <a:off x="0" y="8685213"/>
+            <a:ext cx="2971800" cy="458787"/>
+          </a:xfrm>
+          <a:prstGeom prst="rect">
+            <a:avLst/>
+          </a:prstGeom>
+        </p:spPr>
+        <p:txBody>
+          <a:bodyPr vert="horz" lIns="91440" tIns="45720" rIns="91440" bIns="45720" rtlCol="0" anchor="b"/>
+          <a:lstStyle>
+            <a:lvl1pPr algn="l">
+              <a:defRPr sz="1200"/>
+            </a:lvl1pPr>
+          </a:lstStyle>
+          <a:p>
+            <a:endParaRPr lang="en-GB"/>
+          </a:p>
+        </p:txBody>
+      </p:sp>
+      <p:sp>
+        <p:nvSpPr>
+          <p:cNvPr id="7" name="Slide Number Placeholder 6"/>
+          <p:cNvSpPr>
+            <a:spLocks noGrp="1"/>
+          </p:cNvSpPr>
+          <p:nvPr>
+            <p:ph type="sldNum" sz="quarter" idx="5"/>
+          </p:nvPr>
+        </p:nvSpPr>
+        <p:spPr>
+          <a:xfrm>
+            <a:off x="3884613" y="8685213"/>
+            <a:ext cx="2971800" cy="458787"/>
+          </a:xfrm>
+          <a:prstGeom prst="rect">
+            <a:avLst/>
+          </a:prstGeom>
+        </p:spPr>
+        <p:txBody>
+          <a:bodyPr vert="horz" lIns="91440" tIns="45720" rIns="91440" bIns="45720" rtlCol="0" anchor="b"/>
+          <a:lstStyle>
+            <a:lvl1pPr algn="r">
+              <a:defRPr sz="1200"/>
+            </a:lvl1pPr>
+          </a:lstStyle>
+          <a:p>
+            <a:fld id="{52099AE6-D359-4FCD-A62F-89FDA53DAB5C}" type="slidenum">
+              <a:rPr lang="en-GB" smtClean="0"/>
+              <a:t>‹#›</a:t>
+            </a:fld>
+            <a:endParaRPr lang="en-GB"/>
+          </a:p>
+        </p:txBody>
+      </p:sp>
+    </p:spTree>
+    <p:extLst>
+      <p:ext uri="{BB962C8B-B14F-4D97-AF65-F5344CB8AC3E}">
+        <p14:creationId xmlns:p14="http://schemas.microsoft.com/office/powerpoint/2010/main" val="793880727"/>
+      </p:ext>
+    </p:extLst>
+  </p:cSld>
+  <p:clrMap bg1="lt1" tx1="dk1" bg2="lt2" tx2="dk2" accent1="accent1" accent2="accent2" accent3="accent3" accent4="accent4" accent5="accent5" accent6="accent6" hlink="hlink" folHlink="folHlink"/>
+  <p:notesStyle>
+    <a:lvl1pPr marL="0" algn="l" defTabSz="914400" rtl="0" eaLnBrk="1" latinLnBrk="0" hangingPunct="1">
+      <a:defRPr sz="1200" kern="1200">
+        <a:solidFill>
+          <a:schemeClr val="tx1"/>
+        </a:solidFill>
+        <a:latin typeface="+mn-lt"/>
+        <a:ea typeface="+mn-ea"/>
+        <a:cs typeface="+mn-cs"/>
+      </a:defRPr>
+    </a:lvl1pPr>
+    <a:lvl2pPr marL="457200" algn="l" defTabSz="914400" rtl="0" eaLnBrk="1" latinLnBrk="0" hangingPunct="1">
+      <a:defRPr sz="1200" kern="1200">
+        <a:solidFill>
+          <a:schemeClr val="tx1"/>
+        </a:solidFill>
+        <a:latin typeface="+mn-lt"/>
+        <a:ea typeface="+mn-ea"/>
+        <a:cs typeface="+mn-cs"/>
+      </a:defRPr>
+    </a:lvl2pPr>
+    <a:lvl3pPr marL="914400" algn="l" defTabSz="914400" rtl="0" eaLnBrk="1" latinLnBrk="0" hangingPunct="1">
+      <a:defRPr sz="1200" kern="1200">
+        <a:solidFill>
+          <a:schemeClr val="tx1"/>
+        </a:solidFill>
+        <a:latin typeface="+mn-lt"/>
+        <a:ea typeface="+mn-ea"/>
+        <a:cs typeface="+mn-cs"/>
+      </a:defRPr>
+    </a:lvl3pPr>
+    <a:lvl4pPr marL="1371600" algn="l" defTabSz="914400" rtl="0" eaLnBrk="1" latinLnBrk="0" hangingPunct="1">
+      <a:defRPr sz="1200" kern="1200">
+        <a:solidFill>
+          <a:schemeClr val="tx1"/>
+        </a:solidFill>
+        <a:latin typeface="+mn-lt"/>
+        <a:ea typeface="+mn-ea"/>
+        <a:cs typeface="+mn-cs"/>
+      </a:defRPr>
+    </a:lvl4pPr>
+    <a:lvl5pPr marL="1828800" algn="l" defTabSz="914400" rtl="0" eaLnBrk="1" latinLnBrk="0" hangingPunct="1">
+      <a:defRPr sz="1200" kern="1200">
+        <a:solidFill>
+          <a:schemeClr val="tx1"/>
+        </a:solidFill>
+        <a:latin typeface="+mn-lt"/>
+        <a:ea typeface="+mn-ea"/>
+        <a:cs typeface="+mn-cs"/>
+      </a:defRPr>
+    </a:lvl5pPr>
+    <a:lvl6pPr marL="2286000" algn="l" defTabSz="914400" rtl="0" eaLnBrk="1" latinLnBrk="0" hangingPunct="1">
+      <a:defRPr sz="1200" kern="1200">
+        <a:solidFill>
+          <a:schemeClr val="tx1"/>
+        </a:solidFill>
+        <a:latin typeface="+mn-lt"/>
+        <a:ea typeface="+mn-ea"/>
+        <a:cs typeface="+mn-cs"/>
+      </a:defRPr>
+    </a:lvl6pPr>
+    <a:lvl7pPr marL="2743200" algn="l" defTabSz="914400" rtl="0" eaLnBrk="1" latinLnBrk="0" hangingPunct="1">
+      <a:defRPr sz="1200" kern="1200">
+        <a:solidFill>
+          <a:schemeClr val="tx1"/>
+        </a:solidFill>
+        <a:latin typeface="+mn-lt"/>
+        <a:ea typeface="+mn-ea"/>
+        <a:cs typeface="+mn-cs"/>
+      </a:defRPr>
+    </a:lvl7pPr>
+    <a:lvl8pPr marL="3200400" algn="l" defTabSz="914400" rtl="0" eaLnBrk="1" latinLnBrk="0" hangingPunct="1">
+      <a:defRPr sz="1200" kern="1200">
+        <a:solidFill>
+          <a:schemeClr val="tx1"/>
+        </a:solidFill>
+        <a:latin typeface="+mn-lt"/>
+        <a:ea typeface="+mn-ea"/>
+        <a:cs typeface="+mn-cs"/>
+      </a:defRPr>
+    </a:lvl8pPr>
+    <a:lvl9pPr marL="3657600" algn="l" defTabSz="914400" rtl="0" eaLnBrk="1" latinLnBrk="0" hangingPunct="1">
+      <a:defRPr sz="1200" kern="1200">
+        <a:solidFill>
+          <a:schemeClr val="tx1"/>
+        </a:solidFill>
+        <a:latin typeface="+mn-lt"/>
+        <a:ea typeface="+mn-ea"/>
+        <a:cs typeface="+mn-cs"/>
+      </a:defRPr>
+    </a:lvl9pPr>
+  </p:notesStyle>
+</p:notesMaster>
+</file>
+
+<file path=ppt/notesSlides/notesSlide1.xml><?xml version="1.0" encoding="utf-8"?>
+<p:notes xmlns:a="http://schemas.openxmlformats.org/drawingml/2006/main" xmlns:r="http://schemas.openxmlformats.org/officeDocument/2006/relationships" xmlns:p="http://schemas.openxmlformats.org/presentationml/2006/main">
+  <p:cSld>
+    <p:spTree>
+      <p:nvGrpSpPr>
+        <p:cNvPr id="1" name=""/>
+        <p:cNvGrpSpPr/>
+        <p:nvPr/>
+      </p:nvGrpSpPr>
+      <p:grpSpPr>
+        <a:xfrm>
+          <a:off x="0" y="0"/>
+          <a:ext cx="0" cy="0"/>
+          <a:chOff x="0" y="0"/>
+          <a:chExt cx="0" cy="0"/>
+        </a:xfrm>
+      </p:grpSpPr>
+      <p:sp>
+        <p:nvSpPr>
+          <p:cNvPr id="2" name="Slide Image Placeholder 1"/>
+          <p:cNvSpPr>
+            <a:spLocks noGrp="1" noRot="1" noChangeAspect="1"/>
+          </p:cNvSpPr>
+          <p:nvPr>
+            <p:ph type="sldImg"/>
+          </p:nvPr>
+        </p:nvSpPr>
+        <p:spPr/>
+      </p:sp>
+      <p:sp>
+        <p:nvSpPr>
+          <p:cNvPr id="3" name="Notes Placeholder 2"/>
+          <p:cNvSpPr>
+            <a:spLocks noGrp="1"/>
+          </p:cNvSpPr>
+          <p:nvPr>
+            <p:ph type="body" idx="1"/>
+          </p:nvPr>
+        </p:nvSpPr>
+        <p:spPr/>
+        <p:txBody>
+          <a:bodyPr/>
+          <a:lstStyle/>
+          <a:p>
+            <a:pPr algn="l" fontAlgn="base"/>
+            <a:r>
+              <a:rPr lang="nl-NL" b="1" i="0" dirty="0">
+                <a:solidFill>
+                  <a:srgbClr val="404E54"/>
+                </a:solidFill>
+                <a:effectLst/>
+                <a:latin typeface="inherit"/>
+              </a:rPr>
+              <a:t>B1: Basisdeel</a:t>
+            </a:r>
+            <a:endParaRPr lang="nl-NL" b="0" i="0" dirty="0">
+              <a:solidFill>
+                <a:srgbClr val="404E54"/>
+              </a:solidFill>
+              <a:effectLst/>
+              <a:latin typeface="Open Sans" panose="020B0606030504020204" pitchFamily="34" charset="0"/>
+            </a:endParaRPr>
+          </a:p>
+          <a:p>
+            <a:pPr algn="l" fontAlgn="base"/>
+            <a:r>
+              <a:rPr lang="nl-NL" b="1" i="0" dirty="0">
+                <a:solidFill>
+                  <a:srgbClr val="404E54"/>
+                </a:solidFill>
+                <a:effectLst/>
+                <a:latin typeface="inherit"/>
+              </a:rPr>
+              <a:t>B1-K1: Levert een bijdrage aan het ontwikkeltraject</a:t>
+            </a:r>
+            <a:endParaRPr lang="nl-NL" b="0" i="0" dirty="0">
+              <a:solidFill>
+                <a:srgbClr val="404E54"/>
+              </a:solidFill>
+              <a:effectLst/>
+              <a:latin typeface="Open Sans" panose="020B0606030504020204" pitchFamily="34" charset="0"/>
+            </a:endParaRPr>
+          </a:p>
+          <a:p>
+            <a:pPr algn="l" fontAlgn="base">
+              <a:buFont typeface="Arial" panose="020B0604020202020204" pitchFamily="34" charset="0"/>
+              <a:buChar char="•"/>
+            </a:pPr>
+            <a:r>
+              <a:rPr lang="nl-NL" b="0" i="0" dirty="0">
+                <a:solidFill>
+                  <a:srgbClr val="7F7F7F"/>
+                </a:solidFill>
+                <a:effectLst/>
+                <a:latin typeface="Open Sans" panose="020B0606030504020204" pitchFamily="34" charset="0"/>
+              </a:rPr>
+              <a:t>B1-K1-W1: Stelt de opdracht vast</a:t>
+            </a:r>
+            <a:endParaRPr lang="nl-NL" b="0" i="0" dirty="0">
+              <a:solidFill>
+                <a:srgbClr val="404E54"/>
+              </a:solidFill>
+              <a:effectLst/>
+              <a:latin typeface="Open Sans" panose="020B0606030504020204" pitchFamily="34" charset="0"/>
+            </a:endParaRPr>
+          </a:p>
+          <a:p>
+            <a:pPr algn="l" fontAlgn="base">
+              <a:buFont typeface="Arial" panose="020B0604020202020204" pitchFamily="34" charset="0"/>
+              <a:buChar char="•"/>
+            </a:pPr>
+            <a:r>
+              <a:rPr lang="nl-NL" b="0" i="0" dirty="0">
+                <a:solidFill>
+                  <a:srgbClr val="7F7F7F"/>
+                </a:solidFill>
+                <a:effectLst/>
+                <a:latin typeface="Open Sans" panose="020B0606030504020204" pitchFamily="34" charset="0"/>
+              </a:rPr>
+              <a:t>B1-K1-W2: Levert een bijdrage aan het projectplan</a:t>
+            </a:r>
+            <a:endParaRPr lang="nl-NL" b="0" i="0" dirty="0">
+              <a:solidFill>
+                <a:srgbClr val="404E54"/>
+              </a:solidFill>
+              <a:effectLst/>
+              <a:latin typeface="Open Sans" panose="020B0606030504020204" pitchFamily="34" charset="0"/>
+            </a:endParaRPr>
+          </a:p>
+          <a:p>
+            <a:pPr algn="l" fontAlgn="base">
+              <a:buFont typeface="Arial" panose="020B0604020202020204" pitchFamily="34" charset="0"/>
+              <a:buChar char="•"/>
+            </a:pPr>
+            <a:r>
+              <a:rPr lang="nl-NL" b="0" i="0" dirty="0">
+                <a:solidFill>
+                  <a:srgbClr val="7F7F7F"/>
+                </a:solidFill>
+                <a:effectLst/>
+                <a:latin typeface="Open Sans" panose="020B0606030504020204" pitchFamily="34" charset="0"/>
+              </a:rPr>
+              <a:t>B1-K1-W3: Levert een bijdrage aan het ontwerp</a:t>
+            </a:r>
+            <a:endParaRPr lang="nl-NL" b="0" i="0" dirty="0">
+              <a:solidFill>
+                <a:srgbClr val="404E54"/>
+              </a:solidFill>
+              <a:effectLst/>
+              <a:latin typeface="Open Sans" panose="020B0606030504020204" pitchFamily="34" charset="0"/>
+            </a:endParaRPr>
+          </a:p>
+          <a:p>
+            <a:pPr algn="l" fontAlgn="base">
+              <a:buFont typeface="Arial" panose="020B0604020202020204" pitchFamily="34" charset="0"/>
+              <a:buChar char="•"/>
+            </a:pPr>
+            <a:r>
+              <a:rPr lang="nl-NL" b="0" i="0" dirty="0">
+                <a:solidFill>
+                  <a:srgbClr val="7F7F7F"/>
+                </a:solidFill>
+                <a:effectLst/>
+                <a:latin typeface="Open Sans" panose="020B0606030504020204" pitchFamily="34" charset="0"/>
+              </a:rPr>
+              <a:t>B1-K1-W4: Bereidt de realisatie voor</a:t>
+            </a:r>
+            <a:endParaRPr lang="nl-NL" b="0" i="0" dirty="0">
+              <a:solidFill>
+                <a:srgbClr val="404E54"/>
+              </a:solidFill>
+              <a:effectLst/>
+              <a:latin typeface="Open Sans" panose="020B0606030504020204" pitchFamily="34" charset="0"/>
+            </a:endParaRPr>
+          </a:p>
+          <a:p>
+            <a:pPr algn="l" fontAlgn="base"/>
+            <a:r>
+              <a:rPr lang="nl-NL" b="1" i="0" dirty="0">
+                <a:solidFill>
+                  <a:srgbClr val="404E54"/>
+                </a:solidFill>
+                <a:effectLst/>
+                <a:latin typeface="inherit"/>
+              </a:rPr>
+              <a:t>B1-K2: Realiseert en test (onderdelen van) een product </a:t>
+            </a:r>
+            <a:endParaRPr lang="nl-NL" b="0" i="0" dirty="0">
+              <a:solidFill>
+                <a:srgbClr val="404E54"/>
+              </a:solidFill>
+              <a:effectLst/>
+              <a:latin typeface="Open Sans" panose="020B0606030504020204" pitchFamily="34" charset="0"/>
+            </a:endParaRPr>
+          </a:p>
+          <a:p>
+            <a:pPr algn="l" fontAlgn="base">
+              <a:buFont typeface="Arial" panose="020B0604020202020204" pitchFamily="34" charset="0"/>
+              <a:buChar char="•"/>
+            </a:pPr>
+            <a:r>
+              <a:rPr lang="nl-NL" b="0" i="0" dirty="0">
+                <a:solidFill>
+                  <a:srgbClr val="7F7F7F"/>
+                </a:solidFill>
+                <a:effectLst/>
+                <a:latin typeface="Open Sans" panose="020B0606030504020204" pitchFamily="34" charset="0"/>
+              </a:rPr>
+              <a:t>B1-K2-W1: Realiseert (onderdelen van) een product</a:t>
+            </a:r>
+            <a:endParaRPr lang="nl-NL" b="0" i="0" dirty="0">
+              <a:solidFill>
+                <a:srgbClr val="404E54"/>
+              </a:solidFill>
+              <a:effectLst/>
+              <a:latin typeface="Open Sans" panose="020B0606030504020204" pitchFamily="34" charset="0"/>
+            </a:endParaRPr>
+          </a:p>
+          <a:p>
+            <a:pPr algn="l" fontAlgn="base">
+              <a:buFont typeface="Arial" panose="020B0604020202020204" pitchFamily="34" charset="0"/>
+              <a:buChar char="•"/>
+            </a:pPr>
+            <a:r>
+              <a:rPr lang="nl-NL" b="0" i="0" dirty="0">
+                <a:solidFill>
+                  <a:srgbClr val="7F7F7F"/>
+                </a:solidFill>
+                <a:effectLst/>
+                <a:latin typeface="Open Sans" panose="020B0606030504020204" pitchFamily="34" charset="0"/>
+              </a:rPr>
+              <a:t>B1-K2-W2: Test het ontwikkelde product</a:t>
+            </a:r>
+            <a:endParaRPr lang="nl-NL" b="0" i="0" dirty="0">
+              <a:solidFill>
+                <a:srgbClr val="404E54"/>
+              </a:solidFill>
+              <a:effectLst/>
+              <a:latin typeface="Open Sans" panose="020B0606030504020204" pitchFamily="34" charset="0"/>
+            </a:endParaRPr>
+          </a:p>
+          <a:p>
+            <a:pPr algn="l" fontAlgn="base"/>
+            <a:r>
+              <a:rPr lang="nl-NL" b="1" i="0" dirty="0">
+                <a:solidFill>
+                  <a:srgbClr val="404E54"/>
+                </a:solidFill>
+                <a:effectLst/>
+                <a:latin typeface="inherit"/>
+              </a:rPr>
+              <a:t>B1-K3: Levert een product op</a:t>
+            </a:r>
+            <a:endParaRPr lang="nl-NL" b="0" i="0" dirty="0">
+              <a:solidFill>
+                <a:srgbClr val="404E54"/>
+              </a:solidFill>
+              <a:effectLst/>
+              <a:latin typeface="Open Sans" panose="020B0606030504020204" pitchFamily="34" charset="0"/>
+            </a:endParaRPr>
+          </a:p>
+          <a:p>
+            <a:pPr algn="l" fontAlgn="base">
+              <a:buFont typeface="Arial" panose="020B0604020202020204" pitchFamily="34" charset="0"/>
+              <a:buChar char="•"/>
+            </a:pPr>
+            <a:r>
+              <a:rPr lang="nl-NL" b="0" i="0" dirty="0">
+                <a:solidFill>
+                  <a:srgbClr val="7F7F7F"/>
+                </a:solidFill>
+                <a:effectLst/>
+                <a:latin typeface="Open Sans" panose="020B0606030504020204" pitchFamily="34" charset="0"/>
+              </a:rPr>
+              <a:t>B1-K3-W1: Optimaliseert het product</a:t>
+            </a:r>
+            <a:endParaRPr lang="nl-NL" b="0" i="0" dirty="0">
+              <a:solidFill>
+                <a:srgbClr val="404E54"/>
+              </a:solidFill>
+              <a:effectLst/>
+              <a:latin typeface="Open Sans" panose="020B0606030504020204" pitchFamily="34" charset="0"/>
+            </a:endParaRPr>
+          </a:p>
+          <a:p>
+            <a:pPr algn="l" fontAlgn="base">
+              <a:buFont typeface="Arial" panose="020B0604020202020204" pitchFamily="34" charset="0"/>
+              <a:buChar char="•"/>
+            </a:pPr>
+            <a:r>
+              <a:rPr lang="nl-NL" b="0" i="0" dirty="0">
+                <a:solidFill>
+                  <a:srgbClr val="7F7F7F"/>
+                </a:solidFill>
+                <a:effectLst/>
+                <a:latin typeface="Open Sans" panose="020B0606030504020204" pitchFamily="34" charset="0"/>
+              </a:rPr>
+              <a:t>B1-K3-W2: Levert het product op</a:t>
+            </a:r>
+            <a:endParaRPr lang="nl-NL" b="0" i="0" dirty="0">
+              <a:solidFill>
+                <a:srgbClr val="404E54"/>
+              </a:solidFill>
+              <a:effectLst/>
+              <a:latin typeface="Open Sans" panose="020B0606030504020204" pitchFamily="34" charset="0"/>
+            </a:endParaRPr>
+          </a:p>
+          <a:p>
+            <a:pPr algn="l" fontAlgn="base">
+              <a:buFont typeface="Arial" panose="020B0604020202020204" pitchFamily="34" charset="0"/>
+              <a:buChar char="•"/>
+            </a:pPr>
+            <a:r>
+              <a:rPr lang="nl-NL" b="0" i="0" dirty="0">
+                <a:solidFill>
+                  <a:srgbClr val="7F7F7F"/>
+                </a:solidFill>
+                <a:effectLst/>
+                <a:latin typeface="Open Sans" panose="020B0606030504020204" pitchFamily="34" charset="0"/>
+              </a:rPr>
+              <a:t>B1-K3-W3: Evalueert het opgeleverde product</a:t>
+            </a:r>
+            <a:endParaRPr lang="nl-NL" b="0" i="0" dirty="0">
+              <a:solidFill>
+                <a:srgbClr val="404E54"/>
+              </a:solidFill>
+              <a:effectLst/>
+              <a:latin typeface="Open Sans" panose="020B0606030504020204" pitchFamily="34" charset="0"/>
+            </a:endParaRPr>
+          </a:p>
+          <a:p>
+            <a:pPr algn="l" fontAlgn="base"/>
+            <a:br>
+              <a:rPr lang="nl-NL" b="0" i="0" dirty="0">
+                <a:solidFill>
+                  <a:srgbClr val="404E54"/>
+                </a:solidFill>
+                <a:effectLst/>
+                <a:latin typeface="Open Sans" panose="020B0606030504020204" pitchFamily="34" charset="0"/>
+              </a:rPr>
+            </a:br>
+            <a:endParaRPr lang="nl-NL" b="0" i="0" dirty="0">
+              <a:solidFill>
+                <a:srgbClr val="404E54"/>
+              </a:solidFill>
+              <a:effectLst/>
+              <a:latin typeface="Open Sans" panose="020B0606030504020204" pitchFamily="34" charset="0"/>
+            </a:endParaRPr>
+          </a:p>
+          <a:p>
+            <a:pPr algn="l" fontAlgn="base"/>
+            <a:r>
+              <a:rPr lang="nl-NL" b="1" i="0" dirty="0">
+                <a:solidFill>
+                  <a:srgbClr val="404E54"/>
+                </a:solidFill>
+                <a:effectLst/>
+                <a:latin typeface="inherit"/>
+              </a:rPr>
+              <a:t>P1: Profieldeel (alleen voor de opleiding Applicatie- en mediaontwikkelaar)</a:t>
+            </a:r>
+            <a:endParaRPr lang="nl-NL" b="0" i="0" dirty="0">
+              <a:solidFill>
+                <a:srgbClr val="404E54"/>
+              </a:solidFill>
+              <a:effectLst/>
+              <a:latin typeface="Open Sans" panose="020B0606030504020204" pitchFamily="34" charset="0"/>
+            </a:endParaRPr>
+          </a:p>
+          <a:p>
+            <a:pPr algn="l" fontAlgn="base"/>
+            <a:r>
+              <a:rPr lang="nl-NL" b="1" i="0" dirty="0">
+                <a:solidFill>
+                  <a:srgbClr val="404E54"/>
+                </a:solidFill>
+                <a:effectLst/>
+                <a:latin typeface="inherit"/>
+              </a:rPr>
+              <a:t>P1-K1: Onderhoudt en beheert de applicatie</a:t>
+            </a:r>
+            <a:endParaRPr lang="nl-NL" b="0" i="0" dirty="0">
+              <a:solidFill>
+                <a:srgbClr val="404E54"/>
+              </a:solidFill>
+              <a:effectLst/>
+              <a:latin typeface="Open Sans" panose="020B0606030504020204" pitchFamily="34" charset="0"/>
+            </a:endParaRPr>
+          </a:p>
+          <a:p>
+            <a:pPr algn="l" fontAlgn="base">
+              <a:buFont typeface="Arial" panose="020B0604020202020204" pitchFamily="34" charset="0"/>
+              <a:buChar char="•"/>
+            </a:pPr>
+            <a:r>
+              <a:rPr lang="nl-NL" b="0" i="0" dirty="0">
+                <a:solidFill>
+                  <a:srgbClr val="7F7F7F"/>
+                </a:solidFill>
+                <a:effectLst/>
+                <a:latin typeface="Open Sans" panose="020B0606030504020204" pitchFamily="34" charset="0"/>
+              </a:rPr>
+              <a:t>P1-K1-W1: Onderhoudt een applicatie</a:t>
+            </a:r>
+            <a:endParaRPr lang="nl-NL" b="0" i="0" dirty="0">
+              <a:solidFill>
+                <a:srgbClr val="404E54"/>
+              </a:solidFill>
+              <a:effectLst/>
+              <a:latin typeface="Open Sans" panose="020B0606030504020204" pitchFamily="34" charset="0"/>
+            </a:endParaRPr>
+          </a:p>
+          <a:p>
+            <a:pPr algn="l" fontAlgn="base">
+              <a:buFont typeface="Arial" panose="020B0604020202020204" pitchFamily="34" charset="0"/>
+              <a:buChar char="•"/>
+            </a:pPr>
+            <a:r>
+              <a:rPr lang="nl-NL" b="0" i="0" dirty="0">
+                <a:solidFill>
+                  <a:srgbClr val="7F7F7F"/>
+                </a:solidFill>
+                <a:effectLst/>
+                <a:latin typeface="Open Sans" panose="020B0606030504020204" pitchFamily="34" charset="0"/>
+              </a:rPr>
+              <a:t>P1-K1-W2: Beheert gegevens</a:t>
+            </a:r>
+            <a:endParaRPr lang="nl-NL" b="0" i="0" dirty="0">
+              <a:solidFill>
+                <a:srgbClr val="404E54"/>
+              </a:solidFill>
+              <a:effectLst/>
+              <a:latin typeface="Open Sans" panose="020B0606030504020204" pitchFamily="34" charset="0"/>
+            </a:endParaRPr>
+          </a:p>
+          <a:p>
+            <a:endParaRPr lang="en-GB" dirty="0"/>
+          </a:p>
+        </p:txBody>
+      </p:sp>
+      <p:sp>
+        <p:nvSpPr>
+          <p:cNvPr id="4" name="Slide Number Placeholder 3"/>
+          <p:cNvSpPr>
+            <a:spLocks noGrp="1"/>
+          </p:cNvSpPr>
+          <p:nvPr>
+            <p:ph type="sldNum" sz="quarter" idx="5"/>
+          </p:nvPr>
+        </p:nvSpPr>
+        <p:spPr/>
+        <p:txBody>
+          <a:bodyPr/>
+          <a:lstStyle/>
+          <a:p>
+            <a:fld id="{52099AE6-D359-4FCD-A62F-89FDA53DAB5C}" type="slidenum">
+              <a:rPr lang="en-GB" smtClean="0"/>
+              <a:t>5</a:t>
+            </a:fld>
+            <a:endParaRPr lang="en-GB"/>
+          </a:p>
+        </p:txBody>
+      </p:sp>
+    </p:spTree>
+    <p:extLst>
+      <p:ext uri="{BB962C8B-B14F-4D97-AF65-F5344CB8AC3E}">
+        <p14:creationId xmlns:p14="http://schemas.microsoft.com/office/powerpoint/2010/main" val="1770845027"/>
+      </p:ext>
+    </p:extLst>
+  </p:cSld>
+  <p:clrMapOvr>
+    <a:masterClrMapping/>
+  </p:clrMapOvr>
+</p:notes>
 </file>
 
 <file path=ppt/slideLayouts/slideLayout1.xml><?xml version="1.0" encoding="utf-8"?>
@@ -386,7 +1229,7 @@
           <a:p>
             <a:fld id="{78ABE3C1-DBE1-495D-B57B-2849774B866A}" type="datetimeFigureOut">
               <a:rPr lang="en-US" dirty="0"/>
-              <a:t>6/6/2021</a:t>
+              <a:t>6/7/2021</a:t>
             </a:fld>
             <a:endParaRPr lang="en-US" dirty="0"/>
           </a:p>
@@ -433,7 +1276,7 @@
           <a:p>
             <a:fld id="{6D22F896-40B5-4ADD-8801-0D06FADFA095}" type="slidenum">
               <a:rPr lang="en-US" dirty="0"/>
-              <a:t>‹nr.›</a:t>
+              <a:t>‹#›</a:t>
             </a:fld>
             <a:endParaRPr lang="en-US" dirty="0"/>
           </a:p>
@@ -795,7 +1638,7 @@
           <a:p>
             <a:fld id="{446C117F-5CCF-4837-BE5F-2B92066CAFAF}" type="datetimeFigureOut">
               <a:rPr lang="en-US" dirty="0"/>
-              <a:t>6/6/2021</a:t>
+              <a:t>6/7/2021</a:t>
             </a:fld>
             <a:endParaRPr lang="en-US" dirty="0"/>
           </a:p>
@@ -842,7 +1685,7 @@
           <a:p>
             <a:fld id="{6D22F896-40B5-4ADD-8801-0D06FADFA095}" type="slidenum">
               <a:rPr lang="en-US" dirty="0"/>
-              <a:t>‹nr.›</a:t>
+              <a:t>‹#›</a:t>
             </a:fld>
             <a:endParaRPr lang="en-US" dirty="0"/>
           </a:p>
@@ -1126,7 +1969,7 @@
           <a:p>
             <a:fld id="{84EB90BD-B6CE-46B7-997F-7313B992CCDC}" type="datetimeFigureOut">
               <a:rPr lang="en-US" dirty="0"/>
-              <a:t>6/6/2021</a:t>
+              <a:t>6/7/2021</a:t>
             </a:fld>
             <a:endParaRPr lang="en-US" dirty="0"/>
           </a:p>
@@ -1173,7 +2016,7 @@
           <a:p>
             <a:fld id="{6D22F896-40B5-4ADD-8801-0D06FADFA095}" type="slidenum">
               <a:rPr lang="en-US" dirty="0"/>
-              <a:t>‹nr.›</a:t>
+              <a:t>‹#›</a:t>
             </a:fld>
             <a:endParaRPr lang="en-US" dirty="0"/>
           </a:p>
@@ -1526,7 +2369,7 @@
           <a:p>
             <a:fld id="{CDB9D11F-B188-461D-B23F-39381795C052}" type="datetimeFigureOut">
               <a:rPr lang="en-US" dirty="0"/>
-              <a:t>6/6/2021</a:t>
+              <a:t>6/7/2021</a:t>
             </a:fld>
             <a:endParaRPr lang="en-US" dirty="0"/>
           </a:p>
@@ -1573,7 +2416,7 @@
           <a:p>
             <a:fld id="{6D22F896-40B5-4ADD-8801-0D06FADFA095}" type="slidenum">
               <a:rPr lang="en-US" dirty="0"/>
-              <a:t>‹nr.›</a:t>
+              <a:t>‹#›</a:t>
             </a:fld>
             <a:endParaRPr lang="en-US" dirty="0"/>
           </a:p>
@@ -2089,7 +2932,7 @@
           <a:p>
             <a:fld id="{52E6D8D9-55A2-4063-B0F3-121F44549695}" type="datetimeFigureOut">
               <a:rPr lang="en-US" dirty="0"/>
-              <a:t>6/6/2021</a:t>
+              <a:t>6/7/2021</a:t>
             </a:fld>
             <a:endParaRPr lang="en-US" dirty="0"/>
           </a:p>
@@ -2136,7 +2979,7 @@
           <a:p>
             <a:fld id="{6D22F896-40B5-4ADD-8801-0D06FADFA095}" type="slidenum">
               <a:rPr lang="en-US" dirty="0"/>
-              <a:t>‹nr.›</a:t>
+              <a:t>‹#›</a:t>
             </a:fld>
             <a:endParaRPr lang="en-US" dirty="0"/>
           </a:p>
@@ -2765,7 +3608,7 @@
           <a:p>
             <a:fld id="{D4B24536-994D-4021-A283-9F449C0DB509}" type="datetimeFigureOut">
               <a:rPr lang="en-US" dirty="0"/>
-              <a:t>6/6/2021</a:t>
+              <a:t>6/7/2021</a:t>
             </a:fld>
             <a:endParaRPr lang="en-US" dirty="0"/>
           </a:p>
@@ -2807,7 +3650,7 @@
           <a:p>
             <a:fld id="{6D22F896-40B5-4ADD-8801-0D06FADFA095}" type="slidenum">
               <a:rPr lang="en-US" dirty="0"/>
-              <a:t>‹nr.›</a:t>
+              <a:t>‹#›</a:t>
             </a:fld>
             <a:endParaRPr lang="en-US" dirty="0"/>
           </a:p>
@@ -3673,7 +4516,7 @@
           <a:p>
             <a:fld id="{3CBBBB78-C96F-47B7-AB17-D852CA960AC9}" type="datetimeFigureOut">
               <a:rPr lang="en-US" dirty="0"/>
-              <a:t>6/6/2021</a:t>
+              <a:t>6/7/2021</a:t>
             </a:fld>
             <a:endParaRPr lang="en-US" dirty="0"/>
           </a:p>
@@ -3715,7 +4558,7 @@
           <a:p>
             <a:fld id="{6D22F896-40B5-4ADD-8801-0D06FADFA095}" type="slidenum">
               <a:rPr lang="en-US" dirty="0"/>
-              <a:t>‹nr.›</a:t>
+              <a:t>‹#›</a:t>
             </a:fld>
             <a:endParaRPr lang="en-US" dirty="0"/>
           </a:p>
@@ -3981,7 +4824,7 @@
           <a:p>
             <a:fld id="{1FA3F48C-C7C6-4055-9F49-3777875E72AE}" type="datetimeFigureOut">
               <a:rPr lang="en-US" dirty="0"/>
-              <a:t>6/6/2021</a:t>
+              <a:t>6/7/2021</a:t>
             </a:fld>
             <a:endParaRPr lang="en-US" dirty="0"/>
           </a:p>
@@ -4023,7 +4866,7 @@
           <a:p>
             <a:fld id="{6D22F896-40B5-4ADD-8801-0D06FADFA095}" type="slidenum">
               <a:rPr lang="en-US" dirty="0"/>
-              <a:t>‹nr.›</a:t>
+              <a:t>‹#›</a:t>
             </a:fld>
             <a:endParaRPr lang="en-US" dirty="0"/>
           </a:p>
@@ -4240,7 +5083,7 @@
           <a:p>
             <a:fld id="{6178E61D-D431-422C-9764-11DAFE33AB63}" type="datetimeFigureOut">
               <a:rPr lang="en-US" dirty="0"/>
-              <a:t>6/6/2021</a:t>
+              <a:t>6/7/2021</a:t>
             </a:fld>
             <a:endParaRPr lang="en-US" dirty="0"/>
           </a:p>
@@ -4297,7 +5140,7 @@
             <a:fld id="{6D22F896-40B5-4ADD-8801-0D06FADFA095}" type="slidenum">
               <a:rPr lang="en-US" dirty="0"/>
               <a:pPr/>
-              <a:t>‹nr.›</a:t>
+              <a:t>‹#›</a:t>
             </a:fld>
             <a:endParaRPr lang="en-US" dirty="0"/>
           </a:p>
@@ -4559,7 +5402,7 @@
           <a:p>
             <a:fld id="{12DE42F4-6EEF-4EF7-8ED4-2208F0F89A08}" type="datetimeFigureOut">
               <a:rPr lang="en-US" dirty="0"/>
-              <a:t>6/6/2021</a:t>
+              <a:t>6/7/2021</a:t>
             </a:fld>
             <a:endParaRPr lang="en-US" dirty="0"/>
           </a:p>
@@ -4601,7 +5444,7 @@
           <a:p>
             <a:fld id="{6D22F896-40B5-4ADD-8801-0D06FADFA095}" type="slidenum">
               <a:rPr lang="en-US" dirty="0"/>
-              <a:t>‹nr.›</a:t>
+              <a:t>‹#›</a:t>
             </a:fld>
             <a:endParaRPr lang="en-US" dirty="0"/>
           </a:p>
@@ -4943,7 +5786,7 @@
           <a:p>
             <a:fld id="{30578ACC-22D6-47C1-A373-4FD133E34F3C}" type="datetimeFigureOut">
               <a:rPr lang="en-US" dirty="0"/>
-              <a:t>6/6/2021</a:t>
+              <a:t>6/7/2021</a:t>
             </a:fld>
             <a:endParaRPr lang="en-US" dirty="0"/>
           </a:p>
@@ -4990,7 +5833,7 @@
           <a:p>
             <a:fld id="{6D22F896-40B5-4ADD-8801-0D06FADFA095}" type="slidenum">
               <a:rPr lang="en-US" dirty="0"/>
-              <a:t>‹nr.›</a:t>
+              <a:t>‹#›</a:t>
             </a:fld>
             <a:endParaRPr lang="en-US" dirty="0"/>
           </a:p>
@@ -5314,7 +6157,7 @@
           <a:p>
             <a:fld id="{4E5A6C69-6797-4E8A-BF37-F2C3751466E9}" type="datetimeFigureOut">
               <a:rPr lang="en-US" dirty="0"/>
-              <a:t>6/6/2021</a:t>
+              <a:t>6/7/2021</a:t>
             </a:fld>
             <a:endParaRPr lang="en-US" dirty="0"/>
           </a:p>
@@ -5356,7 +6199,7 @@
           <a:p>
             <a:fld id="{6D22F896-40B5-4ADD-8801-0D06FADFA095}" type="slidenum">
               <a:rPr lang="en-US" dirty="0"/>
-              <a:t>‹nr.›</a:t>
+              <a:t>‹#›</a:t>
             </a:fld>
             <a:endParaRPr lang="en-US" dirty="0"/>
           </a:p>
@@ -5815,7 +6658,7 @@
           <a:p>
             <a:fld id="{D82014A1-A632-4878-A0D3-F52BA7563730}" type="datetimeFigureOut">
               <a:rPr lang="en-US" dirty="0"/>
-              <a:t>6/6/2021</a:t>
+              <a:t>6/7/2021</a:t>
             </a:fld>
             <a:endParaRPr lang="en-US" dirty="0"/>
           </a:p>
@@ -5857,7 +6700,7 @@
           <a:p>
             <a:fld id="{6D22F896-40B5-4ADD-8801-0D06FADFA095}" type="slidenum">
               <a:rPr lang="en-US" dirty="0"/>
-              <a:t>‹nr.›</a:t>
+              <a:t>‹#›</a:t>
             </a:fld>
             <a:endParaRPr lang="en-US" dirty="0"/>
           </a:p>
@@ -6067,7 +6910,7 @@
           <a:p>
             <a:fld id="{CE99F462-093F-4566-844B-4C71F2739DA5}" type="datetimeFigureOut">
               <a:rPr lang="en-US" dirty="0"/>
-              <a:t>6/6/2021</a:t>
+              <a:t>6/7/2021</a:t>
             </a:fld>
             <a:endParaRPr lang="en-US" dirty="0"/>
           </a:p>
@@ -6109,7 +6952,7 @@
           <a:p>
             <a:fld id="{6D22F896-40B5-4ADD-8801-0D06FADFA095}" type="slidenum">
               <a:rPr lang="en-US" dirty="0"/>
-              <a:t>‹nr.›</a:t>
+              <a:t>‹#›</a:t>
             </a:fld>
             <a:endParaRPr lang="en-US" dirty="0"/>
           </a:p>
@@ -6225,7 +7068,7 @@
           <a:p>
             <a:fld id="{3D24A7AC-904D-4781-85BA-7D10C17ED021}" type="datetimeFigureOut">
               <a:rPr lang="en-US" dirty="0"/>
-              <a:t>6/6/2021</a:t>
+              <a:t>6/7/2021</a:t>
             </a:fld>
             <a:endParaRPr lang="en-US" dirty="0"/>
           </a:p>
@@ -6267,7 +7110,7 @@
           <a:p>
             <a:fld id="{6D22F896-40B5-4ADD-8801-0D06FADFA095}" type="slidenum">
               <a:rPr lang="en-US" dirty="0"/>
-              <a:t>‹nr.›</a:t>
+              <a:t>‹#›</a:t>
             </a:fld>
             <a:endParaRPr lang="en-US" dirty="0"/>
           </a:p>
@@ -6610,7 +7453,7 @@
           <a:p>
             <a:fld id="{E331444B-B92B-4E27-8C94-BB93EAF5CB18}" type="datetimeFigureOut">
               <a:rPr lang="en-US" dirty="0"/>
-              <a:t>6/6/2021</a:t>
+              <a:t>6/7/2021</a:t>
             </a:fld>
             <a:endParaRPr lang="en-US" dirty="0"/>
           </a:p>
@@ -6652,7 +7495,7 @@
           <a:p>
             <a:fld id="{6D22F896-40B5-4ADD-8801-0D06FADFA095}" type="slidenum">
               <a:rPr lang="en-US" dirty="0"/>
-              <a:t>‹nr.›</a:t>
+              <a:t>‹#›</a:t>
             </a:fld>
             <a:endParaRPr lang="en-US" dirty="0"/>
           </a:p>
@@ -7014,7 +7857,7 @@
           <a:p>
             <a:fld id="{363EFA5E-FA76-400D-B3DC-F0BA90E6D107}" type="datetimeFigureOut">
               <a:rPr lang="en-US" dirty="0"/>
-              <a:t>6/6/2021</a:t>
+              <a:t>6/7/2021</a:t>
             </a:fld>
             <a:endParaRPr lang="en-US" dirty="0"/>
           </a:p>
@@ -7056,7 +7899,7 @@
           <a:p>
             <a:fld id="{6D22F896-40B5-4ADD-8801-0D06FADFA095}" type="slidenum">
               <a:rPr lang="en-US" dirty="0"/>
-              <a:t>‹nr.›</a:t>
+              <a:t>‹#›</a:t>
             </a:fld>
             <a:endParaRPr lang="en-US" dirty="0"/>
           </a:p>
@@ -7253,7 +8096,7 @@
           <a:p>
             <a:fld id="{9D6E9DEC-419B-4CC5-A080-3B06BD5A8291}" type="datetimeFigureOut">
               <a:rPr lang="en-US" dirty="0"/>
-              <a:t>6/6/2021</a:t>
+              <a:t>6/7/2021</a:t>
             </a:fld>
             <a:endParaRPr lang="en-US" dirty="0"/>
           </a:p>
@@ -7332,7 +8175,7 @@
             <a:fld id="{6D22F896-40B5-4ADD-8801-0D06FADFA095}" type="slidenum">
               <a:rPr lang="en-US" dirty="0"/>
               <a:pPr/>
-              <a:t>‹nr.›</a:t>
+              <a:t>‹#›</a:t>
             </a:fld>
             <a:endParaRPr lang="en-US" dirty="0"/>
           </a:p>
@@ -7741,6 +8584,842 @@
 </p:sld>
 </file>
 
+<file path=ppt/slides/slide10.xml><?xml version="1.0" encoding="utf-8"?>
+<p:sld xmlns:a="http://schemas.openxmlformats.org/drawingml/2006/main" xmlns:r="http://schemas.openxmlformats.org/officeDocument/2006/relationships" xmlns:p="http://schemas.openxmlformats.org/presentationml/2006/main">
+  <p:cSld>
+    <p:spTree>
+      <p:nvGrpSpPr>
+        <p:cNvPr id="1" name=""/>
+        <p:cNvGrpSpPr/>
+        <p:nvPr/>
+      </p:nvGrpSpPr>
+      <p:grpSpPr>
+        <a:xfrm>
+          <a:off x="0" y="0"/>
+          <a:ext cx="0" cy="0"/>
+          <a:chOff x="0" y="0"/>
+          <a:chExt cx="0" cy="0"/>
+        </a:xfrm>
+      </p:grpSpPr>
+      <p:sp>
+        <p:nvSpPr>
+          <p:cNvPr id="2" name="Title 1">
+            <a:extLst>
+              <a:ext uri="{FF2B5EF4-FFF2-40B4-BE49-F238E27FC236}">
+                <a16:creationId xmlns:a16="http://schemas.microsoft.com/office/drawing/2014/main" id="{C02E72A7-C3B8-4F86-8C7B-D32BAB95C2A3}"/>
+              </a:ext>
+            </a:extLst>
+          </p:cNvPr>
+          <p:cNvSpPr>
+            <a:spLocks noGrp="1"/>
+          </p:cNvSpPr>
+          <p:nvPr>
+            <p:ph type="title"/>
+          </p:nvPr>
+        </p:nvSpPr>
+        <p:spPr/>
+        <p:txBody>
+          <a:bodyPr/>
+          <a:lstStyle/>
+          <a:p>
+            <a:r>
+              <a:rPr lang="nl-NL" dirty="0"/>
+              <a:t>B1-K2-W1: Realiseert (onderdelen van) een product</a:t>
+            </a:r>
+            <a:endParaRPr lang="en-GB" dirty="0"/>
+          </a:p>
+        </p:txBody>
+      </p:sp>
+      <p:sp>
+        <p:nvSpPr>
+          <p:cNvPr id="3" name="Content Placeholder 2">
+            <a:extLst>
+              <a:ext uri="{FF2B5EF4-FFF2-40B4-BE49-F238E27FC236}">
+                <a16:creationId xmlns:a16="http://schemas.microsoft.com/office/drawing/2014/main" id="{41BD12E1-6D68-4681-A510-2D3BF13EC1F3}"/>
+              </a:ext>
+            </a:extLst>
+          </p:cNvPr>
+          <p:cNvSpPr>
+            <a:spLocks noGrp="1"/>
+          </p:cNvSpPr>
+          <p:nvPr>
+            <p:ph idx="1"/>
+          </p:nvPr>
+        </p:nvSpPr>
+        <p:spPr/>
+        <p:txBody>
+          <a:bodyPr/>
+          <a:lstStyle/>
+          <a:p>
+            <a:r>
+              <a:rPr lang="en-US" dirty="0"/>
+              <a:t>Product </a:t>
+            </a:r>
+            <a:r>
+              <a:rPr lang="en-US" dirty="0" err="1"/>
+              <a:t>gerealiseerd</a:t>
+            </a:r>
+            <a:r>
+              <a:rPr lang="en-US" dirty="0"/>
+              <a:t> met </a:t>
+            </a:r>
+            <a:r>
+              <a:rPr lang="en-US" dirty="0" err="1"/>
+              <a:t>behulp</a:t>
+            </a:r>
+            <a:r>
+              <a:rPr lang="en-US" dirty="0"/>
+              <a:t> van het </a:t>
+            </a:r>
+            <a:r>
+              <a:rPr lang="en-US" dirty="0" err="1"/>
+              <a:t>technisch</a:t>
+            </a:r>
+            <a:r>
+              <a:rPr lang="en-US" dirty="0"/>
+              <a:t> </a:t>
+            </a:r>
+            <a:r>
+              <a:rPr lang="en-US" dirty="0" err="1"/>
+              <a:t>en</a:t>
+            </a:r>
+            <a:r>
+              <a:rPr lang="en-US" dirty="0"/>
+              <a:t> </a:t>
+            </a:r>
+            <a:r>
+              <a:rPr lang="en-US" dirty="0" err="1"/>
+              <a:t>functioneel</a:t>
+            </a:r>
+            <a:r>
+              <a:rPr lang="en-US" dirty="0"/>
+              <a:t> </a:t>
+            </a:r>
+            <a:r>
+              <a:rPr lang="en-US" dirty="0" err="1"/>
+              <a:t>ontwerp</a:t>
+            </a:r>
+            <a:endParaRPr lang="en-US" dirty="0"/>
+          </a:p>
+          <a:p>
+            <a:r>
+              <a:rPr lang="en-US" dirty="0" err="1"/>
+              <a:t>Realisatielogboek</a:t>
+            </a:r>
+            <a:r>
+              <a:rPr lang="en-US" dirty="0"/>
+              <a:t> </a:t>
+            </a:r>
+            <a:r>
+              <a:rPr lang="en-US" dirty="0" err="1"/>
+              <a:t>gecreerd</a:t>
+            </a:r>
+            <a:r>
+              <a:rPr lang="en-US" dirty="0"/>
+              <a:t> </a:t>
+            </a:r>
+          </a:p>
+          <a:p>
+            <a:r>
+              <a:rPr lang="en-US" dirty="0" err="1"/>
+              <a:t>Creatiescript</a:t>
+            </a:r>
+            <a:r>
+              <a:rPr lang="en-US" dirty="0"/>
+              <a:t> database </a:t>
+            </a:r>
+            <a:r>
+              <a:rPr lang="en-US" dirty="0" err="1"/>
+              <a:t>verwerkt</a:t>
+            </a:r>
+            <a:endParaRPr lang="en-US" dirty="0"/>
+          </a:p>
+          <a:p>
+            <a:r>
+              <a:rPr lang="en-US" dirty="0" err="1"/>
+              <a:t>Broncode</a:t>
+            </a:r>
+            <a:r>
+              <a:rPr lang="en-US" dirty="0"/>
+              <a:t> </a:t>
+            </a:r>
+            <a:r>
+              <a:rPr lang="en-US" dirty="0" err="1"/>
+              <a:t>te</a:t>
+            </a:r>
+            <a:r>
+              <a:rPr lang="en-US" dirty="0"/>
+              <a:t> </a:t>
+            </a:r>
+            <a:r>
+              <a:rPr lang="en-US" dirty="0" err="1"/>
+              <a:t>verkrijgen</a:t>
+            </a:r>
+            <a:r>
+              <a:rPr lang="en-US" dirty="0"/>
+              <a:t> door </a:t>
+            </a:r>
+            <a:r>
+              <a:rPr lang="en-US" dirty="0" err="1"/>
+              <a:t>middel</a:t>
+            </a:r>
+            <a:r>
+              <a:rPr lang="en-US" dirty="0"/>
+              <a:t> van pdf </a:t>
+            </a:r>
+            <a:r>
+              <a:rPr lang="en-US" dirty="0" err="1"/>
+              <a:t>en</a:t>
+            </a:r>
+            <a:r>
+              <a:rPr lang="en-US" dirty="0"/>
+              <a:t> </a:t>
+            </a:r>
+            <a:r>
+              <a:rPr lang="en-US" dirty="0" err="1"/>
+              <a:t>github</a:t>
+            </a:r>
+            <a:endParaRPr lang="en-GB" dirty="0"/>
+          </a:p>
+        </p:txBody>
+      </p:sp>
+    </p:spTree>
+    <p:extLst>
+      <p:ext uri="{BB962C8B-B14F-4D97-AF65-F5344CB8AC3E}">
+        <p14:creationId xmlns:p14="http://schemas.microsoft.com/office/powerpoint/2010/main" val="3673079187"/>
+      </p:ext>
+    </p:extLst>
+  </p:cSld>
+  <p:clrMapOvr>
+    <a:masterClrMapping/>
+  </p:clrMapOvr>
+</p:sld>
+</file>
+
+<file path=ppt/slides/slide11.xml><?xml version="1.0" encoding="utf-8"?>
+<p:sld xmlns:a="http://schemas.openxmlformats.org/drawingml/2006/main" xmlns:r="http://schemas.openxmlformats.org/officeDocument/2006/relationships" xmlns:p="http://schemas.openxmlformats.org/presentationml/2006/main">
+  <p:cSld>
+    <p:spTree>
+      <p:nvGrpSpPr>
+        <p:cNvPr id="1" name=""/>
+        <p:cNvGrpSpPr/>
+        <p:nvPr/>
+      </p:nvGrpSpPr>
+      <p:grpSpPr>
+        <a:xfrm>
+          <a:off x="0" y="0"/>
+          <a:ext cx="0" cy="0"/>
+          <a:chOff x="0" y="0"/>
+          <a:chExt cx="0" cy="0"/>
+        </a:xfrm>
+      </p:grpSpPr>
+      <p:sp>
+        <p:nvSpPr>
+          <p:cNvPr id="2" name="Title 1">
+            <a:extLst>
+              <a:ext uri="{FF2B5EF4-FFF2-40B4-BE49-F238E27FC236}">
+                <a16:creationId xmlns:a16="http://schemas.microsoft.com/office/drawing/2014/main" id="{C54982A7-9346-4DE0-B9B5-D1BB18B1F8BB}"/>
+              </a:ext>
+            </a:extLst>
+          </p:cNvPr>
+          <p:cNvSpPr>
+            <a:spLocks noGrp="1"/>
+          </p:cNvSpPr>
+          <p:nvPr>
+            <p:ph type="title"/>
+          </p:nvPr>
+        </p:nvSpPr>
+        <p:spPr/>
+        <p:txBody>
+          <a:bodyPr/>
+          <a:lstStyle/>
+          <a:p>
+            <a:r>
+              <a:rPr lang="nl-NL" dirty="0"/>
+              <a:t>B1-K2-W2: Test het ontwikkelde product</a:t>
+            </a:r>
+            <a:endParaRPr lang="en-GB" dirty="0"/>
+          </a:p>
+        </p:txBody>
+      </p:sp>
+      <p:sp>
+        <p:nvSpPr>
+          <p:cNvPr id="3" name="Content Placeholder 2">
+            <a:extLst>
+              <a:ext uri="{FF2B5EF4-FFF2-40B4-BE49-F238E27FC236}">
+                <a16:creationId xmlns:a16="http://schemas.microsoft.com/office/drawing/2014/main" id="{AC72C516-C48E-43E4-9F17-64281F69365A}"/>
+              </a:ext>
+            </a:extLst>
+          </p:cNvPr>
+          <p:cNvSpPr>
+            <a:spLocks noGrp="1"/>
+          </p:cNvSpPr>
+          <p:nvPr>
+            <p:ph idx="1"/>
+          </p:nvPr>
+        </p:nvSpPr>
+        <p:spPr/>
+        <p:txBody>
+          <a:bodyPr/>
+          <a:lstStyle/>
+          <a:p>
+            <a:r>
+              <a:rPr lang="en-US" dirty="0"/>
+              <a:t>Product </a:t>
+            </a:r>
+            <a:r>
+              <a:rPr lang="en-US" dirty="0" err="1"/>
+              <a:t>systeemtest</a:t>
+            </a:r>
+            <a:r>
+              <a:rPr lang="en-US" dirty="0"/>
+              <a:t> </a:t>
+            </a:r>
+            <a:r>
+              <a:rPr lang="en-US" dirty="0" err="1"/>
+              <a:t>gemaakt</a:t>
+            </a:r>
+            <a:endParaRPr lang="en-US" dirty="0"/>
+          </a:p>
+          <a:p>
+            <a:r>
+              <a:rPr lang="en-US" dirty="0" err="1"/>
+              <a:t>Resultaten</a:t>
+            </a:r>
+            <a:r>
+              <a:rPr lang="en-US" dirty="0"/>
+              <a:t> </a:t>
+            </a:r>
+            <a:r>
+              <a:rPr lang="en-US" dirty="0" err="1"/>
+              <a:t>systeemtest</a:t>
+            </a:r>
+            <a:r>
+              <a:rPr lang="en-US" dirty="0"/>
+              <a:t> </a:t>
+            </a:r>
+            <a:r>
+              <a:rPr lang="en-US" dirty="0" err="1"/>
+              <a:t>verwerkt</a:t>
+            </a:r>
+            <a:endParaRPr lang="en-US" dirty="0"/>
+          </a:p>
+          <a:p>
+            <a:endParaRPr lang="en-GB" dirty="0"/>
+          </a:p>
+        </p:txBody>
+      </p:sp>
+    </p:spTree>
+    <p:extLst>
+      <p:ext uri="{BB962C8B-B14F-4D97-AF65-F5344CB8AC3E}">
+        <p14:creationId xmlns:p14="http://schemas.microsoft.com/office/powerpoint/2010/main" val="325980621"/>
+      </p:ext>
+    </p:extLst>
+  </p:cSld>
+  <p:clrMapOvr>
+    <a:masterClrMapping/>
+  </p:clrMapOvr>
+</p:sld>
+</file>
+
+<file path=ppt/slides/slide12.xml><?xml version="1.0" encoding="utf-8"?>
+<p:sld xmlns:a="http://schemas.openxmlformats.org/drawingml/2006/main" xmlns:r="http://schemas.openxmlformats.org/officeDocument/2006/relationships" xmlns:p="http://schemas.openxmlformats.org/presentationml/2006/main">
+  <p:cSld>
+    <p:spTree>
+      <p:nvGrpSpPr>
+        <p:cNvPr id="1" name=""/>
+        <p:cNvGrpSpPr/>
+        <p:nvPr/>
+      </p:nvGrpSpPr>
+      <p:grpSpPr>
+        <a:xfrm>
+          <a:off x="0" y="0"/>
+          <a:ext cx="0" cy="0"/>
+          <a:chOff x="0" y="0"/>
+          <a:chExt cx="0" cy="0"/>
+        </a:xfrm>
+      </p:grpSpPr>
+      <p:sp>
+        <p:nvSpPr>
+          <p:cNvPr id="2" name="Title 1">
+            <a:extLst>
+              <a:ext uri="{FF2B5EF4-FFF2-40B4-BE49-F238E27FC236}">
+                <a16:creationId xmlns:a16="http://schemas.microsoft.com/office/drawing/2014/main" id="{873CA7DD-331E-4BFD-ACEC-289F9EE402DA}"/>
+              </a:ext>
+            </a:extLst>
+          </p:cNvPr>
+          <p:cNvSpPr>
+            <a:spLocks noGrp="1"/>
+          </p:cNvSpPr>
+          <p:nvPr>
+            <p:ph type="title"/>
+          </p:nvPr>
+        </p:nvSpPr>
+        <p:spPr/>
+        <p:txBody>
+          <a:bodyPr/>
+          <a:lstStyle/>
+          <a:p>
+            <a:r>
+              <a:rPr lang="en-GB" dirty="0"/>
+              <a:t>B1-K3-W1: </a:t>
+            </a:r>
+            <a:r>
+              <a:rPr lang="en-GB" dirty="0" err="1"/>
+              <a:t>Optimaliseert</a:t>
+            </a:r>
+            <a:r>
+              <a:rPr lang="en-GB" dirty="0"/>
+              <a:t> het product</a:t>
+            </a:r>
+          </a:p>
+        </p:txBody>
+      </p:sp>
+      <p:sp>
+        <p:nvSpPr>
+          <p:cNvPr id="3" name="Content Placeholder 2">
+            <a:extLst>
+              <a:ext uri="{FF2B5EF4-FFF2-40B4-BE49-F238E27FC236}">
+                <a16:creationId xmlns:a16="http://schemas.microsoft.com/office/drawing/2014/main" id="{BB4CC38B-CE6E-44A5-8F2D-E5F6618BDD47}"/>
+              </a:ext>
+            </a:extLst>
+          </p:cNvPr>
+          <p:cNvSpPr>
+            <a:spLocks noGrp="1"/>
+          </p:cNvSpPr>
+          <p:nvPr>
+            <p:ph idx="1"/>
+          </p:nvPr>
+        </p:nvSpPr>
+        <p:spPr/>
+        <p:txBody>
+          <a:bodyPr/>
+          <a:lstStyle/>
+          <a:p>
+            <a:r>
+              <a:rPr lang="en-US" dirty="0" err="1"/>
+              <a:t>Proces</a:t>
+            </a:r>
+            <a:r>
+              <a:rPr lang="en-US" dirty="0"/>
+              <a:t>/Product </a:t>
+            </a:r>
+            <a:r>
+              <a:rPr lang="en-US" dirty="0" err="1"/>
+              <a:t>Acceptatietest</a:t>
+            </a:r>
+            <a:r>
+              <a:rPr lang="en-US" dirty="0"/>
+              <a:t> </a:t>
+            </a:r>
+            <a:r>
+              <a:rPr lang="en-US" dirty="0" err="1"/>
+              <a:t>gecreerd</a:t>
+            </a:r>
+            <a:r>
+              <a:rPr lang="en-US" dirty="0"/>
+              <a:t> </a:t>
+            </a:r>
+            <a:r>
+              <a:rPr lang="en-US" dirty="0" err="1"/>
+              <a:t>en</a:t>
+            </a:r>
+            <a:r>
+              <a:rPr lang="en-US" dirty="0"/>
+              <a:t> </a:t>
+            </a:r>
+            <a:r>
+              <a:rPr lang="en-US" dirty="0" err="1"/>
+              <a:t>uitgevoerd</a:t>
+            </a:r>
+            <a:r>
+              <a:rPr lang="en-US" dirty="0"/>
+              <a:t> met </a:t>
+            </a:r>
+            <a:r>
+              <a:rPr lang="en-US" dirty="0" err="1"/>
+              <a:t>Geerten</a:t>
+            </a:r>
+            <a:r>
+              <a:rPr lang="en-US" dirty="0"/>
+              <a:t> Vester</a:t>
+            </a:r>
+          </a:p>
+          <a:p>
+            <a:r>
+              <a:rPr lang="en-US" dirty="0"/>
+              <a:t>Na </a:t>
+            </a:r>
+            <a:r>
+              <a:rPr lang="en-US" dirty="0" err="1"/>
+              <a:t>opmerkiningen</a:t>
+            </a:r>
+            <a:r>
+              <a:rPr lang="en-US" dirty="0"/>
+              <a:t> </a:t>
+            </a:r>
+            <a:r>
+              <a:rPr lang="en-US" dirty="0" err="1"/>
+              <a:t>aanpassingen</a:t>
+            </a:r>
+            <a:r>
+              <a:rPr lang="en-US" dirty="0"/>
+              <a:t> </a:t>
+            </a:r>
+            <a:r>
+              <a:rPr lang="en-US" dirty="0" err="1"/>
+              <a:t>gemaakt</a:t>
+            </a:r>
+            <a:r>
+              <a:rPr lang="en-US" dirty="0"/>
+              <a:t> </a:t>
+            </a:r>
+            <a:r>
+              <a:rPr lang="en-US" dirty="0" err="1"/>
+              <a:t>en</a:t>
+            </a:r>
+            <a:r>
+              <a:rPr lang="en-US" dirty="0"/>
+              <a:t> </a:t>
+            </a:r>
+            <a:r>
+              <a:rPr lang="en-US" dirty="0" err="1"/>
+              <a:t>gedocumenteerd</a:t>
+            </a:r>
+            <a:endParaRPr lang="en-GB" dirty="0"/>
+          </a:p>
+        </p:txBody>
+      </p:sp>
+    </p:spTree>
+    <p:extLst>
+      <p:ext uri="{BB962C8B-B14F-4D97-AF65-F5344CB8AC3E}">
+        <p14:creationId xmlns:p14="http://schemas.microsoft.com/office/powerpoint/2010/main" val="1986179438"/>
+      </p:ext>
+    </p:extLst>
+  </p:cSld>
+  <p:clrMapOvr>
+    <a:masterClrMapping/>
+  </p:clrMapOvr>
+</p:sld>
+</file>
+
+<file path=ppt/slides/slide13.xml><?xml version="1.0" encoding="utf-8"?>
+<p:sld xmlns:a="http://schemas.openxmlformats.org/drawingml/2006/main" xmlns:r="http://schemas.openxmlformats.org/officeDocument/2006/relationships" xmlns:p="http://schemas.openxmlformats.org/presentationml/2006/main">
+  <p:cSld>
+    <p:spTree>
+      <p:nvGrpSpPr>
+        <p:cNvPr id="1" name=""/>
+        <p:cNvGrpSpPr/>
+        <p:nvPr/>
+      </p:nvGrpSpPr>
+      <p:grpSpPr>
+        <a:xfrm>
+          <a:off x="0" y="0"/>
+          <a:ext cx="0" cy="0"/>
+          <a:chOff x="0" y="0"/>
+          <a:chExt cx="0" cy="0"/>
+        </a:xfrm>
+      </p:grpSpPr>
+      <p:sp>
+        <p:nvSpPr>
+          <p:cNvPr id="2" name="Title 1">
+            <a:extLst>
+              <a:ext uri="{FF2B5EF4-FFF2-40B4-BE49-F238E27FC236}">
+                <a16:creationId xmlns:a16="http://schemas.microsoft.com/office/drawing/2014/main" id="{5F225E68-53CF-4F5E-B06A-F4AEAF41929F}"/>
+              </a:ext>
+            </a:extLst>
+          </p:cNvPr>
+          <p:cNvSpPr>
+            <a:spLocks noGrp="1"/>
+          </p:cNvSpPr>
+          <p:nvPr>
+            <p:ph type="title"/>
+          </p:nvPr>
+        </p:nvSpPr>
+        <p:spPr/>
+        <p:txBody>
+          <a:bodyPr/>
+          <a:lstStyle/>
+          <a:p>
+            <a:r>
+              <a:rPr lang="nl-NL" dirty="0"/>
+              <a:t>B1-K3-W2: Levert het product op</a:t>
+            </a:r>
+            <a:endParaRPr lang="en-GB" dirty="0"/>
+          </a:p>
+        </p:txBody>
+      </p:sp>
+      <p:sp>
+        <p:nvSpPr>
+          <p:cNvPr id="3" name="Content Placeholder 2">
+            <a:extLst>
+              <a:ext uri="{FF2B5EF4-FFF2-40B4-BE49-F238E27FC236}">
+                <a16:creationId xmlns:a16="http://schemas.microsoft.com/office/drawing/2014/main" id="{1052306D-4016-479F-82B5-10B9025ECADB}"/>
+              </a:ext>
+            </a:extLst>
+          </p:cNvPr>
+          <p:cNvSpPr>
+            <a:spLocks noGrp="1"/>
+          </p:cNvSpPr>
+          <p:nvPr>
+            <p:ph idx="1"/>
+          </p:nvPr>
+        </p:nvSpPr>
+        <p:spPr/>
+        <p:txBody>
+          <a:bodyPr/>
+          <a:lstStyle/>
+          <a:p>
+            <a:r>
+              <a:rPr lang="en-US" dirty="0" err="1"/>
+              <a:t>Presentatie</a:t>
+            </a:r>
+            <a:r>
+              <a:rPr lang="en-US" dirty="0"/>
+              <a:t> </a:t>
+            </a:r>
+            <a:r>
+              <a:rPr lang="en-US" dirty="0" err="1"/>
+              <a:t>gemaakt</a:t>
+            </a:r>
+            <a:r>
+              <a:rPr lang="en-US" dirty="0"/>
+              <a:t> over het product</a:t>
+            </a:r>
+          </a:p>
+          <a:p>
+            <a:r>
+              <a:rPr lang="en-US" dirty="0"/>
+              <a:t>Product </a:t>
+            </a:r>
+            <a:r>
+              <a:rPr lang="en-US" dirty="0" err="1"/>
+              <a:t>niet</a:t>
+            </a:r>
+            <a:r>
+              <a:rPr lang="en-US" dirty="0"/>
+              <a:t> in </a:t>
+            </a:r>
+            <a:r>
+              <a:rPr lang="en-US" dirty="0" err="1"/>
+              <a:t>productieomgeving</a:t>
+            </a:r>
+            <a:r>
+              <a:rPr lang="en-US" dirty="0"/>
+              <a:t> </a:t>
+            </a:r>
+            <a:r>
+              <a:rPr lang="en-US" dirty="0" err="1"/>
+              <a:t>opgenomen</a:t>
+            </a:r>
+            <a:r>
+              <a:rPr lang="en-US" dirty="0"/>
+              <a:t> </a:t>
+            </a:r>
+            <a:r>
+              <a:rPr lang="en-US" dirty="0" err="1"/>
+              <a:t>aangezien</a:t>
+            </a:r>
+            <a:r>
+              <a:rPr lang="en-US" dirty="0"/>
+              <a:t> er </a:t>
+            </a:r>
+            <a:r>
+              <a:rPr lang="en-US" dirty="0" err="1"/>
+              <a:t>geen</a:t>
+            </a:r>
+            <a:r>
+              <a:rPr lang="en-US" dirty="0"/>
+              <a:t> server is die de database host</a:t>
+            </a:r>
+            <a:endParaRPr lang="en-GB" dirty="0"/>
+          </a:p>
+        </p:txBody>
+      </p:sp>
+    </p:spTree>
+    <p:extLst>
+      <p:ext uri="{BB962C8B-B14F-4D97-AF65-F5344CB8AC3E}">
+        <p14:creationId xmlns:p14="http://schemas.microsoft.com/office/powerpoint/2010/main" val="3743386057"/>
+      </p:ext>
+    </p:extLst>
+  </p:cSld>
+  <p:clrMapOvr>
+    <a:masterClrMapping/>
+  </p:clrMapOvr>
+</p:sld>
+</file>
+
+<file path=ppt/slides/slide14.xml><?xml version="1.0" encoding="utf-8"?>
+<p:sld xmlns:a="http://schemas.openxmlformats.org/drawingml/2006/main" xmlns:r="http://schemas.openxmlformats.org/officeDocument/2006/relationships" xmlns:p="http://schemas.openxmlformats.org/presentationml/2006/main">
+  <p:cSld>
+    <p:spTree>
+      <p:nvGrpSpPr>
+        <p:cNvPr id="1" name=""/>
+        <p:cNvGrpSpPr/>
+        <p:nvPr/>
+      </p:nvGrpSpPr>
+      <p:grpSpPr>
+        <a:xfrm>
+          <a:off x="0" y="0"/>
+          <a:ext cx="0" cy="0"/>
+          <a:chOff x="0" y="0"/>
+          <a:chExt cx="0" cy="0"/>
+        </a:xfrm>
+      </p:grpSpPr>
+      <p:sp>
+        <p:nvSpPr>
+          <p:cNvPr id="2" name="Title 1">
+            <a:extLst>
+              <a:ext uri="{FF2B5EF4-FFF2-40B4-BE49-F238E27FC236}">
+                <a16:creationId xmlns:a16="http://schemas.microsoft.com/office/drawing/2014/main" id="{E8CFD4F0-425C-487D-A116-637F15C701E4}"/>
+              </a:ext>
+            </a:extLst>
+          </p:cNvPr>
+          <p:cNvSpPr>
+            <a:spLocks noGrp="1"/>
+          </p:cNvSpPr>
+          <p:nvPr>
+            <p:ph type="title"/>
+          </p:nvPr>
+        </p:nvSpPr>
+        <p:spPr/>
+        <p:txBody>
+          <a:bodyPr/>
+          <a:lstStyle/>
+          <a:p>
+            <a:r>
+              <a:rPr lang="nl-NL" dirty="0"/>
+              <a:t>B1-K3-W3: Evalueert het </a:t>
+            </a:r>
+            <a:r>
+              <a:rPr lang="nl-NL"/>
+              <a:t>opgeleverde product</a:t>
+            </a:r>
+            <a:endParaRPr lang="en-GB" dirty="0"/>
+          </a:p>
+        </p:txBody>
+      </p:sp>
+      <p:sp>
+        <p:nvSpPr>
+          <p:cNvPr id="3" name="Content Placeholder 2">
+            <a:extLst>
+              <a:ext uri="{FF2B5EF4-FFF2-40B4-BE49-F238E27FC236}">
+                <a16:creationId xmlns:a16="http://schemas.microsoft.com/office/drawing/2014/main" id="{4B586F5A-1310-40DB-BF05-FB5BBC56F60B}"/>
+              </a:ext>
+            </a:extLst>
+          </p:cNvPr>
+          <p:cNvSpPr>
+            <a:spLocks noGrp="1"/>
+          </p:cNvSpPr>
+          <p:nvPr>
+            <p:ph idx="1"/>
+          </p:nvPr>
+        </p:nvSpPr>
+        <p:spPr/>
+        <p:txBody>
+          <a:bodyPr/>
+          <a:lstStyle/>
+          <a:p>
+            <a:endParaRPr lang="en-GB" dirty="0"/>
+          </a:p>
+        </p:txBody>
+      </p:sp>
+    </p:spTree>
+    <p:extLst>
+      <p:ext uri="{BB962C8B-B14F-4D97-AF65-F5344CB8AC3E}">
+        <p14:creationId xmlns:p14="http://schemas.microsoft.com/office/powerpoint/2010/main" val="2636442521"/>
+      </p:ext>
+    </p:extLst>
+  </p:cSld>
+  <p:clrMapOvr>
+    <a:masterClrMapping/>
+  </p:clrMapOvr>
+</p:sld>
+</file>
+
+<file path=ppt/slides/slide15.xml><?xml version="1.0" encoding="utf-8"?>
+<p:sld xmlns:a="http://schemas.openxmlformats.org/drawingml/2006/main" xmlns:r="http://schemas.openxmlformats.org/officeDocument/2006/relationships" xmlns:p="http://schemas.openxmlformats.org/presentationml/2006/main">
+  <p:cSld>
+    <p:spTree>
+      <p:nvGrpSpPr>
+        <p:cNvPr id="1" name=""/>
+        <p:cNvGrpSpPr/>
+        <p:nvPr/>
+      </p:nvGrpSpPr>
+      <p:grpSpPr>
+        <a:xfrm>
+          <a:off x="0" y="0"/>
+          <a:ext cx="0" cy="0"/>
+          <a:chOff x="0" y="0"/>
+          <a:chExt cx="0" cy="0"/>
+        </a:xfrm>
+      </p:grpSpPr>
+      <p:sp>
+        <p:nvSpPr>
+          <p:cNvPr id="2" name="Titel 1">
+            <a:extLst>
+              <a:ext uri="{FF2B5EF4-FFF2-40B4-BE49-F238E27FC236}">
+                <a16:creationId xmlns:a16="http://schemas.microsoft.com/office/drawing/2014/main" id="{EF94D828-6CDA-40A8-A76E-2BDEEFCCCBEF}"/>
+              </a:ext>
+            </a:extLst>
+          </p:cNvPr>
+          <p:cNvSpPr>
+            <a:spLocks noGrp="1"/>
+          </p:cNvSpPr>
+          <p:nvPr>
+            <p:ph type="title"/>
+          </p:nvPr>
+        </p:nvSpPr>
+        <p:spPr/>
+        <p:txBody>
+          <a:bodyPr/>
+          <a:lstStyle/>
+          <a:p>
+            <a:r>
+              <a:rPr lang="nl-NL" dirty="0"/>
+              <a:t>Vragen</a:t>
+            </a:r>
+          </a:p>
+        </p:txBody>
+      </p:sp>
+      <p:sp>
+        <p:nvSpPr>
+          <p:cNvPr id="3" name="Tijdelijke aanduiding voor inhoud 2">
+            <a:extLst>
+              <a:ext uri="{FF2B5EF4-FFF2-40B4-BE49-F238E27FC236}">
+                <a16:creationId xmlns:a16="http://schemas.microsoft.com/office/drawing/2014/main" id="{4BEF679E-3AAF-4F5E-89F2-9DE9A3CD8B66}"/>
+              </a:ext>
+            </a:extLst>
+          </p:cNvPr>
+          <p:cNvSpPr>
+            <a:spLocks noGrp="1"/>
+          </p:cNvSpPr>
+          <p:nvPr>
+            <p:ph idx="1"/>
+          </p:nvPr>
+        </p:nvSpPr>
+        <p:spPr/>
+        <p:txBody>
+          <a:bodyPr/>
+          <a:lstStyle/>
+          <a:p>
+            <a:endParaRPr lang="nl-NL" dirty="0"/>
+          </a:p>
+        </p:txBody>
+      </p:sp>
+    </p:spTree>
+    <p:extLst>
+      <p:ext uri="{BB962C8B-B14F-4D97-AF65-F5344CB8AC3E}">
+        <p14:creationId xmlns:p14="http://schemas.microsoft.com/office/powerpoint/2010/main" val="2815304248"/>
+      </p:ext>
+    </p:extLst>
+  </p:cSld>
+  <p:clrMapOvr>
+    <a:masterClrMapping/>
+  </p:clrMapOvr>
+</p:sld>
+</file>
+
 <file path=ppt/slides/slide2.xml><?xml version="1.0" encoding="utf-8"?>
 <p:sld xmlns:a="http://schemas.openxmlformats.org/drawingml/2006/main" xmlns:r="http://schemas.openxmlformats.org/officeDocument/2006/relationships" xmlns:p="http://schemas.openxmlformats.org/presentationml/2006/main">
   <p:cSld>
@@ -7914,6 +9593,15 @@
             </a:r>
           </a:p>
           <a:p>
+            <a:r>
+              <a:rPr lang="nl-NL" dirty="0"/>
+              <a:t>Technische Documenten</a:t>
+            </a:r>
+          </a:p>
+          <a:p>
+            <a:endParaRPr lang="nl-NL" dirty="0"/>
+          </a:p>
+          <a:p>
             <a:endParaRPr lang="nl-NL" dirty="0"/>
           </a:p>
         </p:txBody>
@@ -8013,7 +9701,21 @@
             </a:r>
             <a:r>
               <a:rPr lang="nl-NL" dirty="0"/>
-              <a:t>”</a:t>
+              <a:t>”.</a:t>
+            </a:r>
+          </a:p>
+          <a:p>
+            <a:r>
+              <a:rPr lang="nl-NL" dirty="0"/>
+              <a:t>Gegevens: Tellerstand, Status cartridges en </a:t>
+            </a:r>
+            <a:r>
+              <a:rPr lang="nl-NL" dirty="0" err="1"/>
+              <a:t>evt</a:t>
+            </a:r>
+            <a:r>
+              <a:rPr lang="nl-NL" dirty="0"/>
+              <a:t> Storingen</a:t>
             </a:r>
           </a:p>
           <a:p>
@@ -8100,7 +9802,73 @@
           <a:bodyPr/>
           <a:lstStyle/>
           <a:p>
-            <a:endParaRPr lang="nl-NL" dirty="0"/>
+            <a:r>
+              <a:rPr lang="nl-NL" dirty="0"/>
+              <a:t>Documenten gemaakt</a:t>
+            </a:r>
+          </a:p>
+          <a:p>
+            <a:pPr lvl="1"/>
+            <a:r>
+              <a:rPr lang="nl-NL" dirty="0"/>
+              <a:t>Programma van eisen</a:t>
+            </a:r>
+          </a:p>
+          <a:p>
+            <a:pPr lvl="1"/>
+            <a:r>
+              <a:rPr lang="nl-NL" dirty="0"/>
+              <a:t>Projectplan</a:t>
+            </a:r>
+          </a:p>
+          <a:p>
+            <a:pPr lvl="1"/>
+            <a:r>
+              <a:rPr lang="nl-NL" dirty="0"/>
+              <a:t>Functioneel ontwerp</a:t>
+            </a:r>
+          </a:p>
+          <a:p>
+            <a:pPr lvl="1"/>
+            <a:r>
+              <a:rPr lang="nl-NL" dirty="0"/>
+              <a:t>Technisch ontwerp</a:t>
+            </a:r>
+          </a:p>
+          <a:p>
+            <a:pPr lvl="1"/>
+            <a:r>
+              <a:rPr lang="nl-NL" dirty="0"/>
+              <a:t>Configuratiebestand</a:t>
+            </a:r>
+          </a:p>
+          <a:p>
+            <a:pPr lvl="1"/>
+            <a:r>
+              <a:rPr lang="nl-NL" dirty="0"/>
+              <a:t>Systeemtestplan</a:t>
+            </a:r>
+          </a:p>
+          <a:p>
+            <a:pPr lvl="1"/>
+            <a:r>
+              <a:rPr lang="nl-NL" dirty="0"/>
+              <a:t>Acceptatietestplan</a:t>
+            </a:r>
+          </a:p>
+          <a:p>
+            <a:pPr lvl="1"/>
+            <a:r>
+              <a:rPr lang="nl-NL" dirty="0"/>
+              <a:t>Evaluatie</a:t>
+            </a:r>
+          </a:p>
+          <a:p>
+            <a:pPr lvl="1"/>
+            <a:r>
+              <a:rPr lang="nl-NL" dirty="0"/>
+              <a:t>Kwaliteitshandboek</a:t>
+            </a:r>
           </a:p>
         </p:txBody>
       </p:sp>
@@ -8136,10 +9904,10 @@
       </p:grpSpPr>
       <p:sp>
         <p:nvSpPr>
-          <p:cNvPr id="2" name="Titel 1">
+          <p:cNvPr id="2" name="Title 1">
             <a:extLst>
               <a:ext uri="{FF2B5EF4-FFF2-40B4-BE49-F238E27FC236}">
-                <a16:creationId xmlns:a16="http://schemas.microsoft.com/office/drawing/2014/main" id="{EF94D828-6CDA-40A8-A76E-2BDEEFCCCBEF}"/>
+                <a16:creationId xmlns:a16="http://schemas.microsoft.com/office/drawing/2014/main" id="{68CCEABF-62B9-4D3C-92D0-001A5822D0B4}"/>
               </a:ext>
             </a:extLst>
           </p:cNvPr>
@@ -8157,17 +9925,18 @@
           <a:p>
             <a:r>
               <a:rPr lang="nl-NL" dirty="0"/>
-              <a:t>Vragen</a:t>
-            </a:r>
-          </a:p>
-        </p:txBody>
-      </p:sp>
-      <p:sp>
-        <p:nvSpPr>
-          <p:cNvPr id="3" name="Tijdelijke aanduiding voor inhoud 2">
+              <a:t>B1-K1-W1: Stelt de opdracht vast</a:t>
+            </a:r>
+            <a:endParaRPr lang="en-GB" dirty="0"/>
+          </a:p>
+        </p:txBody>
+      </p:sp>
+      <p:sp>
+        <p:nvSpPr>
+          <p:cNvPr id="3" name="Content Placeholder 2">
             <a:extLst>
               <a:ext uri="{FF2B5EF4-FFF2-40B4-BE49-F238E27FC236}">
-                <a16:creationId xmlns:a16="http://schemas.microsoft.com/office/drawing/2014/main" id="{4BEF679E-3AAF-4F5E-89F2-9DE9A3CD8B66}"/>
+                <a16:creationId xmlns:a16="http://schemas.microsoft.com/office/drawing/2014/main" id="{BD6700F8-1238-4337-97D9-13AA6576A38D}"/>
               </a:ext>
             </a:extLst>
           </p:cNvPr>
@@ -8183,14 +9952,323 @@
           <a:bodyPr/>
           <a:lstStyle/>
           <a:p>
+            <a:pPr lvl="1"/>
+            <a:r>
+              <a:rPr lang="nl-NL" dirty="0"/>
+              <a:t>Vastgesteld door middel van interviews en eerder gemaakte documentatie (Proces)</a:t>
+            </a:r>
+          </a:p>
+          <a:p>
+            <a:pPr lvl="1"/>
+            <a:r>
+              <a:rPr lang="nl-NL" dirty="0"/>
+              <a:t>Product programma van eisen gemaakt met behulp van sjabloon</a:t>
+            </a:r>
+          </a:p>
+          <a:p>
+            <a:pPr lvl="1"/>
             <a:endParaRPr lang="nl-NL" dirty="0"/>
+          </a:p>
+          <a:p>
+            <a:endParaRPr lang="en-GB" dirty="0"/>
           </a:p>
         </p:txBody>
       </p:sp>
     </p:spTree>
     <p:extLst>
       <p:ext uri="{BB962C8B-B14F-4D97-AF65-F5344CB8AC3E}">
-        <p14:creationId xmlns:p14="http://schemas.microsoft.com/office/powerpoint/2010/main" val="2815304248"/>
+        <p14:creationId xmlns:p14="http://schemas.microsoft.com/office/powerpoint/2010/main" val="721552983"/>
+      </p:ext>
+    </p:extLst>
+  </p:cSld>
+  <p:clrMapOvr>
+    <a:masterClrMapping/>
+  </p:clrMapOvr>
+</p:sld>
+</file>
+
+<file path=ppt/slides/slide7.xml><?xml version="1.0" encoding="utf-8"?>
+<p:sld xmlns:a="http://schemas.openxmlformats.org/drawingml/2006/main" xmlns:r="http://schemas.openxmlformats.org/officeDocument/2006/relationships" xmlns:p="http://schemas.openxmlformats.org/presentationml/2006/main">
+  <p:cSld>
+    <p:spTree>
+      <p:nvGrpSpPr>
+        <p:cNvPr id="1" name=""/>
+        <p:cNvGrpSpPr/>
+        <p:nvPr/>
+      </p:nvGrpSpPr>
+      <p:grpSpPr>
+        <a:xfrm>
+          <a:off x="0" y="0"/>
+          <a:ext cx="0" cy="0"/>
+          <a:chOff x="0" y="0"/>
+          <a:chExt cx="0" cy="0"/>
+        </a:xfrm>
+      </p:grpSpPr>
+      <p:sp>
+        <p:nvSpPr>
+          <p:cNvPr id="2" name="Title 1">
+            <a:extLst>
+              <a:ext uri="{FF2B5EF4-FFF2-40B4-BE49-F238E27FC236}">
+                <a16:creationId xmlns:a16="http://schemas.microsoft.com/office/drawing/2014/main" id="{163B9443-8968-4ABC-9BA3-D93C90A21ED6}"/>
+              </a:ext>
+            </a:extLst>
+          </p:cNvPr>
+          <p:cNvSpPr>
+            <a:spLocks noGrp="1"/>
+          </p:cNvSpPr>
+          <p:nvPr>
+            <p:ph type="title"/>
+          </p:nvPr>
+        </p:nvSpPr>
+        <p:spPr/>
+        <p:txBody>
+          <a:bodyPr>
+            <a:normAutofit/>
+          </a:bodyPr>
+          <a:lstStyle/>
+          <a:p>
+            <a:r>
+              <a:rPr lang="nl-NL" dirty="0"/>
+              <a:t>B1-K1-W2: Levert een bijdrage aan het projectplan</a:t>
+            </a:r>
+            <a:endParaRPr lang="en-GB" dirty="0"/>
+          </a:p>
+        </p:txBody>
+      </p:sp>
+      <p:sp>
+        <p:nvSpPr>
+          <p:cNvPr id="3" name="Content Placeholder 2">
+            <a:extLst>
+              <a:ext uri="{FF2B5EF4-FFF2-40B4-BE49-F238E27FC236}">
+                <a16:creationId xmlns:a16="http://schemas.microsoft.com/office/drawing/2014/main" id="{A14A2C93-8C87-401D-98A8-3DC362E74175}"/>
+              </a:ext>
+            </a:extLst>
+          </p:cNvPr>
+          <p:cNvSpPr>
+            <a:spLocks noGrp="1"/>
+          </p:cNvSpPr>
+          <p:nvPr>
+            <p:ph idx="1"/>
+          </p:nvPr>
+        </p:nvSpPr>
+        <p:spPr/>
+        <p:txBody>
+          <a:bodyPr/>
+          <a:lstStyle/>
+          <a:p>
+            <a:pPr lvl="1"/>
+            <a:r>
+              <a:rPr lang="nl-NL" dirty="0"/>
+              <a:t>Product projectplan gemaakt met behulp van Sjabloon</a:t>
+            </a:r>
+          </a:p>
+          <a:p>
+            <a:pPr lvl="1"/>
+            <a:r>
+              <a:rPr lang="nl-NL" dirty="0"/>
+              <a:t>Product strokenplanning verwerkt in het projectplan</a:t>
+            </a:r>
+          </a:p>
+          <a:p>
+            <a:endParaRPr lang="en-GB" dirty="0"/>
+          </a:p>
+        </p:txBody>
+      </p:sp>
+    </p:spTree>
+    <p:extLst>
+      <p:ext uri="{BB962C8B-B14F-4D97-AF65-F5344CB8AC3E}">
+        <p14:creationId xmlns:p14="http://schemas.microsoft.com/office/powerpoint/2010/main" val="1765425242"/>
+      </p:ext>
+    </p:extLst>
+  </p:cSld>
+  <p:clrMapOvr>
+    <a:masterClrMapping/>
+  </p:clrMapOvr>
+</p:sld>
+</file>
+
+<file path=ppt/slides/slide8.xml><?xml version="1.0" encoding="utf-8"?>
+<p:sld xmlns:a="http://schemas.openxmlformats.org/drawingml/2006/main" xmlns:r="http://schemas.openxmlformats.org/officeDocument/2006/relationships" xmlns:p="http://schemas.openxmlformats.org/presentationml/2006/main">
+  <p:cSld>
+    <p:spTree>
+      <p:nvGrpSpPr>
+        <p:cNvPr id="1" name=""/>
+        <p:cNvGrpSpPr/>
+        <p:nvPr/>
+      </p:nvGrpSpPr>
+      <p:grpSpPr>
+        <a:xfrm>
+          <a:off x="0" y="0"/>
+          <a:ext cx="0" cy="0"/>
+          <a:chOff x="0" y="0"/>
+          <a:chExt cx="0" cy="0"/>
+        </a:xfrm>
+      </p:grpSpPr>
+      <p:sp>
+        <p:nvSpPr>
+          <p:cNvPr id="2" name="Title 1">
+            <a:extLst>
+              <a:ext uri="{FF2B5EF4-FFF2-40B4-BE49-F238E27FC236}">
+                <a16:creationId xmlns:a16="http://schemas.microsoft.com/office/drawing/2014/main" id="{458039A1-A84D-482B-9D53-0F7E7783FBDA}"/>
+              </a:ext>
+            </a:extLst>
+          </p:cNvPr>
+          <p:cNvSpPr>
+            <a:spLocks noGrp="1"/>
+          </p:cNvSpPr>
+          <p:nvPr>
+            <p:ph type="title"/>
+          </p:nvPr>
+        </p:nvSpPr>
+        <p:spPr/>
+        <p:txBody>
+          <a:bodyPr>
+            <a:normAutofit/>
+          </a:bodyPr>
+          <a:lstStyle/>
+          <a:p>
+            <a:r>
+              <a:rPr lang="nl-NL" dirty="0"/>
+              <a:t>B1-K1-W3: Levert een bijdrage aan het ontwerp</a:t>
+            </a:r>
+            <a:endParaRPr lang="en-GB" dirty="0"/>
+          </a:p>
+        </p:txBody>
+      </p:sp>
+      <p:sp>
+        <p:nvSpPr>
+          <p:cNvPr id="3" name="Content Placeholder 2">
+            <a:extLst>
+              <a:ext uri="{FF2B5EF4-FFF2-40B4-BE49-F238E27FC236}">
+                <a16:creationId xmlns:a16="http://schemas.microsoft.com/office/drawing/2014/main" id="{2AEE3E25-8BCC-4252-9C3E-0D3C31A84882}"/>
+              </a:ext>
+            </a:extLst>
+          </p:cNvPr>
+          <p:cNvSpPr>
+            <a:spLocks noGrp="1"/>
+          </p:cNvSpPr>
+          <p:nvPr>
+            <p:ph idx="1"/>
+          </p:nvPr>
+        </p:nvSpPr>
+        <p:spPr/>
+        <p:txBody>
+          <a:bodyPr/>
+          <a:lstStyle/>
+          <a:p>
+            <a:pPr lvl="1"/>
+            <a:r>
+              <a:rPr lang="nl-NL" dirty="0"/>
+              <a:t>Product functioneel ontwerp gemaakt met behulp van sjabloon</a:t>
+            </a:r>
+          </a:p>
+          <a:p>
+            <a:pPr lvl="1"/>
+            <a:r>
+              <a:rPr lang="nl-NL" dirty="0"/>
+              <a:t>Product technisch ontwerp gemaakt met behulp van sjabloon</a:t>
+            </a:r>
+          </a:p>
+          <a:p>
+            <a:endParaRPr lang="en-GB" dirty="0"/>
+          </a:p>
+        </p:txBody>
+      </p:sp>
+    </p:spTree>
+    <p:extLst>
+      <p:ext uri="{BB962C8B-B14F-4D97-AF65-F5344CB8AC3E}">
+        <p14:creationId xmlns:p14="http://schemas.microsoft.com/office/powerpoint/2010/main" val="2111454828"/>
+      </p:ext>
+    </p:extLst>
+  </p:cSld>
+  <p:clrMapOvr>
+    <a:masterClrMapping/>
+  </p:clrMapOvr>
+</p:sld>
+</file>
+
+<file path=ppt/slides/slide9.xml><?xml version="1.0" encoding="utf-8"?>
+<p:sld xmlns:a="http://schemas.openxmlformats.org/drawingml/2006/main" xmlns:r="http://schemas.openxmlformats.org/officeDocument/2006/relationships" xmlns:p="http://schemas.openxmlformats.org/presentationml/2006/main">
+  <p:cSld>
+    <p:spTree>
+      <p:nvGrpSpPr>
+        <p:cNvPr id="1" name=""/>
+        <p:cNvGrpSpPr/>
+        <p:nvPr/>
+      </p:nvGrpSpPr>
+      <p:grpSpPr>
+        <a:xfrm>
+          <a:off x="0" y="0"/>
+          <a:ext cx="0" cy="0"/>
+          <a:chOff x="0" y="0"/>
+          <a:chExt cx="0" cy="0"/>
+        </a:xfrm>
+      </p:grpSpPr>
+      <p:sp>
+        <p:nvSpPr>
+          <p:cNvPr id="2" name="Title 1">
+            <a:extLst>
+              <a:ext uri="{FF2B5EF4-FFF2-40B4-BE49-F238E27FC236}">
+                <a16:creationId xmlns:a16="http://schemas.microsoft.com/office/drawing/2014/main" id="{4AA2C044-7020-4F0E-96E3-5B0169059087}"/>
+              </a:ext>
+            </a:extLst>
+          </p:cNvPr>
+          <p:cNvSpPr>
+            <a:spLocks noGrp="1"/>
+          </p:cNvSpPr>
+          <p:nvPr>
+            <p:ph type="title"/>
+          </p:nvPr>
+        </p:nvSpPr>
+        <p:spPr/>
+        <p:txBody>
+          <a:bodyPr/>
+          <a:lstStyle/>
+          <a:p>
+            <a:r>
+              <a:rPr lang="nl-NL" dirty="0"/>
+              <a:t>B1-K1-W4: Bereidt de realisatie voor</a:t>
+            </a:r>
+            <a:endParaRPr lang="en-GB" dirty="0"/>
+          </a:p>
+        </p:txBody>
+      </p:sp>
+      <p:sp>
+        <p:nvSpPr>
+          <p:cNvPr id="3" name="Content Placeholder 2">
+            <a:extLst>
+              <a:ext uri="{FF2B5EF4-FFF2-40B4-BE49-F238E27FC236}">
+                <a16:creationId xmlns:a16="http://schemas.microsoft.com/office/drawing/2014/main" id="{DE4AFB02-1403-46FE-9154-975A3F4F677A}"/>
+              </a:ext>
+            </a:extLst>
+          </p:cNvPr>
+          <p:cNvSpPr>
+            <a:spLocks noGrp="1"/>
+          </p:cNvSpPr>
+          <p:nvPr>
+            <p:ph idx="1"/>
+          </p:nvPr>
+        </p:nvSpPr>
+        <p:spPr/>
+        <p:txBody>
+          <a:bodyPr/>
+          <a:lstStyle/>
+          <a:p>
+            <a:r>
+              <a:rPr lang="nl-NL" dirty="0"/>
+              <a:t>Product configuratieoverzicht gemaakt met behulp van sjabloon</a:t>
+            </a:r>
+            <a:endParaRPr lang="en-GB" dirty="0"/>
+          </a:p>
+          <a:p>
+            <a:endParaRPr lang="en-GB" dirty="0"/>
+          </a:p>
+        </p:txBody>
+      </p:sp>
+    </p:spTree>
+    <p:extLst>
+      <p:ext uri="{BB962C8B-B14F-4D97-AF65-F5344CB8AC3E}">
+        <p14:creationId xmlns:p14="http://schemas.microsoft.com/office/powerpoint/2010/main" val="4241215244"/>
       </p:ext>
     </p:extLst>
   </p:cSld>
@@ -8452,4 +10530,299 @@
     </a:ext>
   </a:extLst>
 </a:theme>
+</file>
+
+<file path=ppt/theme/theme2.xml><?xml version="1.0" encoding="utf-8"?>
+<a:theme xmlns:a="http://schemas.openxmlformats.org/drawingml/2006/main" name="Office Theme">
+  <a:themeElements>
+    <a:clrScheme name="Office">
+      <a:dk1>
+        <a:sysClr val="windowText" lastClr="000000"/>
+      </a:dk1>
+      <a:lt1>
+        <a:sysClr val="window" lastClr="FFFFFF"/>
+      </a:lt1>
+      <a:dk2>
+        <a:srgbClr val="44546A"/>
+      </a:dk2>
+      <a:lt2>
+        <a:srgbClr val="E7E6E6"/>
+      </a:lt2>
+      <a:accent1>
+        <a:srgbClr val="4472C4"/>
+      </a:accent1>
+      <a:accent2>
+        <a:srgbClr val="ED7D31"/>
+      </a:accent2>
+      <a:accent3>
+        <a:srgbClr val="A5A5A5"/>
+      </a:accent3>
+      <a:accent4>
+        <a:srgbClr val="FFC000"/>
+      </a:accent4>
+      <a:accent5>
+        <a:srgbClr val="5B9BD5"/>
+      </a:accent5>
+      <a:accent6>
+        <a:srgbClr val="70AD47"/>
+      </a:accent6>
+      <a:hlink>
+        <a:srgbClr val="0563C1"/>
+      </a:hlink>
+      <a:folHlink>
+        <a:srgbClr val="954F72"/>
+      </a:folHlink>
+    </a:clrScheme>
+    <a:fontScheme name="Office">
+      <a:majorFont>
+        <a:latin typeface="Calibri Light" panose="020F0302020204030204"/>
+        <a:ea typeface=""/>
+        <a:cs typeface=""/>
+        <a:font script="Jpan" typeface="游ゴシック Light"/>
+        <a:font script="Hang" typeface="맑은 고딕"/>
+        <a:font script="Hans" typeface="等线 Light"/>
+        <a:font script="Hant" typeface="新細明體"/>
+        <a:font script="Arab" typeface="Times New Roman"/>
+        <a:font script="Hebr" typeface="Times New Roman"/>
+        <a:font script="Thai" typeface="Angsana New"/>
+        <a:font script="Ethi" typeface="Nyala"/>
+        <a:font script="Beng" typeface="Vrinda"/>
+        <a:font script="Gujr" typeface="Shruti"/>
+        <a:font script="Khmr" typeface="MoolBoran"/>
+        <a:font script="Knda" typeface="Tunga"/>
+        <a:font script="Guru" typeface="Raavi"/>
+        <a:font script="Cans" typeface="Euphemia"/>
+        <a:font script="Cher" typeface="Plantagenet Cherokee"/>
+        <a:font script="Yiii" typeface="Microsoft Yi Baiti"/>
+        <a:font script="Tibt" typeface="Microsoft Himalaya"/>
+        <a:font script="Thaa" typeface="MV Boli"/>
+        <a:font script="Deva" typeface="Mangal"/>
+        <a:font script="Telu" typeface="Gautami"/>
+        <a:font script="Taml" typeface="Latha"/>
+        <a:font script="Syrc" typeface="Estrangelo Edessa"/>
+        <a:font script="Orya" typeface="Kalinga"/>
+        <a:font script="Mlym" typeface="Kartika"/>
+        <a:font script="Laoo" typeface="DokChampa"/>
+        <a:font script="Sinh" typeface="Iskoola Pota"/>
+        <a:font script="Mong" typeface="Mongolian Baiti"/>
+        <a:font script="Viet" typeface="Times New Roman"/>
+        <a:font script="Uigh" typeface="Microsoft Uighur"/>
+        <a:font script="Geor" typeface="Sylfaen"/>
+        <a:font script="Armn" typeface="Arial"/>
+        <a:font script="Bugi" typeface="Leelawadee UI"/>
+        <a:font script="Bopo" typeface="Microsoft JhengHei"/>
+        <a:font script="Java" typeface="Javanese Text"/>
+        <a:font script="Lisu" typeface="Segoe UI"/>
+        <a:font script="Mymr" typeface="Myanmar Text"/>
+        <a:font script="Nkoo" typeface="Ebrima"/>
+        <a:font script="Olck" typeface="Nirmala UI"/>
+        <a:font script="Osma" typeface="Ebrima"/>
+        <a:font script="Phag" typeface="Phagspa"/>
+        <a:font script="Syrn" typeface="Estrangelo Edessa"/>
+        <a:font script="Syrj" typeface="Estrangelo Edessa"/>
+        <a:font script="Syre" typeface="Estrangelo Edessa"/>
+        <a:font script="Sora" typeface="Nirmala UI"/>
+        <a:font script="Tale" typeface="Microsoft Tai Le"/>
+        <a:font script="Talu" typeface="Microsoft New Tai Lue"/>
+        <a:font script="Tfng" typeface="Ebrima"/>
+      </a:majorFont>
+      <a:minorFont>
+        <a:latin typeface="Calibri" panose="020F0502020204030204"/>
+        <a:ea typeface=""/>
+        <a:cs typeface=""/>
+        <a:font script="Jpan" typeface="游ゴシック"/>
+        <a:font script="Hang" typeface="맑은 고딕"/>
+        <a:font script="Hans" typeface="等线"/>
+        <a:font script="Hant" typeface="新細明體"/>
+        <a:font script="Arab" typeface="Arial"/>
+        <a:font script="Hebr" typeface="Arial"/>
+        <a:font script="Thai" typeface="Cordia New"/>
+        <a:font script="Ethi" typeface="Nyala"/>
+        <a:font script="Beng" typeface="Vrinda"/>
+        <a:font script="Gujr" typeface="Shruti"/>
+        <a:font script="Khmr" typeface="DaunPenh"/>
+        <a:font script="Knda" typeface="Tunga"/>
+        <a:font script="Guru" typeface="Raavi"/>
+        <a:font script="Cans" typeface="Euphemia"/>
+        <a:font script="Cher" typeface="Plantagenet Cherokee"/>
+        <a:font script="Yiii" typeface="Microsoft Yi Baiti"/>
+        <a:font script="Tibt" typeface="Microsoft Himalaya"/>
+        <a:font script="Thaa" typeface="MV Boli"/>
+        <a:font script="Deva" typeface="Mangal"/>
+        <a:font script="Telu" typeface="Gautami"/>
+        <a:font script="Taml" typeface="Latha"/>
+        <a:font script="Syrc" typeface="Estrangelo Edessa"/>
+        <a:font script="Orya" typeface="Kalinga"/>
+        <a:font script="Mlym" typeface="Kartika"/>
+        <a:font script="Laoo" typeface="DokChampa"/>
+        <a:font script="Sinh" typeface="Iskoola Pota"/>
+        <a:font script="Mong" typeface="Mongolian Baiti"/>
+        <a:font script="Viet" typeface="Arial"/>
+        <a:font script="Uigh" typeface="Microsoft Uighur"/>
+        <a:font script="Geor" typeface="Sylfaen"/>
+        <a:font script="Armn" typeface="Arial"/>
+        <a:font script="Bugi" typeface="Leelawadee UI"/>
+        <a:font script="Bopo" typeface="Microsoft JhengHei"/>
+        <a:font script="Java" typeface="Javanese Text"/>
+        <a:font script="Lisu" typeface="Segoe UI"/>
+        <a:font script="Mymr" typeface="Myanmar Text"/>
+        <a:font script="Nkoo" typeface="Ebrima"/>
+        <a:font script="Olck" typeface="Nirmala UI"/>
+        <a:font script="Osma" typeface="Ebrima"/>
+        <a:font script="Phag" typeface="Phagspa"/>
+        <a:font script="Syrn" typeface="Estrangelo Edessa"/>
+        <a:font script="Syrj" typeface="Estrangelo Edessa"/>
+        <a:font script="Syre" typeface="Estrangelo Edessa"/>
+        <a:font script="Sora" typeface="Nirmala UI"/>
+        <a:font script="Tale" typeface="Microsoft Tai Le"/>
+        <a:font script="Talu" typeface="Microsoft New Tai Lue"/>
+        <a:font script="Tfng" typeface="Ebrima"/>
+      </a:minorFont>
+    </a:fontScheme>
+    <a:fmtScheme name="Office">
+      <a:fillStyleLst>
+        <a:solidFill>
+          <a:schemeClr val="phClr"/>
+        </a:solidFill>
+        <a:gradFill rotWithShape="1">
+          <a:gsLst>
+            <a:gs pos="0">
+              <a:schemeClr val="phClr">
+                <a:lumMod val="110000"/>
+                <a:satMod val="105000"/>
+                <a:tint val="67000"/>
+              </a:schemeClr>
+            </a:gs>
+            <a:gs pos="50000">
+              <a:schemeClr val="phClr">
+                <a:lumMod val="105000"/>
+                <a:satMod val="103000"/>
+                <a:tint val="73000"/>
+              </a:schemeClr>
+            </a:gs>
+            <a:gs pos="100000">
+              <a:schemeClr val="phClr">
+                <a:lumMod val="105000"/>
+                <a:satMod val="109000"/>
+                <a:tint val="81000"/>
+              </a:schemeClr>
+            </a:gs>
+          </a:gsLst>
+          <a:lin ang="5400000" scaled="0"/>
+        </a:gradFill>
+        <a:gradFill rotWithShape="1">
+          <a:gsLst>
+            <a:gs pos="0">
+              <a:schemeClr val="phClr">
+                <a:satMod val="103000"/>
+                <a:lumMod val="102000"/>
+                <a:tint val="94000"/>
+              </a:schemeClr>
+            </a:gs>
+            <a:gs pos="50000">
+              <a:schemeClr val="phClr">
+                <a:satMod val="110000"/>
+                <a:lumMod val="100000"/>
+                <a:shade val="100000"/>
+              </a:schemeClr>
+            </a:gs>
+            <a:gs pos="100000">
+              <a:schemeClr val="phClr">
+                <a:lumMod val="99000"/>
+                <a:satMod val="120000"/>
+                <a:shade val="78000"/>
+              </a:schemeClr>
+            </a:gs>
+          </a:gsLst>
+          <a:lin ang="5400000" scaled="0"/>
+        </a:gradFill>
+      </a:fillStyleLst>
+      <a:lnStyleLst>
+        <a:ln w="6350" cap="flat" cmpd="sng" algn="ctr">
+          <a:solidFill>
+            <a:schemeClr val="phClr"/>
+          </a:solidFill>
+          <a:prstDash val="solid"/>
+          <a:miter lim="800000"/>
+        </a:ln>
+        <a:ln w="12700" cap="flat" cmpd="sng" algn="ctr">
+          <a:solidFill>
+            <a:schemeClr val="phClr"/>
+          </a:solidFill>
+          <a:prstDash val="solid"/>
+          <a:miter lim="800000"/>
+        </a:ln>
+        <a:ln w="19050" cap="flat" cmpd="sng" algn="ctr">
+          <a:solidFill>
+            <a:schemeClr val="phClr"/>
+          </a:solidFill>
+          <a:prstDash val="solid"/>
+          <a:miter lim="800000"/>
+        </a:ln>
+      </a:lnStyleLst>
+      <a:effectStyleLst>
+        <a:effectStyle>
+          <a:effectLst/>
+        </a:effectStyle>
+        <a:effectStyle>
+          <a:effectLst/>
+        </a:effectStyle>
+        <a:effectStyle>
+          <a:effectLst>
+            <a:outerShdw blurRad="57150" dist="19050" dir="5400000" algn="ctr" rotWithShape="0">
+              <a:srgbClr val="000000">
+                <a:alpha val="63000"/>
+              </a:srgbClr>
+            </a:outerShdw>
+          </a:effectLst>
+        </a:effectStyle>
+      </a:effectStyleLst>
+      <a:bgFillStyleLst>
+        <a:solidFill>
+          <a:schemeClr val="phClr"/>
+        </a:solidFill>
+        <a:solidFill>
+          <a:schemeClr val="phClr">
+            <a:tint val="95000"/>
+            <a:satMod val="170000"/>
+          </a:schemeClr>
+        </a:solidFill>
+        <a:gradFill rotWithShape="1">
+          <a:gsLst>
+            <a:gs pos="0">
+              <a:schemeClr val="phClr">
+                <a:tint val="93000"/>
+                <a:satMod val="150000"/>
+                <a:shade val="98000"/>
+                <a:lumMod val="102000"/>
+              </a:schemeClr>
+            </a:gs>
+            <a:gs pos="50000">
+              <a:schemeClr val="phClr">
+                <a:tint val="98000"/>
+                <a:satMod val="130000"/>
+                <a:shade val="90000"/>
+                <a:lumMod val="103000"/>
+              </a:schemeClr>
+            </a:gs>
+            <a:gs pos="100000">
+              <a:schemeClr val="phClr">
+                <a:shade val="63000"/>
+                <a:satMod val="120000"/>
+              </a:schemeClr>
+            </a:gs>
+          </a:gsLst>
+          <a:lin ang="5400000" scaled="0"/>
+        </a:gradFill>
+      </a:bgFillStyleLst>
+    </a:fmtScheme>
+  </a:themeElements>
+  <a:objectDefaults/>
+  <a:extraClrSchemeLst/>
+  <a:extLst>
+    <a:ext uri="{05A4C25C-085E-4340-85A3-A5531E510DB2}">
+      <thm15:themeFamily xmlns:thm15="http://schemas.microsoft.com/office/thememl/2012/main" name="Office Theme" id="{62F939B6-93AF-4DB8-9C6B-D6C7DFDC589F}" vid="{4A3C46E8-61CC-4603-A589-7422A47A8E4A}"/>
+    </a:ext>
+  </a:extLst>
+</a:theme>
 </file>
</xml_diff>

<commit_message>
Aanpassingen en opleveren 15:00
</commit_message>
<xml_diff>
--- a/PVB opdracht.pptx
+++ b/PVB opdracht.pptx
@@ -5,27 +5,29 @@
     <p:sldMasterId id="2147483648" r:id="rId1"/>
   </p:sldMasterIdLst>
   <p:notesMasterIdLst>
-    <p:notesMasterId r:id="rId20"/>
+    <p:notesMasterId r:id="rId22"/>
   </p:notesMasterIdLst>
   <p:sldIdLst>
     <p:sldId id="256" r:id="rId2"/>
     <p:sldId id="257" r:id="rId3"/>
     <p:sldId id="258" r:id="rId4"/>
     <p:sldId id="259" r:id="rId5"/>
-    <p:sldId id="260" r:id="rId6"/>
-    <p:sldId id="263" r:id="rId7"/>
-    <p:sldId id="264" r:id="rId8"/>
-    <p:sldId id="265" r:id="rId9"/>
-    <p:sldId id="266" r:id="rId10"/>
-    <p:sldId id="267" r:id="rId11"/>
-    <p:sldId id="268" r:id="rId12"/>
-    <p:sldId id="269" r:id="rId13"/>
-    <p:sldId id="270" r:id="rId14"/>
-    <p:sldId id="271" r:id="rId15"/>
-    <p:sldId id="273" r:id="rId16"/>
-    <p:sldId id="274" r:id="rId17"/>
-    <p:sldId id="272" r:id="rId18"/>
-    <p:sldId id="261" r:id="rId19"/>
+    <p:sldId id="275" r:id="rId6"/>
+    <p:sldId id="276" r:id="rId7"/>
+    <p:sldId id="260" r:id="rId8"/>
+    <p:sldId id="263" r:id="rId9"/>
+    <p:sldId id="264" r:id="rId10"/>
+    <p:sldId id="265" r:id="rId11"/>
+    <p:sldId id="266" r:id="rId12"/>
+    <p:sldId id="267" r:id="rId13"/>
+    <p:sldId id="268" r:id="rId14"/>
+    <p:sldId id="269" r:id="rId15"/>
+    <p:sldId id="270" r:id="rId16"/>
+    <p:sldId id="271" r:id="rId17"/>
+    <p:sldId id="273" r:id="rId18"/>
+    <p:sldId id="274" r:id="rId19"/>
+    <p:sldId id="272" r:id="rId20"/>
+    <p:sldId id="261" r:id="rId21"/>
   </p:sldIdLst>
   <p:sldSz cx="12192000" cy="6858000"/>
   <p:notesSz cx="6858000" cy="9144000"/>
@@ -214,7 +216,7 @@
           <a:p>
             <a:fld id="{7F811C59-D0AD-4F9B-AC09-AE1956CC899C}" type="datetimeFigureOut">
               <a:rPr lang="en-GB" smtClean="0"/>
-              <a:t>07/06/2021</a:t>
+              <a:t>08/06/2021</a:t>
             </a:fld>
             <a:endParaRPr lang="en-GB"/>
           </a:p>
@@ -373,7 +375,7 @@
           <a:p>
             <a:fld id="{52099AE6-D359-4FCD-A62F-89FDA53DAB5C}" type="slidenum">
               <a:rPr lang="en-GB" smtClean="0"/>
-              <a:t>‹nr.›</a:t>
+              <a:t>‹#›</a:t>
             </a:fld>
             <a:endParaRPr lang="en-GB"/>
           </a:p>
@@ -939,7 +941,7 @@
           <a:p>
             <a:fld id="{52099AE6-D359-4FCD-A62F-89FDA53DAB5C}" type="slidenum">
               <a:rPr lang="en-GB" smtClean="0"/>
-              <a:t>5</a:t>
+              <a:t>7</a:t>
             </a:fld>
             <a:endParaRPr lang="en-GB"/>
           </a:p>
@@ -1232,7 +1234,7 @@
           <a:p>
             <a:fld id="{78ABE3C1-DBE1-495D-B57B-2849774B866A}" type="datetimeFigureOut">
               <a:rPr lang="en-US" dirty="0"/>
-              <a:t>6/7/2021</a:t>
+              <a:t>6/8/2021</a:t>
             </a:fld>
             <a:endParaRPr lang="en-US" dirty="0"/>
           </a:p>
@@ -1279,7 +1281,7 @@
           <a:p>
             <a:fld id="{6D22F896-40B5-4ADD-8801-0D06FADFA095}" type="slidenum">
               <a:rPr lang="en-US" dirty="0"/>
-              <a:t>‹nr.›</a:t>
+              <a:t>‹#›</a:t>
             </a:fld>
             <a:endParaRPr lang="en-US" dirty="0"/>
           </a:p>
@@ -1641,7 +1643,7 @@
           <a:p>
             <a:fld id="{446C117F-5CCF-4837-BE5F-2B92066CAFAF}" type="datetimeFigureOut">
               <a:rPr lang="en-US" dirty="0"/>
-              <a:t>6/7/2021</a:t>
+              <a:t>6/8/2021</a:t>
             </a:fld>
             <a:endParaRPr lang="en-US" dirty="0"/>
           </a:p>
@@ -1688,7 +1690,7 @@
           <a:p>
             <a:fld id="{6D22F896-40B5-4ADD-8801-0D06FADFA095}" type="slidenum">
               <a:rPr lang="en-US" dirty="0"/>
-              <a:t>‹nr.›</a:t>
+              <a:t>‹#›</a:t>
             </a:fld>
             <a:endParaRPr lang="en-US" dirty="0"/>
           </a:p>
@@ -1972,7 +1974,7 @@
           <a:p>
             <a:fld id="{84EB90BD-B6CE-46B7-997F-7313B992CCDC}" type="datetimeFigureOut">
               <a:rPr lang="en-US" dirty="0"/>
-              <a:t>6/7/2021</a:t>
+              <a:t>6/8/2021</a:t>
             </a:fld>
             <a:endParaRPr lang="en-US" dirty="0"/>
           </a:p>
@@ -2019,7 +2021,7 @@
           <a:p>
             <a:fld id="{6D22F896-40B5-4ADD-8801-0D06FADFA095}" type="slidenum">
               <a:rPr lang="en-US" dirty="0"/>
-              <a:t>‹nr.›</a:t>
+              <a:t>‹#›</a:t>
             </a:fld>
             <a:endParaRPr lang="en-US" dirty="0"/>
           </a:p>
@@ -2372,7 +2374,7 @@
           <a:p>
             <a:fld id="{CDB9D11F-B188-461D-B23F-39381795C052}" type="datetimeFigureOut">
               <a:rPr lang="en-US" dirty="0"/>
-              <a:t>6/7/2021</a:t>
+              <a:t>6/8/2021</a:t>
             </a:fld>
             <a:endParaRPr lang="en-US" dirty="0"/>
           </a:p>
@@ -2419,7 +2421,7 @@
           <a:p>
             <a:fld id="{6D22F896-40B5-4ADD-8801-0D06FADFA095}" type="slidenum">
               <a:rPr lang="en-US" dirty="0"/>
-              <a:t>‹nr.›</a:t>
+              <a:t>‹#›</a:t>
             </a:fld>
             <a:endParaRPr lang="en-US" dirty="0"/>
           </a:p>
@@ -2935,7 +2937,7 @@
           <a:p>
             <a:fld id="{52E6D8D9-55A2-4063-B0F3-121F44549695}" type="datetimeFigureOut">
               <a:rPr lang="en-US" dirty="0"/>
-              <a:t>6/7/2021</a:t>
+              <a:t>6/8/2021</a:t>
             </a:fld>
             <a:endParaRPr lang="en-US" dirty="0"/>
           </a:p>
@@ -2982,7 +2984,7 @@
           <a:p>
             <a:fld id="{6D22F896-40B5-4ADD-8801-0D06FADFA095}" type="slidenum">
               <a:rPr lang="en-US" dirty="0"/>
-              <a:t>‹nr.›</a:t>
+              <a:t>‹#›</a:t>
             </a:fld>
             <a:endParaRPr lang="en-US" dirty="0"/>
           </a:p>
@@ -3611,7 +3613,7 @@
           <a:p>
             <a:fld id="{D4B24536-994D-4021-A283-9F449C0DB509}" type="datetimeFigureOut">
               <a:rPr lang="en-US" dirty="0"/>
-              <a:t>6/7/2021</a:t>
+              <a:t>6/8/2021</a:t>
             </a:fld>
             <a:endParaRPr lang="en-US" dirty="0"/>
           </a:p>
@@ -3653,7 +3655,7 @@
           <a:p>
             <a:fld id="{6D22F896-40B5-4ADD-8801-0D06FADFA095}" type="slidenum">
               <a:rPr lang="en-US" dirty="0"/>
-              <a:t>‹nr.›</a:t>
+              <a:t>‹#›</a:t>
             </a:fld>
             <a:endParaRPr lang="en-US" dirty="0"/>
           </a:p>
@@ -4519,7 +4521,7 @@
           <a:p>
             <a:fld id="{3CBBBB78-C96F-47B7-AB17-D852CA960AC9}" type="datetimeFigureOut">
               <a:rPr lang="en-US" dirty="0"/>
-              <a:t>6/7/2021</a:t>
+              <a:t>6/8/2021</a:t>
             </a:fld>
             <a:endParaRPr lang="en-US" dirty="0"/>
           </a:p>
@@ -4561,7 +4563,7 @@
           <a:p>
             <a:fld id="{6D22F896-40B5-4ADD-8801-0D06FADFA095}" type="slidenum">
               <a:rPr lang="en-US" dirty="0"/>
-              <a:t>‹nr.›</a:t>
+              <a:t>‹#›</a:t>
             </a:fld>
             <a:endParaRPr lang="en-US" dirty="0"/>
           </a:p>
@@ -4827,7 +4829,7 @@
           <a:p>
             <a:fld id="{1FA3F48C-C7C6-4055-9F49-3777875E72AE}" type="datetimeFigureOut">
               <a:rPr lang="en-US" dirty="0"/>
-              <a:t>6/7/2021</a:t>
+              <a:t>6/8/2021</a:t>
             </a:fld>
             <a:endParaRPr lang="en-US" dirty="0"/>
           </a:p>
@@ -4869,7 +4871,7 @@
           <a:p>
             <a:fld id="{6D22F896-40B5-4ADD-8801-0D06FADFA095}" type="slidenum">
               <a:rPr lang="en-US" dirty="0"/>
-              <a:t>‹nr.›</a:t>
+              <a:t>‹#›</a:t>
             </a:fld>
             <a:endParaRPr lang="en-US" dirty="0"/>
           </a:p>
@@ -5086,7 +5088,7 @@
           <a:p>
             <a:fld id="{6178E61D-D431-422C-9764-11DAFE33AB63}" type="datetimeFigureOut">
               <a:rPr lang="en-US" dirty="0"/>
-              <a:t>6/7/2021</a:t>
+              <a:t>6/8/2021</a:t>
             </a:fld>
             <a:endParaRPr lang="en-US" dirty="0"/>
           </a:p>
@@ -5143,7 +5145,7 @@
             <a:fld id="{6D22F896-40B5-4ADD-8801-0D06FADFA095}" type="slidenum">
               <a:rPr lang="en-US" dirty="0"/>
               <a:pPr/>
-              <a:t>‹nr.›</a:t>
+              <a:t>‹#›</a:t>
             </a:fld>
             <a:endParaRPr lang="en-US" dirty="0"/>
           </a:p>
@@ -5405,7 +5407,7 @@
           <a:p>
             <a:fld id="{12DE42F4-6EEF-4EF7-8ED4-2208F0F89A08}" type="datetimeFigureOut">
               <a:rPr lang="en-US" dirty="0"/>
-              <a:t>6/7/2021</a:t>
+              <a:t>6/8/2021</a:t>
             </a:fld>
             <a:endParaRPr lang="en-US" dirty="0"/>
           </a:p>
@@ -5447,7 +5449,7 @@
           <a:p>
             <a:fld id="{6D22F896-40B5-4ADD-8801-0D06FADFA095}" type="slidenum">
               <a:rPr lang="en-US" dirty="0"/>
-              <a:t>‹nr.›</a:t>
+              <a:t>‹#›</a:t>
             </a:fld>
             <a:endParaRPr lang="en-US" dirty="0"/>
           </a:p>
@@ -5789,7 +5791,7 @@
           <a:p>
             <a:fld id="{30578ACC-22D6-47C1-A373-4FD133E34F3C}" type="datetimeFigureOut">
               <a:rPr lang="en-US" dirty="0"/>
-              <a:t>6/7/2021</a:t>
+              <a:t>6/8/2021</a:t>
             </a:fld>
             <a:endParaRPr lang="en-US" dirty="0"/>
           </a:p>
@@ -5836,7 +5838,7 @@
           <a:p>
             <a:fld id="{6D22F896-40B5-4ADD-8801-0D06FADFA095}" type="slidenum">
               <a:rPr lang="en-US" dirty="0"/>
-              <a:t>‹nr.›</a:t>
+              <a:t>‹#›</a:t>
             </a:fld>
             <a:endParaRPr lang="en-US" dirty="0"/>
           </a:p>
@@ -6160,7 +6162,7 @@
           <a:p>
             <a:fld id="{4E5A6C69-6797-4E8A-BF37-F2C3751466E9}" type="datetimeFigureOut">
               <a:rPr lang="en-US" dirty="0"/>
-              <a:t>6/7/2021</a:t>
+              <a:t>6/8/2021</a:t>
             </a:fld>
             <a:endParaRPr lang="en-US" dirty="0"/>
           </a:p>
@@ -6202,7 +6204,7 @@
           <a:p>
             <a:fld id="{6D22F896-40B5-4ADD-8801-0D06FADFA095}" type="slidenum">
               <a:rPr lang="en-US" dirty="0"/>
-              <a:t>‹nr.›</a:t>
+              <a:t>‹#›</a:t>
             </a:fld>
             <a:endParaRPr lang="en-US" dirty="0"/>
           </a:p>
@@ -6661,7 +6663,7 @@
           <a:p>
             <a:fld id="{D82014A1-A632-4878-A0D3-F52BA7563730}" type="datetimeFigureOut">
               <a:rPr lang="en-US" dirty="0"/>
-              <a:t>6/7/2021</a:t>
+              <a:t>6/8/2021</a:t>
             </a:fld>
             <a:endParaRPr lang="en-US" dirty="0"/>
           </a:p>
@@ -6703,7 +6705,7 @@
           <a:p>
             <a:fld id="{6D22F896-40B5-4ADD-8801-0D06FADFA095}" type="slidenum">
               <a:rPr lang="en-US" dirty="0"/>
-              <a:t>‹nr.›</a:t>
+              <a:t>‹#›</a:t>
             </a:fld>
             <a:endParaRPr lang="en-US" dirty="0"/>
           </a:p>
@@ -6913,7 +6915,7 @@
           <a:p>
             <a:fld id="{CE99F462-093F-4566-844B-4C71F2739DA5}" type="datetimeFigureOut">
               <a:rPr lang="en-US" dirty="0"/>
-              <a:t>6/7/2021</a:t>
+              <a:t>6/8/2021</a:t>
             </a:fld>
             <a:endParaRPr lang="en-US" dirty="0"/>
           </a:p>
@@ -6955,7 +6957,7 @@
           <a:p>
             <a:fld id="{6D22F896-40B5-4ADD-8801-0D06FADFA095}" type="slidenum">
               <a:rPr lang="en-US" dirty="0"/>
-              <a:t>‹nr.›</a:t>
+              <a:t>‹#›</a:t>
             </a:fld>
             <a:endParaRPr lang="en-US" dirty="0"/>
           </a:p>
@@ -7071,7 +7073,7 @@
           <a:p>
             <a:fld id="{3D24A7AC-904D-4781-85BA-7D10C17ED021}" type="datetimeFigureOut">
               <a:rPr lang="en-US" dirty="0"/>
-              <a:t>6/7/2021</a:t>
+              <a:t>6/8/2021</a:t>
             </a:fld>
             <a:endParaRPr lang="en-US" dirty="0"/>
           </a:p>
@@ -7113,7 +7115,7 @@
           <a:p>
             <a:fld id="{6D22F896-40B5-4ADD-8801-0D06FADFA095}" type="slidenum">
               <a:rPr lang="en-US" dirty="0"/>
-              <a:t>‹nr.›</a:t>
+              <a:t>‹#›</a:t>
             </a:fld>
             <a:endParaRPr lang="en-US" dirty="0"/>
           </a:p>
@@ -7456,7 +7458,7 @@
           <a:p>
             <a:fld id="{E331444B-B92B-4E27-8C94-BB93EAF5CB18}" type="datetimeFigureOut">
               <a:rPr lang="en-US" dirty="0"/>
-              <a:t>6/7/2021</a:t>
+              <a:t>6/8/2021</a:t>
             </a:fld>
             <a:endParaRPr lang="en-US" dirty="0"/>
           </a:p>
@@ -7498,7 +7500,7 @@
           <a:p>
             <a:fld id="{6D22F896-40B5-4ADD-8801-0D06FADFA095}" type="slidenum">
               <a:rPr lang="en-US" dirty="0"/>
-              <a:t>‹nr.›</a:t>
+              <a:t>‹#›</a:t>
             </a:fld>
             <a:endParaRPr lang="en-US" dirty="0"/>
           </a:p>
@@ -7860,7 +7862,7 @@
           <a:p>
             <a:fld id="{363EFA5E-FA76-400D-B3DC-F0BA90E6D107}" type="datetimeFigureOut">
               <a:rPr lang="en-US" dirty="0"/>
-              <a:t>6/7/2021</a:t>
+              <a:t>6/8/2021</a:t>
             </a:fld>
             <a:endParaRPr lang="en-US" dirty="0"/>
           </a:p>
@@ -7902,7 +7904,7 @@
           <a:p>
             <a:fld id="{6D22F896-40B5-4ADD-8801-0D06FADFA095}" type="slidenum">
               <a:rPr lang="en-US" dirty="0"/>
-              <a:t>‹nr.›</a:t>
+              <a:t>‹#›</a:t>
             </a:fld>
             <a:endParaRPr lang="en-US" dirty="0"/>
           </a:p>
@@ -8099,7 +8101,7 @@
           <a:p>
             <a:fld id="{9D6E9DEC-419B-4CC5-A080-3B06BD5A8291}" type="datetimeFigureOut">
               <a:rPr lang="en-US" dirty="0"/>
-              <a:t>6/7/2021</a:t>
+              <a:t>6/8/2021</a:t>
             </a:fld>
             <a:endParaRPr lang="en-US" dirty="0"/>
           </a:p>
@@ -8178,7 +8180,7 @@
             <a:fld id="{6D22F896-40B5-4ADD-8801-0D06FADFA095}" type="slidenum">
               <a:rPr lang="en-US" dirty="0"/>
               <a:pPr/>
-              <a:t>‹nr.›</a:t>
+              <a:t>‹#›</a:t>
             </a:fld>
             <a:endParaRPr lang="en-US" dirty="0"/>
           </a:p>
@@ -8609,7 +8611,7 @@
           <p:cNvPr id="2" name="Title 1">
             <a:extLst>
               <a:ext uri="{FF2B5EF4-FFF2-40B4-BE49-F238E27FC236}">
-                <a16:creationId xmlns:a16="http://schemas.microsoft.com/office/drawing/2014/main" id="{C02E72A7-C3B8-4F86-8C7B-D32BAB95C2A3}"/>
+                <a16:creationId xmlns:a16="http://schemas.microsoft.com/office/drawing/2014/main" id="{458039A1-A84D-482B-9D53-0F7E7783FBDA}"/>
               </a:ext>
             </a:extLst>
           </p:cNvPr>
@@ -8622,12 +8624,14 @@
         </p:nvSpPr>
         <p:spPr/>
         <p:txBody>
-          <a:bodyPr/>
+          <a:bodyPr>
+            <a:normAutofit/>
+          </a:bodyPr>
           <a:lstStyle/>
           <a:p>
             <a:r>
               <a:rPr lang="nl-NL" dirty="0"/>
-              <a:t>B1-K2-W1: Realiseert (onderdelen van) een product</a:t>
+              <a:t>B1-K1-W3: Levert een bijdrage aan het ontwerp</a:t>
             </a:r>
             <a:endParaRPr lang="en-GB" dirty="0"/>
           </a:p>
@@ -8638,7 +8642,7 @@
           <p:cNvPr id="3" name="Content Placeholder 2">
             <a:extLst>
               <a:ext uri="{FF2B5EF4-FFF2-40B4-BE49-F238E27FC236}">
-                <a16:creationId xmlns:a16="http://schemas.microsoft.com/office/drawing/2014/main" id="{41BD12E1-6D68-4681-A510-2D3BF13EC1F3}"/>
+                <a16:creationId xmlns:a16="http://schemas.microsoft.com/office/drawing/2014/main" id="{2AEE3E25-8BCC-4252-9C3E-0D3C31A84882}"/>
               </a:ext>
             </a:extLst>
           </p:cNvPr>
@@ -8654,134 +8658,20 @@
           <a:bodyPr/>
           <a:lstStyle/>
           <a:p>
-            <a:r>
-              <a:rPr lang="en-US" dirty="0"/>
-              <a:t>Product </a:t>
-            </a:r>
-            <a:r>
-              <a:rPr lang="en-US" dirty="0" err="1"/>
-              <a:t>gerealiseerd</a:t>
-            </a:r>
-            <a:r>
-              <a:rPr lang="en-US" dirty="0"/>
-              <a:t> met </a:t>
-            </a:r>
-            <a:r>
-              <a:rPr lang="en-US" dirty="0" err="1"/>
-              <a:t>behulp</a:t>
-            </a:r>
-            <a:r>
-              <a:rPr lang="en-US" dirty="0"/>
-              <a:t> van het </a:t>
-            </a:r>
-            <a:r>
-              <a:rPr lang="en-US" dirty="0" err="1"/>
-              <a:t>technisch</a:t>
-            </a:r>
-            <a:r>
-              <a:rPr lang="en-US" dirty="0"/>
-              <a:t> </a:t>
-            </a:r>
-            <a:r>
-              <a:rPr lang="en-US" dirty="0" err="1"/>
-              <a:t>en</a:t>
-            </a:r>
-            <a:r>
-              <a:rPr lang="en-US" dirty="0"/>
-              <a:t> </a:t>
-            </a:r>
-            <a:r>
-              <a:rPr lang="en-US" dirty="0" err="1"/>
-              <a:t>functioneel</a:t>
-            </a:r>
-            <a:r>
-              <a:rPr lang="en-US" dirty="0"/>
-              <a:t> </a:t>
-            </a:r>
-            <a:r>
-              <a:rPr lang="en-US" dirty="0" err="1"/>
-              <a:t>ontwerp</a:t>
-            </a:r>
-            <a:endParaRPr lang="en-US" dirty="0"/>
-          </a:p>
-          <a:p>
-            <a:r>
-              <a:rPr lang="en-US" dirty="0" err="1"/>
-              <a:t>Realisatielogboek</a:t>
-            </a:r>
-            <a:r>
-              <a:rPr lang="en-US" dirty="0"/>
-              <a:t> </a:t>
-            </a:r>
-            <a:r>
-              <a:rPr lang="en-US" dirty="0" err="1"/>
-              <a:t>gecreerd</a:t>
-            </a:r>
-            <a:r>
-              <a:rPr lang="en-US" dirty="0"/>
-              <a:t> </a:t>
-            </a:r>
-          </a:p>
-          <a:p>
-            <a:r>
-              <a:rPr lang="en-US" dirty="0" err="1"/>
-              <a:t>Creatiescript</a:t>
-            </a:r>
-            <a:r>
-              <a:rPr lang="en-US" dirty="0"/>
-              <a:t> database </a:t>
-            </a:r>
-            <a:r>
-              <a:rPr lang="en-US" dirty="0" err="1"/>
-              <a:t>verwerkt</a:t>
-            </a:r>
-            <a:endParaRPr lang="en-US" dirty="0"/>
-          </a:p>
-          <a:p>
-            <a:r>
-              <a:rPr lang="en-US" dirty="0" err="1"/>
-              <a:t>Broncode</a:t>
-            </a:r>
-            <a:r>
-              <a:rPr lang="en-US" dirty="0"/>
-              <a:t> </a:t>
-            </a:r>
-            <a:r>
-              <a:rPr lang="en-US" dirty="0" err="1"/>
-              <a:t>te</a:t>
-            </a:r>
-            <a:r>
-              <a:rPr lang="en-US" dirty="0"/>
-              <a:t> </a:t>
-            </a:r>
-            <a:r>
-              <a:rPr lang="en-US" dirty="0" err="1"/>
-              <a:t>verkrijgen</a:t>
-            </a:r>
-            <a:r>
-              <a:rPr lang="en-US" dirty="0"/>
-              <a:t> door </a:t>
-            </a:r>
-            <a:r>
-              <a:rPr lang="en-US" dirty="0" err="1"/>
-              <a:t>middel</a:t>
-            </a:r>
-            <a:r>
-              <a:rPr lang="en-US" dirty="0"/>
-              <a:t> van pdf </a:t>
-            </a:r>
-            <a:r>
-              <a:rPr lang="en-US" dirty="0" err="1"/>
-              <a:t>en</a:t>
-            </a:r>
-            <a:r>
-              <a:rPr lang="en-US" dirty="0"/>
-              <a:t> </a:t>
-            </a:r>
-            <a:r>
-              <a:rPr lang="en-US" dirty="0" err="1"/>
-              <a:t>github</a:t>
-            </a:r>
+            <a:pPr lvl="1"/>
+            <a:r>
+              <a:rPr lang="nl-NL" dirty="0"/>
+              <a:t>Product functioneel ontwerp gemaakt met behulp van sjabloon</a:t>
+            </a:r>
+          </a:p>
+          <a:p>
+            <a:pPr lvl="1"/>
+            <a:r>
+              <a:rPr lang="nl-NL" dirty="0"/>
+              <a:t>Product technisch ontwerp gemaakt met behulp van sjabloon</a:t>
+            </a:r>
+          </a:p>
+          <a:p>
             <a:endParaRPr lang="en-GB" dirty="0"/>
           </a:p>
         </p:txBody>
@@ -8789,7 +8679,7 @@
     </p:spTree>
     <p:extLst>
       <p:ext uri="{BB962C8B-B14F-4D97-AF65-F5344CB8AC3E}">
-        <p14:creationId xmlns:p14="http://schemas.microsoft.com/office/powerpoint/2010/main" val="3673079187"/>
+        <p14:creationId xmlns:p14="http://schemas.microsoft.com/office/powerpoint/2010/main" val="2111454828"/>
       </p:ext>
     </p:extLst>
   </p:cSld>
@@ -8821,7 +8711,7 @@
           <p:cNvPr id="2" name="Title 1">
             <a:extLst>
               <a:ext uri="{FF2B5EF4-FFF2-40B4-BE49-F238E27FC236}">
-                <a16:creationId xmlns:a16="http://schemas.microsoft.com/office/drawing/2014/main" id="{C54982A7-9346-4DE0-B9B5-D1BB18B1F8BB}"/>
+                <a16:creationId xmlns:a16="http://schemas.microsoft.com/office/drawing/2014/main" id="{4AA2C044-7020-4F0E-96E3-5B0169059087}"/>
               </a:ext>
             </a:extLst>
           </p:cNvPr>
@@ -8839,7 +8729,7 @@
           <a:p>
             <a:r>
               <a:rPr lang="nl-NL" dirty="0"/>
-              <a:t>B1-K2-W2: Test het ontwikkelde product</a:t>
+              <a:t>B1-K1-W4: Bereidt de realisatie voor</a:t>
             </a:r>
             <a:endParaRPr lang="en-GB" dirty="0"/>
           </a:p>
@@ -8850,7 +8740,7 @@
           <p:cNvPr id="3" name="Content Placeholder 2">
             <a:extLst>
               <a:ext uri="{FF2B5EF4-FFF2-40B4-BE49-F238E27FC236}">
-                <a16:creationId xmlns:a16="http://schemas.microsoft.com/office/drawing/2014/main" id="{AC72C516-C48E-43E4-9F17-64281F69365A}"/>
+                <a16:creationId xmlns:a16="http://schemas.microsoft.com/office/drawing/2014/main" id="{DE4AFB02-1403-46FE-9154-975A3F4F677A}"/>
               </a:ext>
             </a:extLst>
           </p:cNvPr>
@@ -8867,45 +8757,10 @@
           <a:lstStyle/>
           <a:p>
             <a:r>
-              <a:rPr lang="en-US" dirty="0"/>
-              <a:t>Product </a:t>
-            </a:r>
-            <a:r>
-              <a:rPr lang="en-US" dirty="0" err="1"/>
-              <a:t>systeemtest</a:t>
-            </a:r>
-            <a:r>
-              <a:rPr lang="en-US" dirty="0"/>
-              <a:t> </a:t>
-            </a:r>
-            <a:r>
-              <a:rPr lang="en-US" dirty="0" err="1"/>
-              <a:t>gemaakt</a:t>
-            </a:r>
-            <a:endParaRPr lang="en-US" dirty="0"/>
-          </a:p>
-          <a:p>
-            <a:r>
-              <a:rPr lang="en-US" dirty="0" err="1"/>
-              <a:t>Resultaten</a:t>
-            </a:r>
-            <a:r>
-              <a:rPr lang="en-US" dirty="0"/>
-              <a:t> </a:t>
-            </a:r>
-            <a:r>
-              <a:rPr lang="en-US" dirty="0" err="1"/>
-              <a:t>systeemtest</a:t>
-            </a:r>
-            <a:r>
-              <a:rPr lang="en-US" dirty="0"/>
-              <a:t> </a:t>
-            </a:r>
-            <a:r>
-              <a:rPr lang="en-US" dirty="0" err="1"/>
-              <a:t>verwerkt</a:t>
-            </a:r>
-            <a:endParaRPr lang="en-US" dirty="0"/>
+              <a:rPr lang="nl-NL" dirty="0"/>
+              <a:t>Product configuratieoverzicht gemaakt met behulp van sjabloon</a:t>
+            </a:r>
+            <a:endParaRPr lang="en-GB" dirty="0"/>
           </a:p>
           <a:p>
             <a:endParaRPr lang="en-GB" dirty="0"/>
@@ -8915,7 +8770,7 @@
     </p:spTree>
     <p:extLst>
       <p:ext uri="{BB962C8B-B14F-4D97-AF65-F5344CB8AC3E}">
-        <p14:creationId xmlns:p14="http://schemas.microsoft.com/office/powerpoint/2010/main" val="325980621"/>
+        <p14:creationId xmlns:p14="http://schemas.microsoft.com/office/powerpoint/2010/main" val="4241215244"/>
       </p:ext>
     </p:extLst>
   </p:cSld>
@@ -8947,7 +8802,7 @@
           <p:cNvPr id="2" name="Title 1">
             <a:extLst>
               <a:ext uri="{FF2B5EF4-FFF2-40B4-BE49-F238E27FC236}">
-                <a16:creationId xmlns:a16="http://schemas.microsoft.com/office/drawing/2014/main" id="{873CA7DD-331E-4BFD-ACEC-289F9EE402DA}"/>
+                <a16:creationId xmlns:a16="http://schemas.microsoft.com/office/drawing/2014/main" id="{C02E72A7-C3B8-4F86-8C7B-D32BAB95C2A3}"/>
               </a:ext>
             </a:extLst>
           </p:cNvPr>
@@ -8964,17 +8819,10 @@
           <a:lstStyle/>
           <a:p>
             <a:r>
-              <a:rPr lang="en-GB" dirty="0"/>
-              <a:t>B1-K3-W1: </a:t>
-            </a:r>
-            <a:r>
-              <a:rPr lang="en-GB" dirty="0" err="1"/>
-              <a:t>Optimaliseert</a:t>
-            </a:r>
-            <a:r>
-              <a:rPr lang="en-GB" dirty="0"/>
-              <a:t> het product</a:t>
-            </a:r>
+              <a:rPr lang="nl-NL" dirty="0"/>
+              <a:t>B1-K2-W1: Realiseert (onderdelen van) een product</a:t>
+            </a:r>
+            <a:endParaRPr lang="en-GB" dirty="0"/>
           </a:p>
         </p:txBody>
       </p:sp>
@@ -8983,7 +8831,7 @@
           <p:cNvPr id="3" name="Content Placeholder 2">
             <a:extLst>
               <a:ext uri="{FF2B5EF4-FFF2-40B4-BE49-F238E27FC236}">
-                <a16:creationId xmlns:a16="http://schemas.microsoft.com/office/drawing/2014/main" id="{BB4CC38B-CE6E-44A5-8F2D-E5F6618BDD47}"/>
+                <a16:creationId xmlns:a16="http://schemas.microsoft.com/office/drawing/2014/main" id="{41BD12E1-6D68-4681-A510-2D3BF13EC1F3}"/>
               </a:ext>
             </a:extLst>
           </p:cNvPr>
@@ -9000,16 +8848,28 @@
           <a:lstStyle/>
           <a:p>
             <a:r>
+              <a:rPr lang="en-US" dirty="0"/>
+              <a:t>Product </a:t>
+            </a:r>
+            <a:r>
               <a:rPr lang="en-US" dirty="0" err="1"/>
-              <a:t>Proces</a:t>
+              <a:t>gerealiseerd</a:t>
             </a:r>
             <a:r>
               <a:rPr lang="en-US" dirty="0"/>
-              <a:t>/Product </a:t>
+              <a:t> met </a:t>
             </a:r>
             <a:r>
               <a:rPr lang="en-US" dirty="0" err="1"/>
-              <a:t>Acceptatietest</a:t>
+              <a:t>behulp</a:t>
+            </a:r>
+            <a:r>
+              <a:rPr lang="en-US" dirty="0"/>
+              <a:t> van het </a:t>
+            </a:r>
+            <a:r>
+              <a:rPr lang="en-US" dirty="0" err="1"/>
+              <a:t>technisch</a:t>
             </a:r>
             <a:r>
               <a:rPr lang="en-US" dirty="0"/>
@@ -9017,7 +8877,7 @@
             </a:r>
             <a:r>
               <a:rPr lang="en-US" dirty="0" err="1"/>
-              <a:t>gecreerd</a:t>
+              <a:t>en</a:t>
             </a:r>
             <a:r>
               <a:rPr lang="en-US" dirty="0"/>
@@ -9025,7 +8885,7 @@
             </a:r>
             <a:r>
               <a:rPr lang="en-US" dirty="0" err="1"/>
-              <a:t>en</a:t>
+              <a:t>functioneel</a:t>
             </a:r>
             <a:r>
               <a:rPr lang="en-US" dirty="0"/>
@@ -9033,29 +8893,14 @@
             </a:r>
             <a:r>
               <a:rPr lang="en-US" dirty="0" err="1"/>
-              <a:t>uitgevoerd</a:t>
-            </a:r>
-            <a:r>
-              <a:rPr lang="en-US" dirty="0"/>
-              <a:t> met </a:t>
-            </a:r>
+              <a:t>ontwerp</a:t>
+            </a:r>
+            <a:endParaRPr lang="en-US" dirty="0"/>
+          </a:p>
+          <a:p>
             <a:r>
               <a:rPr lang="en-US" dirty="0" err="1"/>
-              <a:t>Geerten</a:t>
-            </a:r>
-            <a:r>
-              <a:rPr lang="en-US" dirty="0"/>
-              <a:t> Vester</a:t>
-            </a:r>
-          </a:p>
-          <a:p>
-            <a:r>
-              <a:rPr lang="en-US" dirty="0"/>
-              <a:t>Na </a:t>
-            </a:r>
-            <a:r>
-              <a:rPr lang="en-US" dirty="0" err="1"/>
-              <a:t>opmerkiningen</a:t>
+              <a:t>Realisatielogboek</a:t>
             </a:r>
             <a:r>
               <a:rPr lang="en-US" dirty="0"/>
@@ -9063,15 +8908,32 @@
             </a:r>
             <a:r>
               <a:rPr lang="en-US" dirty="0" err="1"/>
-              <a:t>aanpassingen</a:t>
+              <a:t>gecreerd</a:t>
             </a:r>
             <a:r>
               <a:rPr lang="en-US" dirty="0"/>
               <a:t> </a:t>
             </a:r>
+          </a:p>
+          <a:p>
             <a:r>
               <a:rPr lang="en-US" dirty="0" err="1"/>
-              <a:t>gemaakt</a:t>
+              <a:t>Creatiescript</a:t>
+            </a:r>
+            <a:r>
+              <a:rPr lang="en-US" dirty="0"/>
+              <a:t> database </a:t>
+            </a:r>
+            <a:r>
+              <a:rPr lang="en-US" dirty="0" err="1"/>
+              <a:t>verwerkt</a:t>
+            </a:r>
+            <a:endParaRPr lang="en-US" dirty="0"/>
+          </a:p>
+          <a:p>
+            <a:r>
+              <a:rPr lang="en-US" dirty="0" err="1"/>
+              <a:t>Broncode</a:t>
             </a:r>
             <a:r>
               <a:rPr lang="en-US" dirty="0"/>
@@ -9079,7 +8941,7 @@
             </a:r>
             <a:r>
               <a:rPr lang="en-US" dirty="0" err="1"/>
-              <a:t>en</a:t>
+              <a:t>te</a:t>
             </a:r>
             <a:r>
               <a:rPr lang="en-US" dirty="0"/>
@@ -9087,7 +8949,31 @@
             </a:r>
             <a:r>
               <a:rPr lang="en-US" dirty="0" err="1"/>
-              <a:t>gedocumenteerd</a:t>
+              <a:t>verkrijgen</a:t>
+            </a:r>
+            <a:r>
+              <a:rPr lang="en-US" dirty="0"/>
+              <a:t> door </a:t>
+            </a:r>
+            <a:r>
+              <a:rPr lang="en-US" dirty="0" err="1"/>
+              <a:t>middel</a:t>
+            </a:r>
+            <a:r>
+              <a:rPr lang="en-US" dirty="0"/>
+              <a:t> van pdf </a:t>
+            </a:r>
+            <a:r>
+              <a:rPr lang="en-US" dirty="0" err="1"/>
+              <a:t>en</a:t>
+            </a:r>
+            <a:r>
+              <a:rPr lang="en-US" dirty="0"/>
+              <a:t> </a:t>
+            </a:r>
+            <a:r>
+              <a:rPr lang="en-US" dirty="0" err="1"/>
+              <a:t>github</a:t>
             </a:r>
             <a:endParaRPr lang="en-GB" dirty="0"/>
           </a:p>
@@ -9096,7 +8982,7 @@
     </p:spTree>
     <p:extLst>
       <p:ext uri="{BB962C8B-B14F-4D97-AF65-F5344CB8AC3E}">
-        <p14:creationId xmlns:p14="http://schemas.microsoft.com/office/powerpoint/2010/main" val="1986179438"/>
+        <p14:creationId xmlns:p14="http://schemas.microsoft.com/office/powerpoint/2010/main" val="3673079187"/>
       </p:ext>
     </p:extLst>
   </p:cSld>
@@ -9128,7 +9014,7 @@
           <p:cNvPr id="2" name="Title 1">
             <a:extLst>
               <a:ext uri="{FF2B5EF4-FFF2-40B4-BE49-F238E27FC236}">
-                <a16:creationId xmlns:a16="http://schemas.microsoft.com/office/drawing/2014/main" id="{5F225E68-53CF-4F5E-B06A-F4AEAF41929F}"/>
+                <a16:creationId xmlns:a16="http://schemas.microsoft.com/office/drawing/2014/main" id="{C54982A7-9346-4DE0-B9B5-D1BB18B1F8BB}"/>
               </a:ext>
             </a:extLst>
           </p:cNvPr>
@@ -9146,7 +9032,7 @@
           <a:p>
             <a:r>
               <a:rPr lang="nl-NL" dirty="0"/>
-              <a:t>B1-K3-W2: Levert het product op</a:t>
+              <a:t>B1-K2-W2: Test het ontwikkelde product</a:t>
             </a:r>
             <a:endParaRPr lang="en-GB" dirty="0"/>
           </a:p>
@@ -9157,7 +9043,7 @@
           <p:cNvPr id="3" name="Content Placeholder 2">
             <a:extLst>
               <a:ext uri="{FF2B5EF4-FFF2-40B4-BE49-F238E27FC236}">
-                <a16:creationId xmlns:a16="http://schemas.microsoft.com/office/drawing/2014/main" id="{1052306D-4016-479F-82B5-10B9025ECADB}"/>
+                <a16:creationId xmlns:a16="http://schemas.microsoft.com/office/drawing/2014/main" id="{AC72C516-C48E-43E4-9F17-64281F69365A}"/>
               </a:ext>
             </a:extLst>
           </p:cNvPr>
@@ -9174,8 +9060,12 @@
           <a:lstStyle/>
           <a:p>
             <a:r>
+              <a:rPr lang="en-US" dirty="0"/>
+              <a:t>Product </a:t>
+            </a:r>
+            <a:r>
               <a:rPr lang="en-US" dirty="0" err="1"/>
-              <a:t>Presentatie</a:t>
+              <a:t>systeemtest</a:t>
             </a:r>
             <a:r>
               <a:rPr lang="en-US" dirty="0"/>
@@ -9185,27 +9075,12 @@
               <a:rPr lang="en-US" dirty="0" err="1"/>
               <a:t>gemaakt</a:t>
             </a:r>
-            <a:r>
-              <a:rPr lang="en-US" dirty="0"/>
-              <a:t> over het product</a:t>
-            </a:r>
-          </a:p>
-          <a:p>
-            <a:r>
-              <a:rPr lang="en-US" dirty="0"/>
-              <a:t>Product </a:t>
-            </a:r>
+            <a:endParaRPr lang="en-US" dirty="0"/>
+          </a:p>
+          <a:p>
             <a:r>
               <a:rPr lang="en-US" dirty="0" err="1"/>
-              <a:t>niet</a:t>
-            </a:r>
-            <a:r>
-              <a:rPr lang="en-US" dirty="0"/>
-              <a:t> in </a:t>
-            </a:r>
-            <a:r>
-              <a:rPr lang="en-US" dirty="0" err="1"/>
-              <a:t>productieomgeving</a:t>
+              <a:t>Resultaten</a:t>
             </a:r>
             <a:r>
               <a:rPr lang="en-US" dirty="0"/>
@@ -9213,7 +9088,7 @@
             </a:r>
             <a:r>
               <a:rPr lang="en-US" dirty="0" err="1"/>
-              <a:t>opgenomen</a:t>
+              <a:t>systeemtest</a:t>
             </a:r>
             <a:r>
               <a:rPr lang="en-US" dirty="0"/>
@@ -9221,20 +9096,11 @@
             </a:r>
             <a:r>
               <a:rPr lang="en-US" dirty="0" err="1"/>
-              <a:t>aangezien</a:t>
-            </a:r>
-            <a:r>
-              <a:rPr lang="en-US" dirty="0"/>
-              <a:t> er </a:t>
-            </a:r>
-            <a:r>
-              <a:rPr lang="en-US" dirty="0" err="1"/>
-              <a:t>geen</a:t>
-            </a:r>
-            <a:r>
-              <a:rPr lang="en-US" dirty="0"/>
-              <a:t> server is die de database host</a:t>
-            </a:r>
+              <a:t>verwerkt</a:t>
+            </a:r>
+            <a:endParaRPr lang="en-US" dirty="0"/>
+          </a:p>
+          <a:p>
             <a:endParaRPr lang="en-GB" dirty="0"/>
           </a:p>
         </p:txBody>
@@ -9242,7 +9108,7 @@
     </p:spTree>
     <p:extLst>
       <p:ext uri="{BB962C8B-B14F-4D97-AF65-F5344CB8AC3E}">
-        <p14:creationId xmlns:p14="http://schemas.microsoft.com/office/powerpoint/2010/main" val="3743386057"/>
+        <p14:creationId xmlns:p14="http://schemas.microsoft.com/office/powerpoint/2010/main" val="325980621"/>
       </p:ext>
     </p:extLst>
   </p:cSld>
@@ -9274,7 +9140,7 @@
           <p:cNvPr id="2" name="Title 1">
             <a:extLst>
               <a:ext uri="{FF2B5EF4-FFF2-40B4-BE49-F238E27FC236}">
-                <a16:creationId xmlns:a16="http://schemas.microsoft.com/office/drawing/2014/main" id="{E8CFD4F0-425C-487D-A116-637F15C701E4}"/>
+                <a16:creationId xmlns:a16="http://schemas.microsoft.com/office/drawing/2014/main" id="{873CA7DD-331E-4BFD-ACEC-289F9EE402DA}"/>
               </a:ext>
             </a:extLst>
           </p:cNvPr>
@@ -9291,14 +9157,17 @@
           <a:lstStyle/>
           <a:p>
             <a:r>
-              <a:rPr lang="nl-NL" dirty="0"/>
-              <a:t>B1-K3-W3: Evalueert het </a:t>
-            </a:r>
-            <a:r>
-              <a:rPr lang="nl-NL"/>
-              <a:t>opgeleverde product</a:t>
-            </a:r>
-            <a:endParaRPr lang="en-GB" dirty="0"/>
+              <a:rPr lang="en-GB" dirty="0"/>
+              <a:t>B1-K3-W1: </a:t>
+            </a:r>
+            <a:r>
+              <a:rPr lang="en-GB" dirty="0" err="1"/>
+              <a:t>Optimaliseert</a:t>
+            </a:r>
+            <a:r>
+              <a:rPr lang="en-GB" dirty="0"/>
+              <a:t> het product</a:t>
+            </a:r>
           </a:p>
         </p:txBody>
       </p:sp>
@@ -9307,7 +9176,7 @@
           <p:cNvPr id="3" name="Content Placeholder 2">
             <a:extLst>
               <a:ext uri="{FF2B5EF4-FFF2-40B4-BE49-F238E27FC236}">
-                <a16:creationId xmlns:a16="http://schemas.microsoft.com/office/drawing/2014/main" id="{4B586F5A-1310-40DB-BF05-FB5BBC56F60B}"/>
+                <a16:creationId xmlns:a16="http://schemas.microsoft.com/office/drawing/2014/main" id="{BB4CC38B-CE6E-44A5-8F2D-E5F6618BDD47}"/>
               </a:ext>
             </a:extLst>
           </p:cNvPr>
@@ -9324,20 +9193,95 @@
           <a:lstStyle/>
           <a:p>
             <a:r>
-              <a:rPr lang="en-GB" dirty="0" err="1"/>
-              <a:t>Evaluatieverslag</a:t>
-            </a:r>
-            <a:r>
-              <a:rPr lang="en-GB" dirty="0"/>
+              <a:rPr lang="en-US" dirty="0" err="1"/>
+              <a:t>Proces</a:t>
+            </a:r>
+            <a:r>
+              <a:rPr lang="en-US" dirty="0"/>
+              <a:t>/Product </a:t>
+            </a:r>
+            <a:r>
+              <a:rPr lang="en-US" dirty="0" err="1"/>
+              <a:t>Acceptatietest</a:t>
+            </a:r>
+            <a:r>
+              <a:rPr lang="en-US" dirty="0"/>
               <a:t> </a:t>
             </a:r>
             <a:r>
-              <a:rPr lang="en-GB" dirty="0" err="1"/>
+              <a:rPr lang="en-US" dirty="0" err="1"/>
+              <a:t>gecreerd</a:t>
+            </a:r>
+            <a:r>
+              <a:rPr lang="en-US" dirty="0"/>
+              <a:t> </a:t>
+            </a:r>
+            <a:r>
+              <a:rPr lang="en-US" dirty="0" err="1"/>
+              <a:t>en</a:t>
+            </a:r>
+            <a:r>
+              <a:rPr lang="en-US" dirty="0"/>
+              <a:t> </a:t>
+            </a:r>
+            <a:r>
+              <a:rPr lang="en-US" dirty="0" err="1"/>
+              <a:t>uitgevoerd</a:t>
+            </a:r>
+            <a:r>
+              <a:rPr lang="en-US" dirty="0"/>
+              <a:t> met </a:t>
+            </a:r>
+            <a:r>
+              <a:rPr lang="en-US" dirty="0" err="1"/>
+              <a:t>Geerten</a:t>
+            </a:r>
+            <a:r>
+              <a:rPr lang="en-US" dirty="0"/>
+              <a:t> Vester</a:t>
+            </a:r>
+          </a:p>
+          <a:p>
+            <a:r>
+              <a:rPr lang="en-US" dirty="0"/>
+              <a:t>Na </a:t>
+            </a:r>
+            <a:r>
+              <a:rPr lang="en-US" dirty="0" err="1"/>
+              <a:t>opmerkiningen</a:t>
+            </a:r>
+            <a:r>
+              <a:rPr lang="en-US" dirty="0"/>
+              <a:t> </a:t>
+            </a:r>
+            <a:r>
+              <a:rPr lang="en-US" dirty="0" err="1"/>
+              <a:t>aanpassingen</a:t>
+            </a:r>
+            <a:r>
+              <a:rPr lang="en-US" dirty="0"/>
+              <a:t> </a:t>
+            </a:r>
+            <a:r>
+              <a:rPr lang="en-US" dirty="0" err="1"/>
               <a:t>gemaakt</a:t>
             </a:r>
-            <a:endParaRPr lang="en-GB" dirty="0"/>
-          </a:p>
-          <a:p>
+            <a:r>
+              <a:rPr lang="en-US" dirty="0"/>
+              <a:t> </a:t>
+            </a:r>
+            <a:r>
+              <a:rPr lang="en-US" dirty="0" err="1"/>
+              <a:t>en</a:t>
+            </a:r>
+            <a:r>
+              <a:rPr lang="en-US" dirty="0"/>
+              <a:t> </a:t>
+            </a:r>
+            <a:r>
+              <a:rPr lang="en-US" dirty="0" err="1"/>
+              <a:t>gedocumenteerd</a:t>
+            </a:r>
             <a:endParaRPr lang="en-GB" dirty="0"/>
           </a:p>
         </p:txBody>
@@ -9345,7 +9289,7 @@
     </p:spTree>
     <p:extLst>
       <p:ext uri="{BB962C8B-B14F-4D97-AF65-F5344CB8AC3E}">
-        <p14:creationId xmlns:p14="http://schemas.microsoft.com/office/powerpoint/2010/main" val="2636442521"/>
+        <p14:creationId xmlns:p14="http://schemas.microsoft.com/office/powerpoint/2010/main" val="1986179438"/>
       </p:ext>
     </p:extLst>
   </p:cSld>
@@ -9374,10 +9318,10 @@
       </p:grpSpPr>
       <p:sp>
         <p:nvSpPr>
-          <p:cNvPr id="2" name="Titel 1">
+          <p:cNvPr id="2" name="Title 1">
             <a:extLst>
               <a:ext uri="{FF2B5EF4-FFF2-40B4-BE49-F238E27FC236}">
-                <a16:creationId xmlns:a16="http://schemas.microsoft.com/office/drawing/2014/main" id="{8CC8469D-A9D4-4E81-BABD-775831E78658}"/>
+                <a16:creationId xmlns:a16="http://schemas.microsoft.com/office/drawing/2014/main" id="{5F225E68-53CF-4F5E-B06A-F4AEAF41929F}"/>
               </a:ext>
             </a:extLst>
           </p:cNvPr>
@@ -9395,17 +9339,18 @@
           <a:p>
             <a:r>
               <a:rPr lang="nl-NL" dirty="0"/>
-              <a:t>P1-K1-W1: Onderhoudt een applicatie</a:t>
-            </a:r>
-          </a:p>
-        </p:txBody>
-      </p:sp>
-      <p:sp>
-        <p:nvSpPr>
-          <p:cNvPr id="3" name="Tijdelijke aanduiding voor inhoud 2">
+              <a:t>B1-K3-W2: Levert het product op</a:t>
+            </a:r>
+            <a:endParaRPr lang="en-GB" dirty="0"/>
+          </a:p>
+        </p:txBody>
+      </p:sp>
+      <p:sp>
+        <p:nvSpPr>
+          <p:cNvPr id="3" name="Content Placeholder 2">
             <a:extLst>
               <a:ext uri="{FF2B5EF4-FFF2-40B4-BE49-F238E27FC236}">
-                <a16:creationId xmlns:a16="http://schemas.microsoft.com/office/drawing/2014/main" id="{276E9B3D-F23F-46A1-B851-683B5CFDCE1F}"/>
+                <a16:creationId xmlns:a16="http://schemas.microsoft.com/office/drawing/2014/main" id="{1052306D-4016-479F-82B5-10B9025ECADB}"/>
               </a:ext>
             </a:extLst>
           </p:cNvPr>
@@ -9422,22 +9367,75 @@
           <a:lstStyle/>
           <a:p>
             <a:r>
-              <a:rPr lang="nl-NL" dirty="0"/>
-              <a:t>Tickets zijn behandeld in het Kwaliteitshandboek</a:t>
-            </a:r>
-          </a:p>
-          <a:p>
-            <a:r>
-              <a:rPr lang="nl-NL" dirty="0"/>
-              <a:t>Alle aanpassingen zijn gemaakt en door verwerkt in het project</a:t>
-            </a:r>
+              <a:rPr lang="en-US" dirty="0" err="1"/>
+              <a:t>Presentatie</a:t>
+            </a:r>
+            <a:r>
+              <a:rPr lang="en-US" dirty="0"/>
+              <a:t> </a:t>
+            </a:r>
+            <a:r>
+              <a:rPr lang="en-US" dirty="0" err="1"/>
+              <a:t>gemaakt</a:t>
+            </a:r>
+            <a:r>
+              <a:rPr lang="en-US" dirty="0"/>
+              <a:t> over het product</a:t>
+            </a:r>
+          </a:p>
+          <a:p>
+            <a:r>
+              <a:rPr lang="en-US" dirty="0"/>
+              <a:t>Product </a:t>
+            </a:r>
+            <a:r>
+              <a:rPr lang="en-US" dirty="0" err="1"/>
+              <a:t>niet</a:t>
+            </a:r>
+            <a:r>
+              <a:rPr lang="en-US" dirty="0"/>
+              <a:t> in </a:t>
+            </a:r>
+            <a:r>
+              <a:rPr lang="en-US" dirty="0" err="1"/>
+              <a:t>productieomgeving</a:t>
+            </a:r>
+            <a:r>
+              <a:rPr lang="en-US" dirty="0"/>
+              <a:t> </a:t>
+            </a:r>
+            <a:r>
+              <a:rPr lang="en-US" dirty="0" err="1"/>
+              <a:t>opgenomen</a:t>
+            </a:r>
+            <a:r>
+              <a:rPr lang="en-US" dirty="0"/>
+              <a:t> </a:t>
+            </a:r>
+            <a:r>
+              <a:rPr lang="en-US" dirty="0" err="1"/>
+              <a:t>aangezien</a:t>
+            </a:r>
+            <a:r>
+              <a:rPr lang="en-US" dirty="0"/>
+              <a:t> er </a:t>
+            </a:r>
+            <a:r>
+              <a:rPr lang="en-US" dirty="0" err="1"/>
+              <a:t>geen</a:t>
+            </a:r>
+            <a:r>
+              <a:rPr lang="en-US" dirty="0"/>
+              <a:t> server is die de database host</a:t>
+            </a:r>
+            <a:endParaRPr lang="en-GB" dirty="0"/>
           </a:p>
         </p:txBody>
       </p:sp>
     </p:spTree>
     <p:extLst>
       <p:ext uri="{BB962C8B-B14F-4D97-AF65-F5344CB8AC3E}">
-        <p14:creationId xmlns:p14="http://schemas.microsoft.com/office/powerpoint/2010/main" val="4221469474"/>
+        <p14:creationId xmlns:p14="http://schemas.microsoft.com/office/powerpoint/2010/main" val="3743386057"/>
       </p:ext>
     </p:extLst>
   </p:cSld>
@@ -9466,10 +9464,10 @@
       </p:grpSpPr>
       <p:sp>
         <p:nvSpPr>
-          <p:cNvPr id="2" name="Titel 1">
+          <p:cNvPr id="2" name="Title 1">
             <a:extLst>
               <a:ext uri="{FF2B5EF4-FFF2-40B4-BE49-F238E27FC236}">
-                <a16:creationId xmlns:a16="http://schemas.microsoft.com/office/drawing/2014/main" id="{8E47D09A-34CE-4DCA-B6D6-8EF2ACAF4688}"/>
+                <a16:creationId xmlns:a16="http://schemas.microsoft.com/office/drawing/2014/main" id="{E8CFD4F0-425C-487D-A116-637F15C701E4}"/>
               </a:ext>
             </a:extLst>
           </p:cNvPr>
@@ -9487,17 +9485,22 @@
           <a:p>
             <a:r>
               <a:rPr lang="nl-NL" dirty="0"/>
-              <a:t>P1-K1-W2: Beheert gegevens</a:t>
-            </a:r>
-          </a:p>
-        </p:txBody>
-      </p:sp>
-      <p:sp>
-        <p:nvSpPr>
-          <p:cNvPr id="3" name="Tijdelijke aanduiding voor inhoud 2">
+              <a:t>B1-K3-W3: Evalueert het </a:t>
+            </a:r>
+            <a:r>
+              <a:rPr lang="nl-NL"/>
+              <a:t>opgeleverde product</a:t>
+            </a:r>
+            <a:endParaRPr lang="en-GB" dirty="0"/>
+          </a:p>
+        </p:txBody>
+      </p:sp>
+      <p:sp>
+        <p:nvSpPr>
+          <p:cNvPr id="3" name="Content Placeholder 2">
             <a:extLst>
               <a:ext uri="{FF2B5EF4-FFF2-40B4-BE49-F238E27FC236}">
-                <a16:creationId xmlns:a16="http://schemas.microsoft.com/office/drawing/2014/main" id="{D7D79E25-9FDA-4857-A9E7-3315FE09CA99}"/>
+                <a16:creationId xmlns:a16="http://schemas.microsoft.com/office/drawing/2014/main" id="{4B586F5A-1310-40DB-BF05-FB5BBC56F60B}"/>
               </a:ext>
             </a:extLst>
           </p:cNvPr>
@@ -9514,22 +9517,28 @@
           <a:lstStyle/>
           <a:p>
             <a:r>
-              <a:rPr lang="nl-NL" dirty="0"/>
-              <a:t>Documentatie is aangepast</a:t>
-            </a:r>
-          </a:p>
-          <a:p>
-            <a:r>
-              <a:rPr lang="nl-NL" dirty="0"/>
-              <a:t>Nieuwe versie van de applicatie is gemaakt</a:t>
-            </a:r>
+              <a:rPr lang="en-GB" dirty="0" err="1"/>
+              <a:t>Evaluatieverslag</a:t>
+            </a:r>
+            <a:r>
+              <a:rPr lang="en-GB" dirty="0"/>
+              <a:t> </a:t>
+            </a:r>
+            <a:r>
+              <a:rPr lang="en-GB" dirty="0" err="1"/>
+              <a:t>gemaakt</a:t>
+            </a:r>
+            <a:endParaRPr lang="en-GB" dirty="0"/>
+          </a:p>
+          <a:p>
+            <a:endParaRPr lang="en-GB" dirty="0"/>
           </a:p>
         </p:txBody>
       </p:sp>
     </p:spTree>
     <p:extLst>
       <p:ext uri="{BB962C8B-B14F-4D97-AF65-F5344CB8AC3E}">
-        <p14:creationId xmlns:p14="http://schemas.microsoft.com/office/powerpoint/2010/main" val="2385606951"/>
+        <p14:creationId xmlns:p14="http://schemas.microsoft.com/office/powerpoint/2010/main" val="2636442521"/>
       </p:ext>
     </p:extLst>
   </p:cSld>
@@ -9561,7 +9570,7 @@
           <p:cNvPr id="2" name="Titel 1">
             <a:extLst>
               <a:ext uri="{FF2B5EF4-FFF2-40B4-BE49-F238E27FC236}">
-                <a16:creationId xmlns:a16="http://schemas.microsoft.com/office/drawing/2014/main" id="{E210181E-6F8A-43DD-8D90-35A3FC977698}"/>
+                <a16:creationId xmlns:a16="http://schemas.microsoft.com/office/drawing/2014/main" id="{8CC8469D-A9D4-4E81-BABD-775831E78658}"/>
               </a:ext>
             </a:extLst>
           </p:cNvPr>
@@ -9579,7 +9588,7 @@
           <a:p>
             <a:r>
               <a:rPr lang="nl-NL" dirty="0"/>
-              <a:t>Demonstratie</a:t>
+              <a:t>P1-K1-W1: Onderhoudt een applicatie</a:t>
             </a:r>
           </a:p>
         </p:txBody>
@@ -9589,7 +9598,7 @@
           <p:cNvPr id="3" name="Tijdelijke aanduiding voor inhoud 2">
             <a:extLst>
               <a:ext uri="{FF2B5EF4-FFF2-40B4-BE49-F238E27FC236}">
-                <a16:creationId xmlns:a16="http://schemas.microsoft.com/office/drawing/2014/main" id="{BA9819C0-B174-42E5-BDF3-2075FE29EB34}"/>
+                <a16:creationId xmlns:a16="http://schemas.microsoft.com/office/drawing/2014/main" id="{276E9B3D-F23F-46A1-B851-683B5CFDCE1F}"/>
               </a:ext>
             </a:extLst>
           </p:cNvPr>
@@ -9605,14 +9614,23 @@
           <a:bodyPr/>
           <a:lstStyle/>
           <a:p>
-            <a:endParaRPr lang="nl-NL" dirty="0"/>
+            <a:r>
+              <a:rPr lang="nl-NL" dirty="0"/>
+              <a:t>Tickets zijn behandeld in het Kwaliteitshandboek</a:t>
+            </a:r>
+          </a:p>
+          <a:p>
+            <a:r>
+              <a:rPr lang="nl-NL" dirty="0"/>
+              <a:t>Alle aanpassingen zijn gemaakt en door verwerkt in het project</a:t>
+            </a:r>
           </a:p>
         </p:txBody>
       </p:sp>
     </p:spTree>
     <p:extLst>
       <p:ext uri="{BB962C8B-B14F-4D97-AF65-F5344CB8AC3E}">
-        <p14:creationId xmlns:p14="http://schemas.microsoft.com/office/powerpoint/2010/main" val="2617079876"/>
+        <p14:creationId xmlns:p14="http://schemas.microsoft.com/office/powerpoint/2010/main" val="4221469474"/>
       </p:ext>
     </p:extLst>
   </p:cSld>
@@ -9644,7 +9662,7 @@
           <p:cNvPr id="2" name="Titel 1">
             <a:extLst>
               <a:ext uri="{FF2B5EF4-FFF2-40B4-BE49-F238E27FC236}">
-                <a16:creationId xmlns:a16="http://schemas.microsoft.com/office/drawing/2014/main" id="{EF94D828-6CDA-40A8-A76E-2BDEEFCCCBEF}"/>
+                <a16:creationId xmlns:a16="http://schemas.microsoft.com/office/drawing/2014/main" id="{8E47D09A-34CE-4DCA-B6D6-8EF2ACAF4688}"/>
               </a:ext>
             </a:extLst>
           </p:cNvPr>
@@ -9662,7 +9680,7 @@
           <a:p>
             <a:r>
               <a:rPr lang="nl-NL" dirty="0"/>
-              <a:t>Vragen</a:t>
+              <a:t>P1-K1-W2: Beheert gegevens</a:t>
             </a:r>
           </a:p>
         </p:txBody>
@@ -9672,7 +9690,7 @@
           <p:cNvPr id="3" name="Tijdelijke aanduiding voor inhoud 2">
             <a:extLst>
               <a:ext uri="{FF2B5EF4-FFF2-40B4-BE49-F238E27FC236}">
-                <a16:creationId xmlns:a16="http://schemas.microsoft.com/office/drawing/2014/main" id="{4BEF679E-3AAF-4F5E-89F2-9DE9A3CD8B66}"/>
+                <a16:creationId xmlns:a16="http://schemas.microsoft.com/office/drawing/2014/main" id="{D7D79E25-9FDA-4857-A9E7-3315FE09CA99}"/>
               </a:ext>
             </a:extLst>
           </p:cNvPr>
@@ -9688,14 +9706,420 @@
           <a:bodyPr/>
           <a:lstStyle/>
           <a:p>
-            <a:endParaRPr lang="nl-NL" dirty="0"/>
+            <a:r>
+              <a:rPr lang="nl-NL" dirty="0"/>
+              <a:t>Documentatie is aangepast</a:t>
+            </a:r>
+          </a:p>
+          <a:p>
+            <a:r>
+              <a:rPr lang="nl-NL" dirty="0"/>
+              <a:t>Nieuwe versie van de applicatie is gemaakt</a:t>
+            </a:r>
           </a:p>
         </p:txBody>
       </p:sp>
     </p:spTree>
     <p:extLst>
       <p:ext uri="{BB962C8B-B14F-4D97-AF65-F5344CB8AC3E}">
-        <p14:creationId xmlns:p14="http://schemas.microsoft.com/office/powerpoint/2010/main" val="2815304248"/>
+        <p14:creationId xmlns:p14="http://schemas.microsoft.com/office/powerpoint/2010/main" val="2385606951"/>
+      </p:ext>
+    </p:extLst>
+  </p:cSld>
+  <p:clrMapOvr>
+    <a:masterClrMapping/>
+  </p:clrMapOvr>
+</p:sld>
+</file>
+
+<file path=ppt/slides/slide19.xml><?xml version="1.0" encoding="utf-8"?>
+<p:sld xmlns:a="http://schemas.openxmlformats.org/drawingml/2006/main" xmlns:r="http://schemas.openxmlformats.org/officeDocument/2006/relationships" xmlns:p="http://schemas.openxmlformats.org/presentationml/2006/main">
+  <p:cSld>
+    <p:bg>
+      <p:bgPr>
+        <a:gradFill rotWithShape="1">
+          <a:gsLst>
+            <a:gs pos="0">
+              <a:schemeClr val="bg2">
+                <a:tint val="96000"/>
+                <a:shade val="100000"/>
+                <a:hueMod val="270000"/>
+                <a:satMod val="200000"/>
+                <a:lumMod val="128000"/>
+              </a:schemeClr>
+            </a:gs>
+            <a:gs pos="50000">
+              <a:schemeClr val="bg2">
+                <a:shade val="100000"/>
+                <a:hueMod val="100000"/>
+                <a:satMod val="110000"/>
+                <a:lumMod val="130000"/>
+              </a:schemeClr>
+            </a:gs>
+            <a:gs pos="100000">
+              <a:schemeClr val="bg2">
+                <a:shade val="78000"/>
+                <a:hueMod val="44000"/>
+                <a:satMod val="200000"/>
+                <a:lumMod val="69000"/>
+              </a:schemeClr>
+            </a:gs>
+          </a:gsLst>
+          <a:lin ang="2520000" scaled="0"/>
+        </a:gradFill>
+        <a:effectLst/>
+      </p:bgPr>
+    </p:bg>
+    <p:spTree>
+      <p:nvGrpSpPr>
+        <p:cNvPr id="1" name=""/>
+        <p:cNvGrpSpPr/>
+        <p:nvPr/>
+      </p:nvGrpSpPr>
+      <p:grpSpPr>
+        <a:xfrm>
+          <a:off x="0" y="0"/>
+          <a:ext cx="0" cy="0"/>
+          <a:chOff x="0" y="0"/>
+          <a:chExt cx="0" cy="0"/>
+        </a:xfrm>
+      </p:grpSpPr>
+      <p:sp useBgFill="1">
+        <p:nvSpPr>
+          <p:cNvPr id="8" name="Rectangle 7">
+            <a:extLst>
+              <a:ext uri="{FF2B5EF4-FFF2-40B4-BE49-F238E27FC236}">
+                <a16:creationId xmlns:a16="http://schemas.microsoft.com/office/drawing/2014/main" id="{A106B9FE-7E5A-4047-B5D3-C3C24BD3E80E}"/>
+              </a:ext>
+              <a:ext uri="{C183D7F6-B498-43B3-948B-1728B52AA6E4}">
+                <adec:decorative xmlns:adec="http://schemas.microsoft.com/office/drawing/2017/decorative" val="1"/>
+              </a:ext>
+            </a:extLst>
+          </p:cNvPr>
+          <p:cNvSpPr>
+            <a:spLocks noGrp="1" noRot="1" noChangeAspect="1" noMove="1" noResize="1" noEditPoints="1" noAdjustHandles="1" noChangeArrowheads="1" noChangeShapeType="1" noTextEdit="1"/>
+          </p:cNvSpPr>
+          <p:nvPr>
+            <p:extLst>
+              <p:ext uri="{386F3935-93C4-4BCD-93E2-E3B085C9AB24}">
+                <p16:designElem xmlns:p16="http://schemas.microsoft.com/office/powerpoint/2015/main" val="1"/>
+              </p:ext>
+            </p:extLst>
+          </p:nvPr>
+        </p:nvSpPr>
+        <p:spPr>
+          <a:xfrm>
+            <a:off x="0" y="0"/>
+            <a:ext cx="12188824" cy="6858001"/>
+          </a:xfrm>
+          <a:prstGeom prst="rect">
+            <a:avLst/>
+          </a:prstGeom>
+          <a:ln>
+            <a:noFill/>
+          </a:ln>
+        </p:spPr>
+        <p:style>
+          <a:lnRef idx="2">
+            <a:schemeClr val="accent1">
+              <a:shade val="50000"/>
+            </a:schemeClr>
+          </a:lnRef>
+          <a:fillRef idx="1">
+            <a:schemeClr val="accent1"/>
+          </a:fillRef>
+          <a:effectRef idx="0">
+            <a:schemeClr val="accent1"/>
+          </a:effectRef>
+          <a:fontRef idx="minor">
+            <a:schemeClr val="lt1"/>
+          </a:fontRef>
+        </p:style>
+        <p:txBody>
+          <a:bodyPr rtlCol="0" anchor="ctr"/>
+          <a:lstStyle/>
+          <a:p>
+            <a:pPr algn="ctr"/>
+            <a:endParaRPr lang="en-US"/>
+          </a:p>
+        </p:txBody>
+      </p:sp>
+      <p:sp>
+        <p:nvSpPr>
+          <p:cNvPr id="17" name="Rectangle 9">
+            <a:extLst>
+              <a:ext uri="{FF2B5EF4-FFF2-40B4-BE49-F238E27FC236}">
+                <a16:creationId xmlns:a16="http://schemas.microsoft.com/office/drawing/2014/main" id="{B60EBA20-0A64-45D5-B937-FE93DCA01C7E}"/>
+              </a:ext>
+              <a:ext uri="{C183D7F6-B498-43B3-948B-1728B52AA6E4}">
+                <adec:decorative xmlns:adec="http://schemas.microsoft.com/office/drawing/2017/decorative" val="1"/>
+              </a:ext>
+            </a:extLst>
+          </p:cNvPr>
+          <p:cNvSpPr>
+            <a:spLocks noGrp="1" noRot="1" noChangeAspect="1" noMove="1" noResize="1" noEditPoints="1" noAdjustHandles="1" noChangeArrowheads="1" noChangeShapeType="1" noTextEdit="1"/>
+          </p:cNvSpPr>
+          <p:nvPr>
+            <p:extLst>
+              <p:ext uri="{386F3935-93C4-4BCD-93E2-E3B085C9AB24}">
+                <p16:designElem xmlns:p16="http://schemas.microsoft.com/office/powerpoint/2015/main" val="1"/>
+              </p:ext>
+            </p:extLst>
+          </p:nvPr>
+        </p:nvSpPr>
+        <p:spPr>
+          <a:xfrm>
+            <a:off x="8785632" y="0"/>
+            <a:ext cx="3406368" cy="6858000"/>
+          </a:xfrm>
+          <a:prstGeom prst="rect">
+            <a:avLst/>
+          </a:prstGeom>
+          <a:solidFill>
+            <a:schemeClr val="accent1"/>
+          </a:solidFill>
+          <a:ln>
+            <a:noFill/>
+          </a:ln>
+        </p:spPr>
+        <p:style>
+          <a:lnRef idx="2">
+            <a:schemeClr val="accent1">
+              <a:shade val="50000"/>
+            </a:schemeClr>
+          </a:lnRef>
+          <a:fillRef idx="1">
+            <a:schemeClr val="accent1"/>
+          </a:fillRef>
+          <a:effectRef idx="0">
+            <a:schemeClr val="accent1"/>
+          </a:effectRef>
+          <a:fontRef idx="minor">
+            <a:schemeClr val="lt1"/>
+          </a:fontRef>
+        </p:style>
+      </p:sp>
+      <p:pic>
+        <p:nvPicPr>
+          <p:cNvPr id="12" name="Picture 11">
+            <a:extLst>
+              <a:ext uri="{FF2B5EF4-FFF2-40B4-BE49-F238E27FC236}">
+                <a16:creationId xmlns:a16="http://schemas.microsoft.com/office/drawing/2014/main" id="{3EAD5E5B-543A-4690-8C75-BACF7FFB40ED}"/>
+              </a:ext>
+              <a:ext uri="{C183D7F6-B498-43B3-948B-1728B52AA6E4}">
+                <adec:decorative xmlns:adec="http://schemas.microsoft.com/office/drawing/2017/decorative" val="1"/>
+              </a:ext>
+            </a:extLst>
+          </p:cNvPr>
+          <p:cNvPicPr>
+            <a:picLocks noGrp="1" noRot="1" noChangeAspect="1" noMove="1" noResize="1" noEditPoints="1" noAdjustHandles="1" noChangeArrowheads="1" noChangeShapeType="1" noCrop="1"/>
+          </p:cNvPicPr>
+          <p:nvPr>
+            <p:extLst>
+              <p:ext uri="{386F3935-93C4-4BCD-93E2-E3B085C9AB24}">
+                <p16:designElem xmlns:p16="http://schemas.microsoft.com/office/powerpoint/2015/main" val="1"/>
+              </p:ext>
+            </p:extLst>
+          </p:nvPr>
+        </p:nvPicPr>
+        <p:blipFill>
+          <a:blip r:embed="rId2">
+            <a:alphaModFix amt="10000"/>
+            <a:extLst>
+              <a:ext uri="{28A0092B-C50C-407E-A947-70E740481C1C}">
+                <a14:useLocalDpi xmlns:a14="http://schemas.microsoft.com/office/drawing/2010/main" val="0"/>
+              </a:ext>
+            </a:extLst>
+          </a:blip>
+          <a:stretch>
+            <a:fillRect/>
+          </a:stretch>
+        </p:blipFill>
+        <p:spPr>
+          <a:xfrm>
+            <a:off x="-3176" y="0"/>
+            <a:ext cx="12192000" cy="6858000"/>
+          </a:xfrm>
+          <a:prstGeom prst="rect">
+            <a:avLst/>
+          </a:prstGeom>
+        </p:spPr>
+      </p:pic>
+      <p:pic>
+        <p:nvPicPr>
+          <p:cNvPr id="14" name="Picture 13">
+            <a:extLst>
+              <a:ext uri="{FF2B5EF4-FFF2-40B4-BE49-F238E27FC236}">
+                <a16:creationId xmlns:a16="http://schemas.microsoft.com/office/drawing/2014/main" id="{98739700-980C-4F96-84CD-97157DFE86AE}"/>
+              </a:ext>
+              <a:ext uri="{C183D7F6-B498-43B3-948B-1728B52AA6E4}">
+                <adec:decorative xmlns:adec="http://schemas.microsoft.com/office/drawing/2017/decorative" val="1"/>
+              </a:ext>
+            </a:extLst>
+          </p:cNvPr>
+          <p:cNvPicPr>
+            <a:picLocks noGrp="1" noRot="1" noChangeAspect="1" noMove="1" noResize="1" noEditPoints="1" noAdjustHandles="1" noChangeArrowheads="1" noChangeShapeType="1" noCrop="1"/>
+          </p:cNvPicPr>
+          <p:nvPr>
+            <p:extLst>
+              <p:ext uri="{386F3935-93C4-4BCD-93E2-E3B085C9AB24}">
+                <p16:designElem xmlns:p16="http://schemas.microsoft.com/office/powerpoint/2015/main" val="1"/>
+              </p:ext>
+            </p:extLst>
+          </p:nvPr>
+        </p:nvPicPr>
+        <p:blipFill>
+          <a:blip r:embed="rId3">
+            <a:extLst>
+              <a:ext uri="{28A0092B-C50C-407E-A947-70E740481C1C}">
+                <a14:useLocalDpi xmlns:a14="http://schemas.microsoft.com/office/drawing/2010/main" val="0"/>
+              </a:ext>
+            </a:extLst>
+          </a:blip>
+          <a:stretch>
+            <a:fillRect/>
+          </a:stretch>
+        </p:blipFill>
+        <p:spPr>
+          <a:xfrm>
+            <a:off x="2" y="1959089"/>
+            <a:ext cx="9107362" cy="321164"/>
+          </a:xfrm>
+          <a:prstGeom prst="rect">
+            <a:avLst/>
+          </a:prstGeom>
+        </p:spPr>
+      </p:pic>
+      <p:sp>
+        <p:nvSpPr>
+          <p:cNvPr id="16" name="Rectangle 15">
+            <a:extLst>
+              <a:ext uri="{FF2B5EF4-FFF2-40B4-BE49-F238E27FC236}">
+                <a16:creationId xmlns:a16="http://schemas.microsoft.com/office/drawing/2014/main" id="{52A2FDCB-3B06-44F3-A0AA-2C056C3E512F}"/>
+              </a:ext>
+              <a:ext uri="{C183D7F6-B498-43B3-948B-1728B52AA6E4}">
+                <adec:decorative xmlns:adec="http://schemas.microsoft.com/office/drawing/2017/decorative" val="1"/>
+              </a:ext>
+            </a:extLst>
+          </p:cNvPr>
+          <p:cNvSpPr>
+            <a:spLocks noGrp="1" noRot="1" noChangeAspect="1" noMove="1" noResize="1" noEditPoints="1" noAdjustHandles="1" noChangeArrowheads="1" noChangeShapeType="1" noTextEdit="1"/>
+          </p:cNvSpPr>
+          <p:nvPr>
+            <p:extLst>
+              <p:ext uri="{386F3935-93C4-4BCD-93E2-E3B085C9AB24}">
+                <p16:designElem xmlns:p16="http://schemas.microsoft.com/office/powerpoint/2015/main" val="1"/>
+              </p:ext>
+            </p:extLst>
+          </p:nvPr>
+        </p:nvSpPr>
+        <p:spPr bwMode="grayWhite">
+          <a:xfrm>
+            <a:off x="1" y="609600"/>
+            <a:ext cx="9107363" cy="1368198"/>
+          </a:xfrm>
+          <a:prstGeom prst="rect">
+            <a:avLst/>
+          </a:prstGeom>
+          <a:solidFill>
+            <a:srgbClr val="262626"/>
+          </a:solidFill>
+          <a:ln>
+            <a:noFill/>
+          </a:ln>
+        </p:spPr>
+        <p:style>
+          <a:lnRef idx="2">
+            <a:schemeClr val="accent1">
+              <a:shade val="50000"/>
+            </a:schemeClr>
+          </a:lnRef>
+          <a:fillRef idx="1">
+            <a:schemeClr val="accent1"/>
+          </a:fillRef>
+          <a:effectRef idx="0">
+            <a:schemeClr val="accent1"/>
+          </a:effectRef>
+          <a:fontRef idx="minor">
+            <a:schemeClr val="lt1"/>
+          </a:fontRef>
+        </p:style>
+      </p:sp>
+      <p:sp>
+        <p:nvSpPr>
+          <p:cNvPr id="2" name="Titel 1">
+            <a:extLst>
+              <a:ext uri="{FF2B5EF4-FFF2-40B4-BE49-F238E27FC236}">
+                <a16:creationId xmlns:a16="http://schemas.microsoft.com/office/drawing/2014/main" id="{E210181E-6F8A-43DD-8D90-35A3FC977698}"/>
+              </a:ext>
+            </a:extLst>
+          </p:cNvPr>
+          <p:cNvSpPr>
+            <a:spLocks noGrp="1"/>
+          </p:cNvSpPr>
+          <p:nvPr>
+            <p:ph type="title"/>
+          </p:nvPr>
+        </p:nvSpPr>
+        <p:spPr>
+          <a:xfrm>
+            <a:off x="680321" y="753228"/>
+            <a:ext cx="7461844" cy="1080938"/>
+          </a:xfrm>
+        </p:spPr>
+        <p:txBody>
+          <a:bodyPr>
+            <a:normAutofit/>
+          </a:bodyPr>
+          <a:lstStyle/>
+          <a:p>
+            <a:r>
+              <a:rPr lang="nl-NL">
+                <a:solidFill>
+                  <a:srgbClr val="FFFFFF"/>
+                </a:solidFill>
+              </a:rPr>
+              <a:t>Demonstratie</a:t>
+            </a:r>
+          </a:p>
+        </p:txBody>
+      </p:sp>
+      <p:sp>
+        <p:nvSpPr>
+          <p:cNvPr id="3" name="Tijdelijke aanduiding voor inhoud 2">
+            <a:extLst>
+              <a:ext uri="{FF2B5EF4-FFF2-40B4-BE49-F238E27FC236}">
+                <a16:creationId xmlns:a16="http://schemas.microsoft.com/office/drawing/2014/main" id="{BA9819C0-B174-42E5-BDF3-2075FE29EB34}"/>
+              </a:ext>
+            </a:extLst>
+          </p:cNvPr>
+          <p:cNvSpPr>
+            <a:spLocks noGrp="1"/>
+          </p:cNvSpPr>
+          <p:nvPr>
+            <p:ph idx="1"/>
+          </p:nvPr>
+        </p:nvSpPr>
+        <p:spPr>
+          <a:xfrm>
+            <a:off x="680321" y="2336873"/>
+            <a:ext cx="7461844" cy="3142077"/>
+          </a:xfrm>
+        </p:spPr>
+        <p:txBody>
+          <a:bodyPr>
+            <a:normAutofit/>
+          </a:bodyPr>
+          <a:lstStyle/>
+          <a:p>
+            <a:endParaRPr lang="nl-NL" sz="1800"/>
+          </a:p>
+        </p:txBody>
+      </p:sp>
+    </p:spTree>
+    <p:extLst>
+      <p:ext uri="{BB962C8B-B14F-4D97-AF65-F5344CB8AC3E}">
+        <p14:creationId xmlns:p14="http://schemas.microsoft.com/office/powerpoint/2010/main" val="2617079876"/>
       </p:ext>
     </p:extLst>
   </p:cSld>
@@ -9800,6 +10224,89 @@
     <p:extLst>
       <p:ext uri="{BB962C8B-B14F-4D97-AF65-F5344CB8AC3E}">
         <p14:creationId xmlns:p14="http://schemas.microsoft.com/office/powerpoint/2010/main" val="2752539017"/>
+      </p:ext>
+    </p:extLst>
+  </p:cSld>
+  <p:clrMapOvr>
+    <a:masterClrMapping/>
+  </p:clrMapOvr>
+</p:sld>
+</file>
+
+<file path=ppt/slides/slide20.xml><?xml version="1.0" encoding="utf-8"?>
+<p:sld xmlns:a="http://schemas.openxmlformats.org/drawingml/2006/main" xmlns:r="http://schemas.openxmlformats.org/officeDocument/2006/relationships" xmlns:p="http://schemas.openxmlformats.org/presentationml/2006/main">
+  <p:cSld>
+    <p:spTree>
+      <p:nvGrpSpPr>
+        <p:cNvPr id="1" name=""/>
+        <p:cNvGrpSpPr/>
+        <p:nvPr/>
+      </p:nvGrpSpPr>
+      <p:grpSpPr>
+        <a:xfrm>
+          <a:off x="0" y="0"/>
+          <a:ext cx="0" cy="0"/>
+          <a:chOff x="0" y="0"/>
+          <a:chExt cx="0" cy="0"/>
+        </a:xfrm>
+      </p:grpSpPr>
+      <p:sp>
+        <p:nvSpPr>
+          <p:cNvPr id="2" name="Titel 1">
+            <a:extLst>
+              <a:ext uri="{FF2B5EF4-FFF2-40B4-BE49-F238E27FC236}">
+                <a16:creationId xmlns:a16="http://schemas.microsoft.com/office/drawing/2014/main" id="{EF94D828-6CDA-40A8-A76E-2BDEEFCCCBEF}"/>
+              </a:ext>
+            </a:extLst>
+          </p:cNvPr>
+          <p:cNvSpPr>
+            <a:spLocks noGrp="1"/>
+          </p:cNvSpPr>
+          <p:nvPr>
+            <p:ph type="title"/>
+          </p:nvPr>
+        </p:nvSpPr>
+        <p:spPr/>
+        <p:txBody>
+          <a:bodyPr/>
+          <a:lstStyle/>
+          <a:p>
+            <a:r>
+              <a:rPr lang="nl-NL" dirty="0"/>
+              <a:t>Vragen</a:t>
+            </a:r>
+          </a:p>
+        </p:txBody>
+      </p:sp>
+      <p:sp>
+        <p:nvSpPr>
+          <p:cNvPr id="3" name="Tijdelijke aanduiding voor inhoud 2">
+            <a:extLst>
+              <a:ext uri="{FF2B5EF4-FFF2-40B4-BE49-F238E27FC236}">
+                <a16:creationId xmlns:a16="http://schemas.microsoft.com/office/drawing/2014/main" id="{4BEF679E-3AAF-4F5E-89F2-9DE9A3CD8B66}"/>
+              </a:ext>
+            </a:extLst>
+          </p:cNvPr>
+          <p:cNvSpPr>
+            <a:spLocks noGrp="1"/>
+          </p:cNvSpPr>
+          <p:nvPr>
+            <p:ph idx="1"/>
+          </p:nvPr>
+        </p:nvSpPr>
+        <p:spPr/>
+        <p:txBody>
+          <a:bodyPr/>
+          <a:lstStyle/>
+          <a:p>
+            <a:endParaRPr lang="nl-NL" dirty="0"/>
+          </a:p>
+        </p:txBody>
+      </p:sp>
+    </p:spTree>
+    <p:extLst>
+      <p:ext uri="{BB962C8B-B14F-4D97-AF65-F5344CB8AC3E}">
+        <p14:creationId xmlns:p14="http://schemas.microsoft.com/office/powerpoint/2010/main" val="2815304248"/>
       </p:ext>
     </p:extLst>
   </p:cSld>
@@ -9980,6 +10487,17 @@
           <a:lstStyle/>
           <a:p>
             <a:r>
+              <a:rPr lang="en-US" dirty="0" err="1"/>
+              <a:t>Waarom</a:t>
+            </a:r>
+            <a:r>
+              <a:rPr lang="en-US"/>
+              <a:t>?</a:t>
+            </a:r>
+            <a:endParaRPr lang="nl-NL"/>
+          </a:p>
+          <a:p>
+            <a:r>
               <a:rPr lang="nl-NL" dirty="0"/>
               <a:t>Programma creëren waarin door middel van het lezen en opsturen van data uit plotters.</a:t>
             </a:r>
@@ -10010,6 +10528,12 @@
             <a:r>
               <a:rPr lang="nl-NL" dirty="0"/>
               <a:t> Storingen</a:t>
+            </a:r>
+          </a:p>
+          <a:p>
+            <a:r>
+              <a:rPr lang="nl-NL" dirty="0"/>
+              <a:t>Zo autonoom mogelijk</a:t>
             </a:r>
           </a:p>
           <a:p>
@@ -10049,10 +10573,10 @@
       </p:grpSpPr>
       <p:sp>
         <p:nvSpPr>
-          <p:cNvPr id="2" name="Titel 1">
+          <p:cNvPr id="2" name="Title 1">
             <a:extLst>
               <a:ext uri="{FF2B5EF4-FFF2-40B4-BE49-F238E27FC236}">
-                <a16:creationId xmlns:a16="http://schemas.microsoft.com/office/drawing/2014/main" id="{C28E0CAA-9282-47D0-A830-FF71400540D7}"/>
+                <a16:creationId xmlns:a16="http://schemas.microsoft.com/office/drawing/2014/main" id="{9152A9A6-E33C-4753-A85E-369FD5AEBDF4}"/>
               </a:ext>
             </a:extLst>
           </p:cNvPr>
@@ -10069,107 +10593,46 @@
           <a:lstStyle/>
           <a:p>
             <a:r>
-              <a:rPr lang="nl-NL" dirty="0"/>
-              <a:t>Kerntaken en Werkprocessen </a:t>
-            </a:r>
-          </a:p>
-        </p:txBody>
-      </p:sp>
-      <p:sp>
-        <p:nvSpPr>
-          <p:cNvPr id="3" name="Tijdelijke aanduiding voor inhoud 2">
+              <a:rPr lang="en-US" dirty="0"/>
+              <a:t>Dashboard</a:t>
+            </a:r>
+            <a:endParaRPr lang="en-GB" dirty="0"/>
+          </a:p>
+        </p:txBody>
+      </p:sp>
+      <p:pic>
+        <p:nvPicPr>
+          <p:cNvPr id="5" name="Content Placeholder 4">
             <a:extLst>
               <a:ext uri="{FF2B5EF4-FFF2-40B4-BE49-F238E27FC236}">
-                <a16:creationId xmlns:a16="http://schemas.microsoft.com/office/drawing/2014/main" id="{594BEB66-8904-43C3-B64E-AB6010AD2BBB}"/>
+                <a16:creationId xmlns:a16="http://schemas.microsoft.com/office/drawing/2014/main" id="{9724194B-86F3-43FB-9C99-2CE6626F5501}"/>
               </a:ext>
             </a:extLst>
           </p:cNvPr>
-          <p:cNvSpPr>
-            <a:spLocks noGrp="1"/>
-          </p:cNvSpPr>
+          <p:cNvPicPr>
+            <a:picLocks noGrp="1" noChangeAspect="1"/>
+          </p:cNvPicPr>
           <p:nvPr>
             <p:ph idx="1"/>
           </p:nvPr>
-        </p:nvSpPr>
-        <p:spPr/>
-        <p:txBody>
-          <a:bodyPr/>
-          <a:lstStyle/>
-          <a:p>
-            <a:r>
-              <a:rPr lang="nl-NL" dirty="0"/>
-              <a:t>Documenten gemaakt</a:t>
-            </a:r>
-          </a:p>
-          <a:p>
-            <a:pPr lvl="1"/>
-            <a:r>
-              <a:rPr lang="nl-NL" dirty="0"/>
-              <a:t>Programma van eisen</a:t>
-            </a:r>
-          </a:p>
-          <a:p>
-            <a:pPr lvl="1"/>
-            <a:r>
-              <a:rPr lang="nl-NL" dirty="0"/>
-              <a:t>Projectplan</a:t>
-            </a:r>
-          </a:p>
-          <a:p>
-            <a:pPr lvl="1"/>
-            <a:r>
-              <a:rPr lang="nl-NL" dirty="0"/>
-              <a:t>Functioneel ontwerp</a:t>
-            </a:r>
-          </a:p>
-          <a:p>
-            <a:pPr lvl="1"/>
-            <a:r>
-              <a:rPr lang="nl-NL" dirty="0"/>
-              <a:t>Technisch ontwerp</a:t>
-            </a:r>
-          </a:p>
-          <a:p>
-            <a:pPr lvl="1"/>
-            <a:r>
-              <a:rPr lang="nl-NL" dirty="0"/>
-              <a:t>Configuratiebestand</a:t>
-            </a:r>
-          </a:p>
-          <a:p>
-            <a:pPr lvl="1"/>
-            <a:r>
-              <a:rPr lang="nl-NL" dirty="0"/>
-              <a:t>Systeemtestplan</a:t>
-            </a:r>
-          </a:p>
-          <a:p>
-            <a:pPr lvl="1"/>
-            <a:r>
-              <a:rPr lang="nl-NL" dirty="0"/>
-              <a:t>Acceptatietestplan</a:t>
-            </a:r>
-          </a:p>
-          <a:p>
-            <a:pPr lvl="1"/>
-            <a:r>
-              <a:rPr lang="nl-NL" dirty="0"/>
-              <a:t>Evaluatie</a:t>
-            </a:r>
-          </a:p>
-          <a:p>
-            <a:pPr lvl="1"/>
-            <a:r>
-              <a:rPr lang="nl-NL" dirty="0"/>
-              <a:t>Kwaliteitshandboek</a:t>
-            </a:r>
-          </a:p>
-        </p:txBody>
-      </p:sp>
+        </p:nvPicPr>
+        <p:blipFill>
+          <a:blip r:embed="rId2"/>
+          <a:stretch>
+            <a:fillRect/>
+          </a:stretch>
+        </p:blipFill>
+        <p:spPr>
+          <a:xfrm>
+            <a:off x="1407493" y="2336800"/>
+            <a:ext cx="8160990" cy="3598863"/>
+          </a:xfrm>
+        </p:spPr>
+      </p:pic>
     </p:spTree>
     <p:extLst>
       <p:ext uri="{BB962C8B-B14F-4D97-AF65-F5344CB8AC3E}">
-        <p14:creationId xmlns:p14="http://schemas.microsoft.com/office/powerpoint/2010/main" val="191921759"/>
+        <p14:creationId xmlns:p14="http://schemas.microsoft.com/office/powerpoint/2010/main" val="2973343829"/>
       </p:ext>
     </p:extLst>
   </p:cSld>
@@ -10201,7 +10664,7 @@
           <p:cNvPr id="2" name="Title 1">
             <a:extLst>
               <a:ext uri="{FF2B5EF4-FFF2-40B4-BE49-F238E27FC236}">
-                <a16:creationId xmlns:a16="http://schemas.microsoft.com/office/drawing/2014/main" id="{68CCEABF-62B9-4D3C-92D0-001A5822D0B4}"/>
+                <a16:creationId xmlns:a16="http://schemas.microsoft.com/office/drawing/2014/main" id="{8E9B4817-7E62-446A-B6DD-D4568D481A40}"/>
               </a:ext>
             </a:extLst>
           </p:cNvPr>
@@ -10218,60 +10681,110 @@
           <a:lstStyle/>
           <a:p>
             <a:r>
-              <a:rPr lang="nl-NL" dirty="0"/>
-              <a:t>B1-K1-W1: Stelt de opdracht vast</a:t>
+              <a:rPr lang="en-US" dirty="0" err="1"/>
+              <a:t>Inteface</a:t>
+            </a:r>
+            <a:r>
+              <a:rPr lang="en-US" dirty="0"/>
+              <a:t> plotter</a:t>
             </a:r>
             <a:endParaRPr lang="en-GB" dirty="0"/>
           </a:p>
         </p:txBody>
       </p:sp>
-      <p:sp>
-        <p:nvSpPr>
-          <p:cNvPr id="3" name="Content Placeholder 2">
+      <p:pic>
+        <p:nvPicPr>
+          <p:cNvPr id="5" name="Content Placeholder 4">
             <a:extLst>
               <a:ext uri="{FF2B5EF4-FFF2-40B4-BE49-F238E27FC236}">
-                <a16:creationId xmlns:a16="http://schemas.microsoft.com/office/drawing/2014/main" id="{BD6700F8-1238-4337-97D9-13AA6576A38D}"/>
+                <a16:creationId xmlns:a16="http://schemas.microsoft.com/office/drawing/2014/main" id="{A6719E19-D6E9-419E-85C7-05218097E855}"/>
               </a:ext>
             </a:extLst>
           </p:cNvPr>
-          <p:cNvSpPr>
-            <a:spLocks noGrp="1"/>
-          </p:cNvSpPr>
+          <p:cNvPicPr>
+            <a:picLocks noGrp="1" noChangeAspect="1"/>
+          </p:cNvPicPr>
           <p:nvPr>
             <p:ph idx="1"/>
           </p:nvPr>
-        </p:nvSpPr>
-        <p:spPr/>
-        <p:txBody>
-          <a:bodyPr/>
-          <a:lstStyle/>
-          <a:p>
-            <a:pPr lvl="1"/>
-            <a:r>
-              <a:rPr lang="nl-NL" dirty="0"/>
-              <a:t>Vastgesteld door middel van interviews en eerder gemaakte documentatie (Proces)</a:t>
-            </a:r>
-          </a:p>
-          <a:p>
-            <a:pPr lvl="1"/>
-            <a:r>
-              <a:rPr lang="nl-NL" dirty="0"/>
-              <a:t>Product programma van eisen gemaakt met behulp van sjabloon</a:t>
-            </a:r>
-          </a:p>
-          <a:p>
-            <a:pPr lvl="1"/>
-            <a:endParaRPr lang="nl-NL" dirty="0"/>
-          </a:p>
-          <a:p>
-            <a:endParaRPr lang="en-GB" dirty="0"/>
-          </a:p>
-        </p:txBody>
-      </p:sp>
+        </p:nvPicPr>
+        <p:blipFill>
+          <a:blip r:embed="rId2"/>
+          <a:stretch>
+            <a:fillRect/>
+          </a:stretch>
+        </p:blipFill>
+        <p:spPr>
+          <a:xfrm>
+            <a:off x="680281" y="3040072"/>
+            <a:ext cx="10029871" cy="777856"/>
+          </a:xfrm>
+        </p:spPr>
+      </p:pic>
+      <p:pic>
+        <p:nvPicPr>
+          <p:cNvPr id="7" name="Picture 6">
+            <a:extLst>
+              <a:ext uri="{FF2B5EF4-FFF2-40B4-BE49-F238E27FC236}">
+                <a16:creationId xmlns:a16="http://schemas.microsoft.com/office/drawing/2014/main" id="{5129EB7C-4629-41AC-AD6D-02A31A15974A}"/>
+              </a:ext>
+            </a:extLst>
+          </p:cNvPr>
+          <p:cNvPicPr>
+            <a:picLocks noChangeAspect="1"/>
+          </p:cNvPicPr>
+          <p:nvPr/>
+        </p:nvPicPr>
+        <p:blipFill>
+          <a:blip r:embed="rId3"/>
+          <a:stretch>
+            <a:fillRect/>
+          </a:stretch>
+        </p:blipFill>
+        <p:spPr>
+          <a:xfrm>
+            <a:off x="680321" y="2287019"/>
+            <a:ext cx="9931940" cy="602096"/>
+          </a:xfrm>
+          <a:prstGeom prst="rect">
+            <a:avLst/>
+          </a:prstGeom>
+        </p:spPr>
+      </p:pic>
+      <p:pic>
+        <p:nvPicPr>
+          <p:cNvPr id="9" name="Picture 8">
+            <a:extLst>
+              <a:ext uri="{FF2B5EF4-FFF2-40B4-BE49-F238E27FC236}">
+                <a16:creationId xmlns:a16="http://schemas.microsoft.com/office/drawing/2014/main" id="{C27E53C7-7897-4F3E-8A2A-E0ED2BC6B1DD}"/>
+              </a:ext>
+            </a:extLst>
+          </p:cNvPr>
+          <p:cNvPicPr>
+            <a:picLocks noChangeAspect="1"/>
+          </p:cNvPicPr>
+          <p:nvPr/>
+        </p:nvPicPr>
+        <p:blipFill>
+          <a:blip r:embed="rId4"/>
+          <a:stretch>
+            <a:fillRect/>
+          </a:stretch>
+        </p:blipFill>
+        <p:spPr>
+          <a:xfrm>
+            <a:off x="155641" y="4041892"/>
+            <a:ext cx="11413787" cy="1383489"/>
+          </a:xfrm>
+          <a:prstGeom prst="rect">
+            <a:avLst/>
+          </a:prstGeom>
+        </p:spPr>
+      </p:pic>
     </p:spTree>
     <p:extLst>
       <p:ext uri="{BB962C8B-B14F-4D97-AF65-F5344CB8AC3E}">
-        <p14:creationId xmlns:p14="http://schemas.microsoft.com/office/powerpoint/2010/main" val="721552983"/>
+        <p14:creationId xmlns:p14="http://schemas.microsoft.com/office/powerpoint/2010/main" val="2409252133"/>
       </p:ext>
     </p:extLst>
   </p:cSld>
@@ -10300,10 +10813,10 @@
       </p:grpSpPr>
       <p:sp>
         <p:nvSpPr>
-          <p:cNvPr id="2" name="Title 1">
+          <p:cNvPr id="2" name="Titel 1">
             <a:extLst>
               <a:ext uri="{FF2B5EF4-FFF2-40B4-BE49-F238E27FC236}">
-                <a16:creationId xmlns:a16="http://schemas.microsoft.com/office/drawing/2014/main" id="{163B9443-8968-4ABC-9BA3-D93C90A21ED6}"/>
+                <a16:creationId xmlns:a16="http://schemas.microsoft.com/office/drawing/2014/main" id="{C28E0CAA-9282-47D0-A830-FF71400540D7}"/>
               </a:ext>
             </a:extLst>
           </p:cNvPr>
@@ -10316,25 +10829,22 @@
         </p:nvSpPr>
         <p:spPr/>
         <p:txBody>
-          <a:bodyPr>
-            <a:normAutofit/>
-          </a:bodyPr>
+          <a:bodyPr/>
           <a:lstStyle/>
           <a:p>
             <a:r>
               <a:rPr lang="nl-NL" dirty="0"/>
-              <a:t>B1-K1-W2: Levert een bijdrage aan het projectplan</a:t>
-            </a:r>
-            <a:endParaRPr lang="en-GB" dirty="0"/>
-          </a:p>
-        </p:txBody>
-      </p:sp>
-      <p:sp>
-        <p:nvSpPr>
-          <p:cNvPr id="3" name="Content Placeholder 2">
+              <a:t>Kerntaken en Werkprocessen </a:t>
+            </a:r>
+          </a:p>
+        </p:txBody>
+      </p:sp>
+      <p:sp>
+        <p:nvSpPr>
+          <p:cNvPr id="3" name="Tijdelijke aanduiding voor inhoud 2">
             <a:extLst>
               <a:ext uri="{FF2B5EF4-FFF2-40B4-BE49-F238E27FC236}">
-                <a16:creationId xmlns:a16="http://schemas.microsoft.com/office/drawing/2014/main" id="{A14A2C93-8C87-401D-98A8-3DC362E74175}"/>
+                <a16:creationId xmlns:a16="http://schemas.microsoft.com/office/drawing/2014/main" id="{594BEB66-8904-43C3-B64E-AB6010AD2BBB}"/>
               </a:ext>
             </a:extLst>
           </p:cNvPr>
@@ -10350,28 +10860,80 @@
           <a:bodyPr/>
           <a:lstStyle/>
           <a:p>
+            <a:r>
+              <a:rPr lang="nl-NL" dirty="0"/>
+              <a:t>Documenten gemaakt</a:t>
+            </a:r>
+          </a:p>
+          <a:p>
             <a:pPr lvl="1"/>
             <a:r>
               <a:rPr lang="nl-NL" dirty="0"/>
-              <a:t>Product projectplan gemaakt met behulp van Sjabloon</a:t>
+              <a:t>Programma van eisen</a:t>
             </a:r>
           </a:p>
           <a:p>
             <a:pPr lvl="1"/>
             <a:r>
               <a:rPr lang="nl-NL" dirty="0"/>
-              <a:t>Product strokenplanning verwerkt in het projectplan</a:t>
-            </a:r>
-          </a:p>
-          <a:p>
-            <a:endParaRPr lang="en-GB" dirty="0"/>
+              <a:t>Projectplan</a:t>
+            </a:r>
+          </a:p>
+          <a:p>
+            <a:pPr lvl="1"/>
+            <a:r>
+              <a:rPr lang="nl-NL" dirty="0"/>
+              <a:t>Functioneel ontwerp</a:t>
+            </a:r>
+          </a:p>
+          <a:p>
+            <a:pPr lvl="1"/>
+            <a:r>
+              <a:rPr lang="nl-NL" dirty="0"/>
+              <a:t>Technisch ontwerp</a:t>
+            </a:r>
+          </a:p>
+          <a:p>
+            <a:pPr lvl="1"/>
+            <a:r>
+              <a:rPr lang="nl-NL" dirty="0"/>
+              <a:t>Configuratiebestand</a:t>
+            </a:r>
+          </a:p>
+          <a:p>
+            <a:pPr lvl="1"/>
+            <a:r>
+              <a:rPr lang="nl-NL" dirty="0"/>
+              <a:t>Systeemtestplan</a:t>
+            </a:r>
+          </a:p>
+          <a:p>
+            <a:pPr lvl="1"/>
+            <a:r>
+              <a:rPr lang="nl-NL" dirty="0"/>
+              <a:t>Acceptatietestplan</a:t>
+            </a:r>
+          </a:p>
+          <a:p>
+            <a:pPr lvl="1"/>
+            <a:r>
+              <a:rPr lang="nl-NL" dirty="0"/>
+              <a:t>Evaluatie</a:t>
+            </a:r>
+          </a:p>
+          <a:p>
+            <a:pPr lvl="1"/>
+            <a:r>
+              <a:rPr lang="nl-NL" dirty="0"/>
+              <a:t>Kwaliteitshandboek</a:t>
+            </a:r>
           </a:p>
         </p:txBody>
       </p:sp>
     </p:spTree>
     <p:extLst>
       <p:ext uri="{BB962C8B-B14F-4D97-AF65-F5344CB8AC3E}">
-        <p14:creationId xmlns:p14="http://schemas.microsoft.com/office/powerpoint/2010/main" val="1765425242"/>
+        <p14:creationId xmlns:p14="http://schemas.microsoft.com/office/powerpoint/2010/main" val="191921759"/>
       </p:ext>
     </p:extLst>
   </p:cSld>
@@ -10403,7 +10965,7 @@
           <p:cNvPr id="2" name="Title 1">
             <a:extLst>
               <a:ext uri="{FF2B5EF4-FFF2-40B4-BE49-F238E27FC236}">
-                <a16:creationId xmlns:a16="http://schemas.microsoft.com/office/drawing/2014/main" id="{458039A1-A84D-482B-9D53-0F7E7783FBDA}"/>
+                <a16:creationId xmlns:a16="http://schemas.microsoft.com/office/drawing/2014/main" id="{68CCEABF-62B9-4D3C-92D0-001A5822D0B4}"/>
               </a:ext>
             </a:extLst>
           </p:cNvPr>
@@ -10416,14 +10978,12 @@
         </p:nvSpPr>
         <p:spPr/>
         <p:txBody>
-          <a:bodyPr>
-            <a:normAutofit/>
-          </a:bodyPr>
+          <a:bodyPr/>
           <a:lstStyle/>
           <a:p>
             <a:r>
               <a:rPr lang="nl-NL" dirty="0"/>
-              <a:t>B1-K1-W3: Levert een bijdrage aan het ontwerp</a:t>
+              <a:t>B1-K1-W1: Stelt de opdracht vast</a:t>
             </a:r>
             <a:endParaRPr lang="en-GB" dirty="0"/>
           </a:p>
@@ -10434,7 +10994,7 @@
           <p:cNvPr id="3" name="Content Placeholder 2">
             <a:extLst>
               <a:ext uri="{FF2B5EF4-FFF2-40B4-BE49-F238E27FC236}">
-                <a16:creationId xmlns:a16="http://schemas.microsoft.com/office/drawing/2014/main" id="{2AEE3E25-8BCC-4252-9C3E-0D3C31A84882}"/>
+                <a16:creationId xmlns:a16="http://schemas.microsoft.com/office/drawing/2014/main" id="{BD6700F8-1238-4337-97D9-13AA6576A38D}"/>
               </a:ext>
             </a:extLst>
           </p:cNvPr>
@@ -10453,15 +11013,19 @@
             <a:pPr lvl="1"/>
             <a:r>
               <a:rPr lang="nl-NL" dirty="0"/>
-              <a:t>Product functioneel ontwerp gemaakt met behulp van sjabloon</a:t>
+              <a:t>Vastgesteld door middel van interviews en eerder gemaakte documentatie (Proces)</a:t>
             </a:r>
           </a:p>
           <a:p>
             <a:pPr lvl="1"/>
             <a:r>
               <a:rPr lang="nl-NL" dirty="0"/>
-              <a:t>Product technisch ontwerp gemaakt met behulp van sjabloon</a:t>
-            </a:r>
+              <a:t>Product programma van eisen gemaakt met behulp van sjabloon</a:t>
+            </a:r>
+          </a:p>
+          <a:p>
+            <a:pPr lvl="1"/>
+            <a:endParaRPr lang="nl-NL" dirty="0"/>
           </a:p>
           <a:p>
             <a:endParaRPr lang="en-GB" dirty="0"/>
@@ -10471,7 +11035,7 @@
     </p:spTree>
     <p:extLst>
       <p:ext uri="{BB962C8B-B14F-4D97-AF65-F5344CB8AC3E}">
-        <p14:creationId xmlns:p14="http://schemas.microsoft.com/office/powerpoint/2010/main" val="2111454828"/>
+        <p14:creationId xmlns:p14="http://schemas.microsoft.com/office/powerpoint/2010/main" val="721552983"/>
       </p:ext>
     </p:extLst>
   </p:cSld>
@@ -10503,7 +11067,7 @@
           <p:cNvPr id="2" name="Title 1">
             <a:extLst>
               <a:ext uri="{FF2B5EF4-FFF2-40B4-BE49-F238E27FC236}">
-                <a16:creationId xmlns:a16="http://schemas.microsoft.com/office/drawing/2014/main" id="{4AA2C044-7020-4F0E-96E3-5B0169059087}"/>
+                <a16:creationId xmlns:a16="http://schemas.microsoft.com/office/drawing/2014/main" id="{163B9443-8968-4ABC-9BA3-D93C90A21ED6}"/>
               </a:ext>
             </a:extLst>
           </p:cNvPr>
@@ -10516,12 +11080,14 @@
         </p:nvSpPr>
         <p:spPr/>
         <p:txBody>
-          <a:bodyPr/>
+          <a:bodyPr>
+            <a:normAutofit/>
+          </a:bodyPr>
           <a:lstStyle/>
           <a:p>
             <a:r>
               <a:rPr lang="nl-NL" dirty="0"/>
-              <a:t>B1-K1-W4: Bereidt de realisatie voor</a:t>
+              <a:t>B1-K1-W2: Levert een bijdrage aan het projectplan</a:t>
             </a:r>
             <a:endParaRPr lang="en-GB" dirty="0"/>
           </a:p>
@@ -10532,7 +11098,7 @@
           <p:cNvPr id="3" name="Content Placeholder 2">
             <a:extLst>
               <a:ext uri="{FF2B5EF4-FFF2-40B4-BE49-F238E27FC236}">
-                <a16:creationId xmlns:a16="http://schemas.microsoft.com/office/drawing/2014/main" id="{DE4AFB02-1403-46FE-9154-975A3F4F677A}"/>
+                <a16:creationId xmlns:a16="http://schemas.microsoft.com/office/drawing/2014/main" id="{A14A2C93-8C87-401D-98A8-3DC362E74175}"/>
               </a:ext>
             </a:extLst>
           </p:cNvPr>
@@ -10548,11 +11114,18 @@
           <a:bodyPr/>
           <a:lstStyle/>
           <a:p>
+            <a:pPr lvl="1"/>
             <a:r>
               <a:rPr lang="nl-NL" dirty="0"/>
-              <a:t>Product configuratieoverzicht gemaakt met behulp van sjabloon</a:t>
-            </a:r>
-            <a:endParaRPr lang="en-GB" dirty="0"/>
+              <a:t>Product projectplan gemaakt met behulp van Sjabloon</a:t>
+            </a:r>
+          </a:p>
+          <a:p>
+            <a:pPr lvl="1"/>
+            <a:r>
+              <a:rPr lang="nl-NL" dirty="0"/>
+              <a:t>Product strokenplanning verwerkt in het projectplan</a:t>
+            </a:r>
           </a:p>
           <a:p>
             <a:endParaRPr lang="en-GB" dirty="0"/>
@@ -10562,7 +11135,7 @@
     </p:spTree>
     <p:extLst>
       <p:ext uri="{BB962C8B-B14F-4D97-AF65-F5344CB8AC3E}">
-        <p14:creationId xmlns:p14="http://schemas.microsoft.com/office/powerpoint/2010/main" val="4241215244"/>
+        <p14:creationId xmlns:p14="http://schemas.microsoft.com/office/powerpoint/2010/main" val="1765425242"/>
       </p:ext>
     </p:extLst>
   </p:cSld>

</xml_diff>